<commit_message>
Update Logic Component Class Diagram
</commit_message>
<xml_diff>
--- a/docs/diagrams/LogicComponentClassDiagram.pptx
+++ b/docs/diagrams/LogicComponentClassDiagram.pptx
@@ -109,25 +109,10 @@
   </p:defaultTextStyle>
   <p:extLst>
     <p:ext uri="{EFAFB233-063F-42B5-8137-9DF3F51BA10A}">
-      <p15:sldGuideLst xmlns:p15="http://schemas.microsoft.com/office/powerpoint/2012/main">
-        <p15:guide id="1" orient="horz" pos="1488">
-          <p15:clr>
-            <a:srgbClr val="A4A3A4"/>
-          </p15:clr>
-        </p15:guide>
-        <p15:guide id="2" pos="2880">
-          <p15:clr>
-            <a:srgbClr val="A4A3A4"/>
-          </p15:clr>
-        </p15:guide>
-      </p15:sldGuideLst>
+      <p15:sldGuideLst xmlns:p15="http://schemas.microsoft.com/office/powerpoint/2012/main"/>
     </p:ext>
   </p:extLst>
 </p:presentation>
-</file>
-
-<file path=ppt/revisionInfo.xml><?xml version="1.0" encoding="utf-8"?>
-<p1510:revInfo xmlns:a="http://schemas.openxmlformats.org/drawingml/2006/main" xmlns:r="http://schemas.openxmlformats.org/officeDocument/2006/relationships" xmlns:p1510="http://schemas.microsoft.com/office/powerpoint/2015/10/main"/>
 </file>
 
 <file path=ppt/notesMasters/notesMaster1.xml><?xml version="1.0" encoding="utf-8"?>
@@ -179,7 +164,7 @@
             </a:lvl1pPr>
           </a:lstStyle>
           <a:p>
-            <a:endParaRPr lang="en-US"/>
+            <a:endParaRPr lang="en-US" dirty="0"/>
           </a:p>
         </p:txBody>
       </p:sp>
@@ -212,9 +197,9 @@
           <a:p>
             <a:fld id="{F5CC4B3F-88C1-4FFA-B1B6-F41C21DC6924}" type="datetimeFigureOut">
               <a:rPr lang="en-US" smtClean="0"/>
-              <a:t>4/16/2018</a:t>
+              <a:t>2/27/19</a:t>
             </a:fld>
-            <a:endParaRPr lang="en-US"/>
+            <a:endParaRPr lang="en-US" dirty="0"/>
           </a:p>
         </p:txBody>
       </p:sp>
@@ -247,7 +232,7 @@
           <a:bodyPr vert="horz" lIns="91440" tIns="45720" rIns="91440" bIns="45720" rtlCol="0" anchor="ctr"/>
           <a:lstStyle/>
           <a:p>
-            <a:endParaRPr lang="en-US"/>
+            <a:endParaRPr lang="en-US" dirty="0"/>
           </a:p>
         </p:txBody>
       </p:sp>
@@ -337,7 +322,7 @@
             </a:lvl1pPr>
           </a:lstStyle>
           <a:p>
-            <a:endParaRPr lang="en-US"/>
+            <a:endParaRPr lang="en-US" dirty="0"/>
           </a:p>
         </p:txBody>
       </p:sp>
@@ -372,7 +357,7 @@
               <a:rPr lang="en-US" smtClean="0"/>
               <a:t>‹#›</a:t>
             </a:fld>
-            <a:endParaRPr lang="en-US"/>
+            <a:endParaRPr lang="en-US" dirty="0"/>
           </a:p>
         </p:txBody>
       </p:sp>
@@ -658,9 +643,9 @@
           <a:p>
             <a:fld id="{78C97017-6FC3-485B-9764-EAC9E56C1D49}" type="datetimeFigureOut">
               <a:rPr lang="en-US" smtClean="0"/>
-              <a:t>4/16/2018</a:t>
+              <a:t>2/27/19</a:t>
             </a:fld>
-            <a:endParaRPr lang="en-US"/>
+            <a:endParaRPr lang="en-US" dirty="0"/>
           </a:p>
         </p:txBody>
       </p:sp>
@@ -679,7 +664,7 @@
           <a:bodyPr/>
           <a:lstStyle/>
           <a:p>
-            <a:endParaRPr lang="en-US"/>
+            <a:endParaRPr lang="en-US" dirty="0"/>
           </a:p>
         </p:txBody>
       </p:sp>
@@ -702,7 +687,7 @@
               <a:rPr lang="en-US" smtClean="0"/>
               <a:t>‹#›</a:t>
             </a:fld>
-            <a:endParaRPr lang="en-US"/>
+            <a:endParaRPr lang="en-US" dirty="0"/>
           </a:p>
         </p:txBody>
       </p:sp>
@@ -826,9 +811,9 @@
           <a:p>
             <a:fld id="{78C97017-6FC3-485B-9764-EAC9E56C1D49}" type="datetimeFigureOut">
               <a:rPr lang="en-US" smtClean="0"/>
-              <a:t>4/16/2018</a:t>
+              <a:t>2/27/19</a:t>
             </a:fld>
-            <a:endParaRPr lang="en-US"/>
+            <a:endParaRPr lang="en-US" dirty="0"/>
           </a:p>
         </p:txBody>
       </p:sp>
@@ -847,7 +832,7 @@
           <a:bodyPr/>
           <a:lstStyle/>
           <a:p>
-            <a:endParaRPr lang="en-US"/>
+            <a:endParaRPr lang="en-US" dirty="0"/>
           </a:p>
         </p:txBody>
       </p:sp>
@@ -870,7 +855,7 @@
               <a:rPr lang="en-US" smtClean="0"/>
               <a:t>‹#›</a:t>
             </a:fld>
-            <a:endParaRPr lang="en-US"/>
+            <a:endParaRPr lang="en-US" dirty="0"/>
           </a:p>
         </p:txBody>
       </p:sp>
@@ -1004,9 +989,9 @@
           <a:p>
             <a:fld id="{78C97017-6FC3-485B-9764-EAC9E56C1D49}" type="datetimeFigureOut">
               <a:rPr lang="en-US" smtClean="0"/>
-              <a:t>4/16/2018</a:t>
+              <a:t>2/27/19</a:t>
             </a:fld>
-            <a:endParaRPr lang="en-US"/>
+            <a:endParaRPr lang="en-US" dirty="0"/>
           </a:p>
         </p:txBody>
       </p:sp>
@@ -1025,7 +1010,7 @@
           <a:bodyPr/>
           <a:lstStyle/>
           <a:p>
-            <a:endParaRPr lang="en-US"/>
+            <a:endParaRPr lang="en-US" dirty="0"/>
           </a:p>
         </p:txBody>
       </p:sp>
@@ -1048,7 +1033,7 @@
               <a:rPr lang="en-US" smtClean="0"/>
               <a:t>‹#›</a:t>
             </a:fld>
-            <a:endParaRPr lang="en-US"/>
+            <a:endParaRPr lang="en-US" dirty="0"/>
           </a:p>
         </p:txBody>
       </p:sp>
@@ -1172,9 +1157,9 @@
           <a:p>
             <a:fld id="{78C97017-6FC3-485B-9764-EAC9E56C1D49}" type="datetimeFigureOut">
               <a:rPr lang="en-US" smtClean="0"/>
-              <a:t>4/16/2018</a:t>
+              <a:t>2/27/19</a:t>
             </a:fld>
-            <a:endParaRPr lang="en-US"/>
+            <a:endParaRPr lang="en-US" dirty="0"/>
           </a:p>
         </p:txBody>
       </p:sp>
@@ -1193,7 +1178,7 @@
           <a:bodyPr/>
           <a:lstStyle/>
           <a:p>
-            <a:endParaRPr lang="en-US"/>
+            <a:endParaRPr lang="en-US" dirty="0"/>
           </a:p>
         </p:txBody>
       </p:sp>
@@ -1216,7 +1201,7 @@
               <a:rPr lang="en-US" smtClean="0"/>
               <a:t>‹#›</a:t>
             </a:fld>
-            <a:endParaRPr lang="en-US"/>
+            <a:endParaRPr lang="en-US" dirty="0"/>
           </a:p>
         </p:txBody>
       </p:sp>
@@ -1417,9 +1402,9 @@
           <a:p>
             <a:fld id="{78C97017-6FC3-485B-9764-EAC9E56C1D49}" type="datetimeFigureOut">
               <a:rPr lang="en-US" smtClean="0"/>
-              <a:t>4/16/2018</a:t>
+              <a:t>2/27/19</a:t>
             </a:fld>
-            <a:endParaRPr lang="en-US"/>
+            <a:endParaRPr lang="en-US" dirty="0"/>
           </a:p>
         </p:txBody>
       </p:sp>
@@ -1438,7 +1423,7 @@
           <a:bodyPr/>
           <a:lstStyle/>
           <a:p>
-            <a:endParaRPr lang="en-US"/>
+            <a:endParaRPr lang="en-US" dirty="0"/>
           </a:p>
         </p:txBody>
       </p:sp>
@@ -1461,7 +1446,7 @@
               <a:rPr lang="en-US" smtClean="0"/>
               <a:t>‹#›</a:t>
             </a:fld>
-            <a:endParaRPr lang="en-US"/>
+            <a:endParaRPr lang="en-US" dirty="0"/>
           </a:p>
         </p:txBody>
       </p:sp>
@@ -1702,9 +1687,9 @@
           <a:p>
             <a:fld id="{78C97017-6FC3-485B-9764-EAC9E56C1D49}" type="datetimeFigureOut">
               <a:rPr lang="en-US" smtClean="0"/>
-              <a:t>4/16/2018</a:t>
+              <a:t>2/27/19</a:t>
             </a:fld>
-            <a:endParaRPr lang="en-US"/>
+            <a:endParaRPr lang="en-US" dirty="0"/>
           </a:p>
         </p:txBody>
       </p:sp>
@@ -1723,7 +1708,7 @@
           <a:bodyPr/>
           <a:lstStyle/>
           <a:p>
-            <a:endParaRPr lang="en-US"/>
+            <a:endParaRPr lang="en-US" dirty="0"/>
           </a:p>
         </p:txBody>
       </p:sp>
@@ -1746,7 +1731,7 @@
               <a:rPr lang="en-US" smtClean="0"/>
               <a:t>‹#›</a:t>
             </a:fld>
-            <a:endParaRPr lang="en-US"/>
+            <a:endParaRPr lang="en-US" dirty="0"/>
           </a:p>
         </p:txBody>
       </p:sp>
@@ -2121,9 +2106,9 @@
           <a:p>
             <a:fld id="{78C97017-6FC3-485B-9764-EAC9E56C1D49}" type="datetimeFigureOut">
               <a:rPr lang="en-US" smtClean="0"/>
-              <a:t>4/16/2018</a:t>
+              <a:t>2/27/19</a:t>
             </a:fld>
-            <a:endParaRPr lang="en-US"/>
+            <a:endParaRPr lang="en-US" dirty="0"/>
           </a:p>
         </p:txBody>
       </p:sp>
@@ -2142,7 +2127,7 @@
           <a:bodyPr/>
           <a:lstStyle/>
           <a:p>
-            <a:endParaRPr lang="en-US"/>
+            <a:endParaRPr lang="en-US" dirty="0"/>
           </a:p>
         </p:txBody>
       </p:sp>
@@ -2165,7 +2150,7 @@
               <a:rPr lang="en-US" smtClean="0"/>
               <a:t>‹#›</a:t>
             </a:fld>
-            <a:endParaRPr lang="en-US"/>
+            <a:endParaRPr lang="en-US" dirty="0"/>
           </a:p>
         </p:txBody>
       </p:sp>
@@ -2238,9 +2223,9 @@
           <a:p>
             <a:fld id="{78C97017-6FC3-485B-9764-EAC9E56C1D49}" type="datetimeFigureOut">
               <a:rPr lang="en-US" smtClean="0"/>
-              <a:t>4/16/2018</a:t>
+              <a:t>2/27/19</a:t>
             </a:fld>
-            <a:endParaRPr lang="en-US"/>
+            <a:endParaRPr lang="en-US" dirty="0"/>
           </a:p>
         </p:txBody>
       </p:sp>
@@ -2259,7 +2244,7 @@
           <a:bodyPr/>
           <a:lstStyle/>
           <a:p>
-            <a:endParaRPr lang="en-US"/>
+            <a:endParaRPr lang="en-US" dirty="0"/>
           </a:p>
         </p:txBody>
       </p:sp>
@@ -2282,7 +2267,7 @@
               <a:rPr lang="en-US" smtClean="0"/>
               <a:t>‹#›</a:t>
             </a:fld>
-            <a:endParaRPr lang="en-US"/>
+            <a:endParaRPr lang="en-US" dirty="0"/>
           </a:p>
         </p:txBody>
       </p:sp>
@@ -2333,9 +2318,9 @@
           <a:p>
             <a:fld id="{78C97017-6FC3-485B-9764-EAC9E56C1D49}" type="datetimeFigureOut">
               <a:rPr lang="en-US" smtClean="0"/>
-              <a:t>4/16/2018</a:t>
+              <a:t>2/27/19</a:t>
             </a:fld>
-            <a:endParaRPr lang="en-US"/>
+            <a:endParaRPr lang="en-US" dirty="0"/>
           </a:p>
         </p:txBody>
       </p:sp>
@@ -2354,7 +2339,7 @@
           <a:bodyPr/>
           <a:lstStyle/>
           <a:p>
-            <a:endParaRPr lang="en-US"/>
+            <a:endParaRPr lang="en-US" dirty="0"/>
           </a:p>
         </p:txBody>
       </p:sp>
@@ -2377,7 +2362,7 @@
               <a:rPr lang="en-US" smtClean="0"/>
               <a:t>‹#›</a:t>
             </a:fld>
-            <a:endParaRPr lang="en-US"/>
+            <a:endParaRPr lang="en-US" dirty="0"/>
           </a:p>
         </p:txBody>
       </p:sp>
@@ -2608,9 +2593,9 @@
           <a:p>
             <a:fld id="{78C97017-6FC3-485B-9764-EAC9E56C1D49}" type="datetimeFigureOut">
               <a:rPr lang="en-US" smtClean="0"/>
-              <a:t>4/16/2018</a:t>
+              <a:t>2/27/19</a:t>
             </a:fld>
-            <a:endParaRPr lang="en-US"/>
+            <a:endParaRPr lang="en-US" dirty="0"/>
           </a:p>
         </p:txBody>
       </p:sp>
@@ -2629,7 +2614,7 @@
           <a:bodyPr/>
           <a:lstStyle/>
           <a:p>
-            <a:endParaRPr lang="en-US"/>
+            <a:endParaRPr lang="en-US" dirty="0"/>
           </a:p>
         </p:txBody>
       </p:sp>
@@ -2652,7 +2637,7 @@
               <a:rPr lang="en-US" smtClean="0"/>
               <a:t>‹#›</a:t>
             </a:fld>
-            <a:endParaRPr lang="en-US"/>
+            <a:endParaRPr lang="en-US" dirty="0"/>
           </a:p>
         </p:txBody>
       </p:sp>
@@ -2774,7 +2759,7 @@
             </a:lvl9pPr>
           </a:lstStyle>
           <a:p>
-            <a:endParaRPr lang="en-US"/>
+            <a:endParaRPr lang="en-US" dirty="0"/>
           </a:p>
         </p:txBody>
       </p:sp>
@@ -2860,9 +2845,9 @@
           <a:p>
             <a:fld id="{78C97017-6FC3-485B-9764-EAC9E56C1D49}" type="datetimeFigureOut">
               <a:rPr lang="en-US" smtClean="0"/>
-              <a:t>4/16/2018</a:t>
+              <a:t>2/27/19</a:t>
             </a:fld>
-            <a:endParaRPr lang="en-US"/>
+            <a:endParaRPr lang="en-US" dirty="0"/>
           </a:p>
         </p:txBody>
       </p:sp>
@@ -2881,7 +2866,7 @@
           <a:bodyPr/>
           <a:lstStyle/>
           <a:p>
-            <a:endParaRPr lang="en-US"/>
+            <a:endParaRPr lang="en-US" dirty="0"/>
           </a:p>
         </p:txBody>
       </p:sp>
@@ -2904,7 +2889,7 @@
               <a:rPr lang="en-US" smtClean="0"/>
               <a:t>‹#›</a:t>
             </a:fld>
-            <a:endParaRPr lang="en-US"/>
+            <a:endParaRPr lang="en-US" dirty="0"/>
           </a:p>
         </p:txBody>
       </p:sp>
@@ -3071,9 +3056,9 @@
           <a:p>
             <a:fld id="{78C97017-6FC3-485B-9764-EAC9E56C1D49}" type="datetimeFigureOut">
               <a:rPr lang="en-US" smtClean="0"/>
-              <a:t>4/16/2018</a:t>
+              <a:t>2/27/19</a:t>
             </a:fld>
-            <a:endParaRPr lang="en-US"/>
+            <a:endParaRPr lang="en-US" dirty="0"/>
           </a:p>
         </p:txBody>
       </p:sp>
@@ -3110,7 +3095,7 @@
             </a:lvl1pPr>
           </a:lstStyle>
           <a:p>
-            <a:endParaRPr lang="en-US"/>
+            <a:endParaRPr lang="en-US" dirty="0"/>
           </a:p>
         </p:txBody>
       </p:sp>
@@ -3151,7 +3136,7 @@
               <a:rPr lang="en-US" smtClean="0"/>
               <a:t>‹#›</a:t>
             </a:fld>
-            <a:endParaRPr lang="en-US"/>
+            <a:endParaRPr lang="en-US" dirty="0"/>
           </a:p>
         </p:txBody>
       </p:sp>
@@ -3551,7 +3536,7 @@
           <a:p>
             <a:pPr algn="ctr"/>
             <a:r>
-              <a:rPr lang="en-US" sz="1050" dirty="0" err="1">
+              <a:rPr lang="en-US" sz="1050" dirty="0">
                 <a:solidFill>
                   <a:schemeClr val="bg1"/>
                 </a:solidFill>
@@ -3607,7 +3592,7 @@
           <a:p>
             <a:pPr algn="ctr"/>
             <a:r>
-              <a:rPr lang="en-US" sz="1050" b="1" dirty="0" err="1" smtClean="0">
+              <a:rPr lang="en-US" sz="1050" b="1" dirty="0">
                 <a:solidFill>
                   <a:srgbClr val="0070C0"/>
                 </a:solidFill>
@@ -3666,7 +3651,7 @@
           <a:p>
             <a:pPr algn="ctr"/>
             <a:r>
-              <a:rPr lang="en-US" sz="1050" dirty="0" err="1">
+              <a:rPr lang="en-US" sz="1050" dirty="0">
                 <a:solidFill>
                   <a:schemeClr val="bg1"/>
                 </a:solidFill>
@@ -3776,8 +3761,8 @@
         </p:nvSpPr>
         <p:spPr>
           <a:xfrm>
-            <a:off x="1103085" y="4777355"/>
-            <a:ext cx="7050315" cy="328045"/>
+            <a:off x="2499230" y="4791784"/>
+            <a:ext cx="5644304" cy="328045"/>
           </a:xfrm>
           <a:prstGeom prst="roundRect">
             <a:avLst/>
@@ -3939,18 +3924,13 @@
           <a:p>
             <a:pPr algn="ctr"/>
             <a:r>
-              <a:rPr lang="en-US" sz="1050" dirty="0" err="1" smtClean="0">
+              <a:rPr lang="en-US" sz="1050" dirty="0">
                 <a:solidFill>
                   <a:schemeClr val="bg1"/>
                 </a:solidFill>
               </a:rPr>
-              <a:t>AddressBook</a:t>
-            </a:r>
-            <a:endParaRPr lang="en-US" sz="1050" dirty="0">
-              <a:solidFill>
-                <a:schemeClr val="bg1"/>
-              </a:solidFill>
-            </a:endParaRPr>
+              <a:t>RestOrRant</a:t>
+            </a:r>
           </a:p>
           <a:p>
             <a:pPr algn="ctr"/>
@@ -4127,7 +4107,7 @@
           <a:lstStyle/>
           <a:p>
             <a:pPr algn="ctr"/>
-            <a:endParaRPr lang="en-SG" sz="1050" b="1">
+            <a:endParaRPr lang="en-SG" sz="1050" b="1" dirty="0">
               <a:solidFill>
                 <a:srgbClr val="92D050"/>
               </a:solidFill>
@@ -4181,13 +4161,13 @@
         <p:nvCxnSpPr>
           <p:cNvPr id="23" name="Straight Arrow Connector 57"/>
           <p:cNvCxnSpPr>
-            <a:stCxn id="5" idx="2"/>
+            <a:cxnSpLocks/>
           </p:cNvCxnSpPr>
           <p:nvPr/>
         </p:nvCxnSpPr>
         <p:spPr>
           <a:xfrm>
-            <a:off x="2329313" y="3930290"/>
+            <a:off x="2172427" y="3938243"/>
             <a:ext cx="1376" cy="854841"/>
           </a:xfrm>
           <a:prstGeom prst="straightConnector1">
@@ -4398,7 +4378,7 @@
             <a:lstStyle/>
             <a:p>
               <a:pPr algn="ctr"/>
-              <a:endParaRPr lang="en-SG"/>
+              <a:endParaRPr lang="en-SG" dirty="0"/>
             </a:p>
           </p:txBody>
         </p:sp>
@@ -4497,7 +4477,7 @@
             <a:lstStyle/>
             <a:p>
               <a:pPr algn="ctr"/>
-              <a:endParaRPr lang="en-SG"/>
+              <a:endParaRPr lang="en-SG" dirty="0"/>
             </a:p>
           </p:txBody>
         </p:sp>
@@ -4632,7 +4612,7 @@
           <a:p>
             <a:pPr algn="ctr"/>
             <a:r>
-              <a:rPr lang="en-US" sz="1050">
+              <a:rPr lang="en-US" sz="1050" dirty="0">
                 <a:solidFill>
                   <a:schemeClr val="bg1"/>
                 </a:solidFill>
@@ -4640,14 +4620,14 @@
               <a:t>Argument</a:t>
             </a:r>
             <a:br>
-              <a:rPr lang="en-US" sz="1050">
+              <a:rPr lang="en-US" sz="1050" dirty="0">
                 <a:solidFill>
                   <a:schemeClr val="bg1"/>
                 </a:solidFill>
               </a:rPr>
             </a:br>
             <a:r>
-              <a:rPr lang="en-US" sz="1050">
+              <a:rPr lang="en-US" sz="1050" dirty="0">
                 <a:solidFill>
                   <a:schemeClr val="bg1"/>
                 </a:solidFill>
@@ -4777,18 +4757,13 @@
           <a:p>
             <a:pPr algn="ctr"/>
             <a:r>
-              <a:rPr lang="en-SG" sz="1050" dirty="0" err="1">
+              <a:rPr lang="en-SG" sz="1050" dirty="0">
                 <a:solidFill>
                   <a:schemeClr val="bg1"/>
                 </a:solidFill>
               </a:rPr>
               <a:t>CliSyntax</a:t>
             </a:r>
-            <a:endParaRPr lang="en-SG" sz="1050" dirty="0">
-              <a:solidFill>
-                <a:schemeClr val="bg1"/>
-              </a:solidFill>
-            </a:endParaRPr>
           </a:p>
         </p:txBody>
       </p:sp>
@@ -4842,18 +4817,13 @@
           <a:p>
             <a:pPr algn="ctr"/>
             <a:r>
-              <a:rPr lang="en-SG" sz="1050" dirty="0" err="1">
+              <a:rPr lang="en-SG" sz="1050" dirty="0">
                 <a:solidFill>
                   <a:schemeClr val="bg1"/>
                 </a:solidFill>
               </a:rPr>
               <a:t>ParserUtil</a:t>
             </a:r>
-            <a:endParaRPr lang="en-SG" sz="1050" dirty="0">
-              <a:solidFill>
-                <a:schemeClr val="bg1"/>
-              </a:solidFill>
-            </a:endParaRPr>
           </a:p>
         </p:txBody>
       </p:sp>
@@ -5049,7 +5019,7 @@
             <a:lstStyle/>
             <a:p>
               <a:pPr algn="ctr"/>
-              <a:endParaRPr lang="en-SG"/>
+              <a:endParaRPr lang="en-SG" dirty="0"/>
             </a:p>
           </p:txBody>
         </p:sp>
@@ -5100,7 +5070,7 @@
           <a:lstStyle/>
           <a:p>
             <a:pPr algn="ctr"/>
-            <a:endParaRPr lang="en-SG" sz="1050" b="1">
+            <a:endParaRPr lang="en-SG" sz="1050" b="1" dirty="0">
               <a:solidFill>
                 <a:srgbClr val="92D050"/>
               </a:solidFill>
@@ -5409,7 +5379,7 @@
           <a:p>
             <a:pPr algn="ctr"/>
             <a:r>
-              <a:rPr lang="en-US" sz="1050">
+              <a:rPr lang="en-US" sz="1050" dirty="0">
                 <a:solidFill>
                   <a:schemeClr val="bg1"/>
                 </a:solidFill>
@@ -5621,7 +5591,7 @@
           <a:lstStyle/>
           <a:p>
             <a:pPr algn="ctr"/>
-            <a:endParaRPr lang="en-SG" sz="1050" b="1">
+            <a:endParaRPr lang="en-SG" sz="1050" b="1" dirty="0">
               <a:solidFill>
                 <a:srgbClr val="92D050"/>
               </a:solidFill>
@@ -5729,7 +5699,7 @@
             <a:lstStyle/>
             <a:p>
               <a:pPr algn="ctr"/>
-              <a:endParaRPr lang="en-SG"/>
+              <a:endParaRPr lang="en-SG" dirty="0"/>
             </a:p>
           </p:txBody>
         </p:sp>
@@ -5815,18 +5785,13 @@
           <a:p>
             <a:pPr algn="ctr"/>
             <a:r>
-              <a:rPr lang="en-US" sz="1050" b="1" dirty="0" err="1" smtClean="0">
+              <a:rPr lang="en-US" sz="1050" b="1" dirty="0">
                 <a:solidFill>
                   <a:schemeClr val="bg1"/>
                 </a:solidFill>
               </a:rPr>
               <a:t>XYZCommand</a:t>
             </a:r>
-            <a:endParaRPr lang="en-US" sz="1050" b="1" dirty="0">
-              <a:solidFill>
-                <a:schemeClr val="bg1"/>
-              </a:solidFill>
-            </a:endParaRPr>
           </a:p>
           <a:p>
             <a:pPr algn="ctr"/>
@@ -6165,54 +6130,75 @@
           <a:p>
             <a:pPr algn="ctr"/>
             <a:r>
-              <a:rPr lang="en-US" sz="1050" dirty="0" err="1" smtClean="0">
+              <a:rPr lang="en-US" sz="1050" dirty="0">
                 <a:solidFill>
                   <a:schemeClr val="bg1"/>
                 </a:solidFill>
               </a:rPr>
-              <a:t>XYZCommand</a:t>
-            </a:r>
-            <a:r>
-              <a:rPr lang="en-US" sz="1050" dirty="0" smtClean="0">
+              <a:t>XYZCommand = AddCommand, FindCommand, etc.</a:t>
+            </a:r>
+          </a:p>
+        </p:txBody>
+      </p:sp>
+      <p:sp>
+        <p:nvSpPr>
+          <p:cNvPr id="59" name="Rectangle 45">
+            <a:extLst>
+              <a:ext uri="{FF2B5EF4-FFF2-40B4-BE49-F238E27FC236}">
+                <a16:creationId xmlns:a16="http://schemas.microsoft.com/office/drawing/2014/main" id="{2F95C049-5343-4947-85B8-9F133DF3C05A}"/>
+              </a:ext>
+            </a:extLst>
+          </p:cNvPr>
+          <p:cNvSpPr/>
+          <p:nvPr/>
+        </p:nvSpPr>
+        <p:spPr>
+          <a:xfrm>
+            <a:off x="1048729" y="4790535"/>
+            <a:ext cx="1450501" cy="314865"/>
+          </a:xfrm>
+          <a:prstGeom prst="roundRect">
+            <a:avLst/>
+          </a:prstGeom>
+          <a:solidFill>
+            <a:schemeClr val="accent6">
+              <a:lumMod val="75000"/>
+              <a:alpha val="49000"/>
+            </a:schemeClr>
+          </a:solidFill>
+          <a:ln w="19050">
+            <a:noFill/>
+          </a:ln>
+          <a:effectLst/>
+        </p:spPr>
+        <p:style>
+          <a:lnRef idx="1">
+            <a:schemeClr val="accent5"/>
+          </a:lnRef>
+          <a:fillRef idx="2">
+            <a:schemeClr val="accent5"/>
+          </a:fillRef>
+          <a:effectRef idx="1">
+            <a:schemeClr val="accent5"/>
+          </a:effectRef>
+          <a:fontRef idx="minor">
+            <a:schemeClr val="dk1"/>
+          </a:fontRef>
+        </p:style>
+        <p:txBody>
+          <a:bodyPr rtlCol="0" anchor="ctr"/>
+          <a:lstStyle/>
+          <a:p>
+            <a:pPr algn="ctr"/>
+            <a:r>
+              <a:rPr lang="en-US" sz="1100" dirty="0">
                 <a:solidFill>
                   <a:schemeClr val="bg1"/>
                 </a:solidFill>
               </a:rPr>
-              <a:t> = </a:t>
-            </a:r>
-            <a:r>
-              <a:rPr lang="en-US" sz="1050" dirty="0" err="1" smtClean="0">
-                <a:solidFill>
-                  <a:schemeClr val="bg1"/>
-                </a:solidFill>
-              </a:rPr>
-              <a:t>AddCommand</a:t>
-            </a:r>
-            <a:r>
-              <a:rPr lang="en-US" sz="1050" dirty="0" smtClean="0">
-                <a:solidFill>
-                  <a:schemeClr val="bg1"/>
-                </a:solidFill>
-              </a:rPr>
-              <a:t>, </a:t>
-            </a:r>
-            <a:r>
-              <a:rPr lang="en-US" sz="1050" dirty="0" err="1" smtClean="0">
-                <a:solidFill>
-                  <a:schemeClr val="bg1"/>
-                </a:solidFill>
-              </a:rPr>
-              <a:t>FindCommand</a:t>
-            </a:r>
-            <a:r>
-              <a:rPr lang="en-US" sz="1050" dirty="0" smtClean="0">
-                <a:solidFill>
-                  <a:schemeClr val="bg1"/>
-                </a:solidFill>
-              </a:rPr>
-              <a:t>, etc.</a:t>
-            </a:r>
-            <a:endParaRPr lang="en-US" sz="1050" dirty="0">
+              <a:t>Storage</a:t>
+            </a:r>
+            <a:endParaRPr lang="en-SG" sz="1100" dirty="0">
               <a:solidFill>
                 <a:schemeClr val="bg1"/>
               </a:solidFill>
@@ -6220,6 +6206,50 @@
           </a:p>
         </p:txBody>
       </p:sp>
+      <p:cxnSp>
+        <p:nvCxnSpPr>
+          <p:cNvPr id="77" name="Straight Arrow Connector 57">
+            <a:extLst>
+              <a:ext uri="{FF2B5EF4-FFF2-40B4-BE49-F238E27FC236}">
+                <a16:creationId xmlns:a16="http://schemas.microsoft.com/office/drawing/2014/main" id="{4F7F001B-4EFC-2F42-A5C6-684F81A16684}"/>
+              </a:ext>
+            </a:extLst>
+          </p:cNvPr>
+          <p:cNvCxnSpPr/>
+          <p:nvPr/>
+        </p:nvCxnSpPr>
+        <p:spPr>
+          <a:xfrm>
+            <a:off x="2682816" y="3944054"/>
+            <a:ext cx="1376" cy="854841"/>
+          </a:xfrm>
+          <a:prstGeom prst="straightConnector1">
+            <a:avLst/>
+          </a:prstGeom>
+          <a:ln w="19050">
+            <a:solidFill>
+              <a:srgbClr val="0070C0"/>
+            </a:solidFill>
+            <a:headEnd type="none" w="med" len="med"/>
+            <a:tailEnd type="arrow" w="med" len="med"/>
+          </a:ln>
+          <a:effectLst/>
+        </p:spPr>
+        <p:style>
+          <a:lnRef idx="1">
+            <a:schemeClr val="accent2"/>
+          </a:lnRef>
+          <a:fillRef idx="2">
+            <a:schemeClr val="accent2"/>
+          </a:fillRef>
+          <a:effectRef idx="1">
+            <a:schemeClr val="accent2"/>
+          </a:effectRef>
+          <a:fontRef idx="minor">
+            <a:schemeClr val="dk1"/>
+          </a:fontRef>
+        </p:style>
+      </p:cxnSp>
     </p:spTree>
     <p:extLst>
       <p:ext uri="{BB962C8B-B14F-4D97-AF65-F5344CB8AC3E}">

</xml_diff>

<commit_message>
Updating the diagrams in Developer Guide
</commit_message>
<xml_diff>
--- a/docs/diagrams/LogicComponentClassDiagram.pptx
+++ b/docs/diagrams/LogicComponentClassDiagram.pptx
@@ -126,10 +126,6 @@
 </p:presentation>
 </file>
 
-<file path=ppt/revisionInfo.xml><?xml version="1.0" encoding="utf-8"?>
-<p1510:revInfo xmlns:a="http://schemas.openxmlformats.org/drawingml/2006/main" xmlns:r="http://schemas.openxmlformats.org/officeDocument/2006/relationships" xmlns:p1510="http://schemas.microsoft.com/office/powerpoint/2015/10/main"/>
-</file>
-
 <file path=ppt/notesMasters/notesMaster1.xml><?xml version="1.0" encoding="utf-8"?>
 <p:notesMaster xmlns:a="http://schemas.openxmlformats.org/drawingml/2006/main" xmlns:r="http://schemas.openxmlformats.org/officeDocument/2006/relationships" xmlns:p="http://schemas.openxmlformats.org/presentationml/2006/main">
   <p:cSld>
@@ -212,7 +208,7 @@
           <a:p>
             <a:fld id="{F5CC4B3F-88C1-4FFA-B1B6-F41C21DC6924}" type="datetimeFigureOut">
               <a:rPr lang="en-US" smtClean="0"/>
-              <a:t>4/16/2018</a:t>
+              <a:t>3/4/2019</a:t>
             </a:fld>
             <a:endParaRPr lang="en-US"/>
           </a:p>
@@ -658,7 +654,7 @@
           <a:p>
             <a:fld id="{78C97017-6FC3-485B-9764-EAC9E56C1D49}" type="datetimeFigureOut">
               <a:rPr lang="en-US" smtClean="0"/>
-              <a:t>4/16/2018</a:t>
+              <a:t>3/4/2019</a:t>
             </a:fld>
             <a:endParaRPr lang="en-US"/>
           </a:p>
@@ -826,7 +822,7 @@
           <a:p>
             <a:fld id="{78C97017-6FC3-485B-9764-EAC9E56C1D49}" type="datetimeFigureOut">
               <a:rPr lang="en-US" smtClean="0"/>
-              <a:t>4/16/2018</a:t>
+              <a:t>3/4/2019</a:t>
             </a:fld>
             <a:endParaRPr lang="en-US"/>
           </a:p>
@@ -1004,7 +1000,7 @@
           <a:p>
             <a:fld id="{78C97017-6FC3-485B-9764-EAC9E56C1D49}" type="datetimeFigureOut">
               <a:rPr lang="en-US" smtClean="0"/>
-              <a:t>4/16/2018</a:t>
+              <a:t>3/4/2019</a:t>
             </a:fld>
             <a:endParaRPr lang="en-US"/>
           </a:p>
@@ -1172,7 +1168,7 @@
           <a:p>
             <a:fld id="{78C97017-6FC3-485B-9764-EAC9E56C1D49}" type="datetimeFigureOut">
               <a:rPr lang="en-US" smtClean="0"/>
-              <a:t>4/16/2018</a:t>
+              <a:t>3/4/2019</a:t>
             </a:fld>
             <a:endParaRPr lang="en-US"/>
           </a:p>
@@ -1417,7 +1413,7 @@
           <a:p>
             <a:fld id="{78C97017-6FC3-485B-9764-EAC9E56C1D49}" type="datetimeFigureOut">
               <a:rPr lang="en-US" smtClean="0"/>
-              <a:t>4/16/2018</a:t>
+              <a:t>3/4/2019</a:t>
             </a:fld>
             <a:endParaRPr lang="en-US"/>
           </a:p>
@@ -1702,7 +1698,7 @@
           <a:p>
             <a:fld id="{78C97017-6FC3-485B-9764-EAC9E56C1D49}" type="datetimeFigureOut">
               <a:rPr lang="en-US" smtClean="0"/>
-              <a:t>4/16/2018</a:t>
+              <a:t>3/4/2019</a:t>
             </a:fld>
             <a:endParaRPr lang="en-US"/>
           </a:p>
@@ -2121,7 +2117,7 @@
           <a:p>
             <a:fld id="{78C97017-6FC3-485B-9764-EAC9E56C1D49}" type="datetimeFigureOut">
               <a:rPr lang="en-US" smtClean="0"/>
-              <a:t>4/16/2018</a:t>
+              <a:t>3/4/2019</a:t>
             </a:fld>
             <a:endParaRPr lang="en-US"/>
           </a:p>
@@ -2238,7 +2234,7 @@
           <a:p>
             <a:fld id="{78C97017-6FC3-485B-9764-EAC9E56C1D49}" type="datetimeFigureOut">
               <a:rPr lang="en-US" smtClean="0"/>
-              <a:t>4/16/2018</a:t>
+              <a:t>3/4/2019</a:t>
             </a:fld>
             <a:endParaRPr lang="en-US"/>
           </a:p>
@@ -2333,7 +2329,7 @@
           <a:p>
             <a:fld id="{78C97017-6FC3-485B-9764-EAC9E56C1D49}" type="datetimeFigureOut">
               <a:rPr lang="en-US" smtClean="0"/>
-              <a:t>4/16/2018</a:t>
+              <a:t>3/4/2019</a:t>
             </a:fld>
             <a:endParaRPr lang="en-US"/>
           </a:p>
@@ -2608,7 +2604,7 @@
           <a:p>
             <a:fld id="{78C97017-6FC3-485B-9764-EAC9E56C1D49}" type="datetimeFigureOut">
               <a:rPr lang="en-US" smtClean="0"/>
-              <a:t>4/16/2018</a:t>
+              <a:t>3/4/2019</a:t>
             </a:fld>
             <a:endParaRPr lang="en-US"/>
           </a:p>
@@ -2860,7 +2856,7 @@
           <a:p>
             <a:fld id="{78C97017-6FC3-485B-9764-EAC9E56C1D49}" type="datetimeFigureOut">
               <a:rPr lang="en-US" smtClean="0"/>
-              <a:t>4/16/2018</a:t>
+              <a:t>3/4/2019</a:t>
             </a:fld>
             <a:endParaRPr lang="en-US"/>
           </a:p>
@@ -3071,7 +3067,7 @@
           <a:p>
             <a:fld id="{78C97017-6FC3-485B-9764-EAC9E56C1D49}" type="datetimeFigureOut">
               <a:rPr lang="en-US" smtClean="0"/>
-              <a:t>4/16/2018</a:t>
+              <a:t>3/4/2019</a:t>
             </a:fld>
             <a:endParaRPr lang="en-US"/>
           </a:p>
@@ -3607,7 +3603,7 @@
           <a:p>
             <a:pPr algn="ctr"/>
             <a:r>
-              <a:rPr lang="en-US" sz="1050" b="1" dirty="0" err="1" smtClean="0">
+              <a:rPr lang="en-US" sz="1050" b="1" dirty="0" err="1">
                 <a:solidFill>
                   <a:srgbClr val="0070C0"/>
                 </a:solidFill>
@@ -3939,12 +3935,12 @@
           <a:p>
             <a:pPr algn="ctr"/>
             <a:r>
-              <a:rPr lang="en-US" sz="1050" dirty="0" err="1" smtClean="0">
+              <a:rPr lang="en-US" sz="1050" dirty="0" err="1">
                 <a:solidFill>
                   <a:schemeClr val="bg1"/>
                 </a:solidFill>
               </a:rPr>
-              <a:t>AddressBook</a:t>
+              <a:t>BookShelf</a:t>
             </a:r>
             <a:endParaRPr lang="en-US" sz="1050" dirty="0">
               <a:solidFill>
@@ -5815,7 +5811,7 @@
           <a:p>
             <a:pPr algn="ctr"/>
             <a:r>
-              <a:rPr lang="en-US" sz="1050" b="1" dirty="0" err="1" smtClean="0">
+              <a:rPr lang="en-US" sz="1050" b="1" dirty="0" err="1">
                 <a:solidFill>
                   <a:schemeClr val="bg1"/>
                 </a:solidFill>
@@ -6165,7 +6161,7 @@
           <a:p>
             <a:pPr algn="ctr"/>
             <a:r>
-              <a:rPr lang="en-US" sz="1050" dirty="0" err="1" smtClean="0">
+              <a:rPr lang="en-US" sz="1050" dirty="0" err="1">
                 <a:solidFill>
                   <a:schemeClr val="bg1"/>
                 </a:solidFill>
@@ -6173,7 +6169,7 @@
               <a:t>XYZCommand</a:t>
             </a:r>
             <a:r>
-              <a:rPr lang="en-US" sz="1050" dirty="0" smtClean="0">
+              <a:rPr lang="en-US" sz="1050" dirty="0">
                 <a:solidFill>
                   <a:schemeClr val="bg1"/>
                 </a:solidFill>
@@ -6181,7 +6177,7 @@
               <a:t> = </a:t>
             </a:r>
             <a:r>
-              <a:rPr lang="en-US" sz="1050" dirty="0" err="1" smtClean="0">
+              <a:rPr lang="en-US" sz="1050" dirty="0" err="1">
                 <a:solidFill>
                   <a:schemeClr val="bg1"/>
                 </a:solidFill>
@@ -6189,7 +6185,7 @@
               <a:t>AddCommand</a:t>
             </a:r>
             <a:r>
-              <a:rPr lang="en-US" sz="1050" dirty="0" smtClean="0">
+              <a:rPr lang="en-US" sz="1050" dirty="0">
                 <a:solidFill>
                   <a:schemeClr val="bg1"/>
                 </a:solidFill>
@@ -6197,7 +6193,7 @@
               <a:t>, </a:t>
             </a:r>
             <a:r>
-              <a:rPr lang="en-US" sz="1050" dirty="0" err="1" smtClean="0">
+              <a:rPr lang="en-US" sz="1050" dirty="0" err="1">
                 <a:solidFill>
                   <a:schemeClr val="bg1"/>
                 </a:solidFill>
@@ -6205,18 +6201,13 @@
               <a:t>FindCommand</a:t>
             </a:r>
             <a:r>
-              <a:rPr lang="en-US" sz="1050" dirty="0" smtClean="0">
+              <a:rPr lang="en-US" sz="1050" dirty="0">
                 <a:solidFill>
                   <a:schemeClr val="bg1"/>
                 </a:solidFill>
               </a:rPr>
               <a:t>, etc.</a:t>
             </a:r>
-            <a:endParaRPr lang="en-US" sz="1050" dirty="0">
-              <a:solidFill>
-                <a:schemeClr val="bg1"/>
-              </a:solidFill>
-            </a:endParaRPr>
           </a:p>
         </p:txBody>
       </p:sp>

</xml_diff>

<commit_message>
addBookCommand, update some test partially
</commit_message>
<xml_diff>
--- a/docs/diagrams/LogicComponentClassDiagram.pptx
+++ b/docs/diagrams/LogicComponentClassDiagram.pptx
@@ -126,10 +126,6 @@
 </p:presentation>
 </file>
 
-<file path=ppt/revisionInfo.xml><?xml version="1.0" encoding="utf-8"?>
-<p1510:revInfo xmlns:a="http://schemas.openxmlformats.org/drawingml/2006/main" xmlns:r="http://schemas.openxmlformats.org/officeDocument/2006/relationships" xmlns:p1510="http://schemas.microsoft.com/office/powerpoint/2015/10/main"/>
-</file>
-
 <file path=ppt/notesMasters/notesMaster1.xml><?xml version="1.0" encoding="utf-8"?>
 <p:notesMaster xmlns:a="http://schemas.openxmlformats.org/drawingml/2006/main" xmlns:r="http://schemas.openxmlformats.org/officeDocument/2006/relationships" xmlns:p="http://schemas.openxmlformats.org/presentationml/2006/main">
   <p:cSld>
@@ -212,7 +208,7 @@
           <a:p>
             <a:fld id="{F5CC4B3F-88C1-4FFA-B1B6-F41C21DC6924}" type="datetimeFigureOut">
               <a:rPr lang="en-US" smtClean="0"/>
-              <a:t>4/16/2018</a:t>
+              <a:t>3/4/2019</a:t>
             </a:fld>
             <a:endParaRPr lang="en-US"/>
           </a:p>
@@ -658,7 +654,7 @@
           <a:p>
             <a:fld id="{78C97017-6FC3-485B-9764-EAC9E56C1D49}" type="datetimeFigureOut">
               <a:rPr lang="en-US" smtClean="0"/>
-              <a:t>4/16/2018</a:t>
+              <a:t>3/4/2019</a:t>
             </a:fld>
             <a:endParaRPr lang="en-US"/>
           </a:p>
@@ -826,7 +822,7 @@
           <a:p>
             <a:fld id="{78C97017-6FC3-485B-9764-EAC9E56C1D49}" type="datetimeFigureOut">
               <a:rPr lang="en-US" smtClean="0"/>
-              <a:t>4/16/2018</a:t>
+              <a:t>3/4/2019</a:t>
             </a:fld>
             <a:endParaRPr lang="en-US"/>
           </a:p>
@@ -1004,7 +1000,7 @@
           <a:p>
             <a:fld id="{78C97017-6FC3-485B-9764-EAC9E56C1D49}" type="datetimeFigureOut">
               <a:rPr lang="en-US" smtClean="0"/>
-              <a:t>4/16/2018</a:t>
+              <a:t>3/4/2019</a:t>
             </a:fld>
             <a:endParaRPr lang="en-US"/>
           </a:p>
@@ -1172,7 +1168,7 @@
           <a:p>
             <a:fld id="{78C97017-6FC3-485B-9764-EAC9E56C1D49}" type="datetimeFigureOut">
               <a:rPr lang="en-US" smtClean="0"/>
-              <a:t>4/16/2018</a:t>
+              <a:t>3/4/2019</a:t>
             </a:fld>
             <a:endParaRPr lang="en-US"/>
           </a:p>
@@ -1417,7 +1413,7 @@
           <a:p>
             <a:fld id="{78C97017-6FC3-485B-9764-EAC9E56C1D49}" type="datetimeFigureOut">
               <a:rPr lang="en-US" smtClean="0"/>
-              <a:t>4/16/2018</a:t>
+              <a:t>3/4/2019</a:t>
             </a:fld>
             <a:endParaRPr lang="en-US"/>
           </a:p>
@@ -1702,7 +1698,7 @@
           <a:p>
             <a:fld id="{78C97017-6FC3-485B-9764-EAC9E56C1D49}" type="datetimeFigureOut">
               <a:rPr lang="en-US" smtClean="0"/>
-              <a:t>4/16/2018</a:t>
+              <a:t>3/4/2019</a:t>
             </a:fld>
             <a:endParaRPr lang="en-US"/>
           </a:p>
@@ -2121,7 +2117,7 @@
           <a:p>
             <a:fld id="{78C97017-6FC3-485B-9764-EAC9E56C1D49}" type="datetimeFigureOut">
               <a:rPr lang="en-US" smtClean="0"/>
-              <a:t>4/16/2018</a:t>
+              <a:t>3/4/2019</a:t>
             </a:fld>
             <a:endParaRPr lang="en-US"/>
           </a:p>
@@ -2238,7 +2234,7 @@
           <a:p>
             <a:fld id="{78C97017-6FC3-485B-9764-EAC9E56C1D49}" type="datetimeFigureOut">
               <a:rPr lang="en-US" smtClean="0"/>
-              <a:t>4/16/2018</a:t>
+              <a:t>3/4/2019</a:t>
             </a:fld>
             <a:endParaRPr lang="en-US"/>
           </a:p>
@@ -2333,7 +2329,7 @@
           <a:p>
             <a:fld id="{78C97017-6FC3-485B-9764-EAC9E56C1D49}" type="datetimeFigureOut">
               <a:rPr lang="en-US" smtClean="0"/>
-              <a:t>4/16/2018</a:t>
+              <a:t>3/4/2019</a:t>
             </a:fld>
             <a:endParaRPr lang="en-US"/>
           </a:p>
@@ -2608,7 +2604,7 @@
           <a:p>
             <a:fld id="{78C97017-6FC3-485B-9764-EAC9E56C1D49}" type="datetimeFigureOut">
               <a:rPr lang="en-US" smtClean="0"/>
-              <a:t>4/16/2018</a:t>
+              <a:t>3/4/2019</a:t>
             </a:fld>
             <a:endParaRPr lang="en-US"/>
           </a:p>
@@ -2860,7 +2856,7 @@
           <a:p>
             <a:fld id="{78C97017-6FC3-485B-9764-EAC9E56C1D49}" type="datetimeFigureOut">
               <a:rPr lang="en-US" smtClean="0"/>
-              <a:t>4/16/2018</a:t>
+              <a:t>3/4/2019</a:t>
             </a:fld>
             <a:endParaRPr lang="en-US"/>
           </a:p>
@@ -3071,7 +3067,7 @@
           <a:p>
             <a:fld id="{78C97017-6FC3-485B-9764-EAC9E56C1D49}" type="datetimeFigureOut">
               <a:rPr lang="en-US" smtClean="0"/>
-              <a:t>4/16/2018</a:t>
+              <a:t>3/4/2019</a:t>
             </a:fld>
             <a:endParaRPr lang="en-US"/>
           </a:p>
@@ -3607,7 +3603,7 @@
           <a:p>
             <a:pPr algn="ctr"/>
             <a:r>
-              <a:rPr lang="en-US" sz="1050" b="1" dirty="0" err="1" smtClean="0">
+              <a:rPr lang="en-US" sz="1050" b="1" dirty="0" err="1">
                 <a:solidFill>
                   <a:srgbClr val="0070C0"/>
                 </a:solidFill>
@@ -3939,12 +3935,12 @@
           <a:p>
             <a:pPr algn="ctr"/>
             <a:r>
-              <a:rPr lang="en-US" sz="1050" dirty="0" err="1" smtClean="0">
+              <a:rPr lang="en-US" sz="1050" dirty="0" err="1">
                 <a:solidFill>
                   <a:schemeClr val="bg1"/>
                 </a:solidFill>
               </a:rPr>
-              <a:t>AddressBook</a:t>
+              <a:t>BookShelf</a:t>
             </a:r>
             <a:endParaRPr lang="en-US" sz="1050" dirty="0">
               <a:solidFill>
@@ -5815,7 +5811,7 @@
           <a:p>
             <a:pPr algn="ctr"/>
             <a:r>
-              <a:rPr lang="en-US" sz="1050" b="1" dirty="0" err="1" smtClean="0">
+              <a:rPr lang="en-US" sz="1050" b="1" dirty="0" err="1">
                 <a:solidFill>
                   <a:schemeClr val="bg1"/>
                 </a:solidFill>
@@ -6165,7 +6161,7 @@
           <a:p>
             <a:pPr algn="ctr"/>
             <a:r>
-              <a:rPr lang="en-US" sz="1050" dirty="0" err="1" smtClean="0">
+              <a:rPr lang="en-US" sz="1050" dirty="0" err="1">
                 <a:solidFill>
                   <a:schemeClr val="bg1"/>
                 </a:solidFill>
@@ -6173,7 +6169,7 @@
               <a:t>XYZCommand</a:t>
             </a:r>
             <a:r>
-              <a:rPr lang="en-US" sz="1050" dirty="0" smtClean="0">
+              <a:rPr lang="en-US" sz="1050" dirty="0">
                 <a:solidFill>
                   <a:schemeClr val="bg1"/>
                 </a:solidFill>
@@ -6181,7 +6177,7 @@
               <a:t> = </a:t>
             </a:r>
             <a:r>
-              <a:rPr lang="en-US" sz="1050" dirty="0" err="1" smtClean="0">
+              <a:rPr lang="en-US" sz="1050" dirty="0" err="1">
                 <a:solidFill>
                   <a:schemeClr val="bg1"/>
                 </a:solidFill>
@@ -6189,7 +6185,7 @@
               <a:t>AddCommand</a:t>
             </a:r>
             <a:r>
-              <a:rPr lang="en-US" sz="1050" dirty="0" smtClean="0">
+              <a:rPr lang="en-US" sz="1050" dirty="0">
                 <a:solidFill>
                   <a:schemeClr val="bg1"/>
                 </a:solidFill>
@@ -6197,7 +6193,7 @@
               <a:t>, </a:t>
             </a:r>
             <a:r>
-              <a:rPr lang="en-US" sz="1050" dirty="0" err="1" smtClean="0">
+              <a:rPr lang="en-US" sz="1050" dirty="0" err="1">
                 <a:solidFill>
                   <a:schemeClr val="bg1"/>
                 </a:solidFill>
@@ -6205,18 +6201,13 @@
               <a:t>FindCommand</a:t>
             </a:r>
             <a:r>
-              <a:rPr lang="en-US" sz="1050" dirty="0" smtClean="0">
+              <a:rPr lang="en-US" sz="1050" dirty="0">
                 <a:solidFill>
                   <a:schemeClr val="bg1"/>
                 </a:solidFill>
               </a:rPr>
               <a:t>, etc.</a:t>
             </a:r>
-            <a:endParaRPr lang="en-US" sz="1050" dirty="0">
-              <a:solidFill>
-                <a:schemeClr val="bg1"/>
-              </a:solidFill>
-            </a:endParaRPr>
           </a:p>
         </p:txBody>
       </p:sp>

</xml_diff>

<commit_message>
update class diagrams for all 4 components
</commit_message>
<xml_diff>
--- a/docs/diagrams/LogicComponentClassDiagram.pptx
+++ b/docs/diagrams/LogicComponentClassDiagram.pptx
@@ -126,10 +126,6 @@
 </p:presentation>
 </file>
 
-<file path=ppt/revisionInfo.xml><?xml version="1.0" encoding="utf-8"?>
-<p1510:revInfo xmlns:a="http://schemas.openxmlformats.org/drawingml/2006/main" xmlns:r="http://schemas.openxmlformats.org/officeDocument/2006/relationships" xmlns:p1510="http://schemas.microsoft.com/office/powerpoint/2015/10/main"/>
-</file>
-
 <file path=ppt/notesMasters/notesMaster1.xml><?xml version="1.0" encoding="utf-8"?>
 <p:notesMaster xmlns:a="http://schemas.openxmlformats.org/drawingml/2006/main" xmlns:r="http://schemas.openxmlformats.org/officeDocument/2006/relationships" xmlns:p="http://schemas.openxmlformats.org/presentationml/2006/main">
   <p:cSld>
@@ -212,7 +208,7 @@
           <a:p>
             <a:fld id="{F5CC4B3F-88C1-4FFA-B1B6-F41C21DC6924}" type="datetimeFigureOut">
               <a:rPr lang="en-US" smtClean="0"/>
-              <a:t>4/16/2018</a:t>
+              <a:t>3/10/19</a:t>
             </a:fld>
             <a:endParaRPr lang="en-US"/>
           </a:p>
@@ -658,7 +654,7 @@
           <a:p>
             <a:fld id="{78C97017-6FC3-485B-9764-EAC9E56C1D49}" type="datetimeFigureOut">
               <a:rPr lang="en-US" smtClean="0"/>
-              <a:t>4/16/2018</a:t>
+              <a:t>3/10/19</a:t>
             </a:fld>
             <a:endParaRPr lang="en-US"/>
           </a:p>
@@ -826,7 +822,7 @@
           <a:p>
             <a:fld id="{78C97017-6FC3-485B-9764-EAC9E56C1D49}" type="datetimeFigureOut">
               <a:rPr lang="en-US" smtClean="0"/>
-              <a:t>4/16/2018</a:t>
+              <a:t>3/10/19</a:t>
             </a:fld>
             <a:endParaRPr lang="en-US"/>
           </a:p>
@@ -1004,7 +1000,7 @@
           <a:p>
             <a:fld id="{78C97017-6FC3-485B-9764-EAC9E56C1D49}" type="datetimeFigureOut">
               <a:rPr lang="en-US" smtClean="0"/>
-              <a:t>4/16/2018</a:t>
+              <a:t>3/10/19</a:t>
             </a:fld>
             <a:endParaRPr lang="en-US"/>
           </a:p>
@@ -1172,7 +1168,7 @@
           <a:p>
             <a:fld id="{78C97017-6FC3-485B-9764-EAC9E56C1D49}" type="datetimeFigureOut">
               <a:rPr lang="en-US" smtClean="0"/>
-              <a:t>4/16/2018</a:t>
+              <a:t>3/10/19</a:t>
             </a:fld>
             <a:endParaRPr lang="en-US"/>
           </a:p>
@@ -1417,7 +1413,7 @@
           <a:p>
             <a:fld id="{78C97017-6FC3-485B-9764-EAC9E56C1D49}" type="datetimeFigureOut">
               <a:rPr lang="en-US" smtClean="0"/>
-              <a:t>4/16/2018</a:t>
+              <a:t>3/10/19</a:t>
             </a:fld>
             <a:endParaRPr lang="en-US"/>
           </a:p>
@@ -1702,7 +1698,7 @@
           <a:p>
             <a:fld id="{78C97017-6FC3-485B-9764-EAC9E56C1D49}" type="datetimeFigureOut">
               <a:rPr lang="en-US" smtClean="0"/>
-              <a:t>4/16/2018</a:t>
+              <a:t>3/10/19</a:t>
             </a:fld>
             <a:endParaRPr lang="en-US"/>
           </a:p>
@@ -2121,7 +2117,7 @@
           <a:p>
             <a:fld id="{78C97017-6FC3-485B-9764-EAC9E56C1D49}" type="datetimeFigureOut">
               <a:rPr lang="en-US" smtClean="0"/>
-              <a:t>4/16/2018</a:t>
+              <a:t>3/10/19</a:t>
             </a:fld>
             <a:endParaRPr lang="en-US"/>
           </a:p>
@@ -2238,7 +2234,7 @@
           <a:p>
             <a:fld id="{78C97017-6FC3-485B-9764-EAC9E56C1D49}" type="datetimeFigureOut">
               <a:rPr lang="en-US" smtClean="0"/>
-              <a:t>4/16/2018</a:t>
+              <a:t>3/10/19</a:t>
             </a:fld>
             <a:endParaRPr lang="en-US"/>
           </a:p>
@@ -2333,7 +2329,7 @@
           <a:p>
             <a:fld id="{78C97017-6FC3-485B-9764-EAC9E56C1D49}" type="datetimeFigureOut">
               <a:rPr lang="en-US" smtClean="0"/>
-              <a:t>4/16/2018</a:t>
+              <a:t>3/10/19</a:t>
             </a:fld>
             <a:endParaRPr lang="en-US"/>
           </a:p>
@@ -2608,7 +2604,7 @@
           <a:p>
             <a:fld id="{78C97017-6FC3-485B-9764-EAC9E56C1D49}" type="datetimeFigureOut">
               <a:rPr lang="en-US" smtClean="0"/>
-              <a:t>4/16/2018</a:t>
+              <a:t>3/10/19</a:t>
             </a:fld>
             <a:endParaRPr lang="en-US"/>
           </a:p>
@@ -2860,7 +2856,7 @@
           <a:p>
             <a:fld id="{78C97017-6FC3-485B-9764-EAC9E56C1D49}" type="datetimeFigureOut">
               <a:rPr lang="en-US" smtClean="0"/>
-              <a:t>4/16/2018</a:t>
+              <a:t>3/10/19</a:t>
             </a:fld>
             <a:endParaRPr lang="en-US"/>
           </a:p>
@@ -3071,7 +3067,7 @@
           <a:p>
             <a:fld id="{78C97017-6FC3-485B-9764-EAC9E56C1D49}" type="datetimeFigureOut">
               <a:rPr lang="en-US" smtClean="0"/>
-              <a:t>4/16/2018</a:t>
+              <a:t>3/10/19</a:t>
             </a:fld>
             <a:endParaRPr lang="en-US"/>
           </a:p>
@@ -3551,7 +3547,7 @@
           <a:p>
             <a:pPr algn="ctr"/>
             <a:r>
-              <a:rPr lang="en-US" sz="1050" dirty="0" err="1">
+              <a:rPr lang="en-US" sz="1050" dirty="0">
                 <a:solidFill>
                   <a:schemeClr val="bg1"/>
                 </a:solidFill>
@@ -3607,7 +3603,7 @@
           <a:p>
             <a:pPr algn="ctr"/>
             <a:r>
-              <a:rPr lang="en-US" sz="1050" b="1" dirty="0" err="1" smtClean="0">
+              <a:rPr lang="en-US" sz="1050" b="1" dirty="0">
                 <a:solidFill>
                   <a:srgbClr val="0070C0"/>
                 </a:solidFill>
@@ -3666,7 +3662,7 @@
           <a:p>
             <a:pPr algn="ctr"/>
             <a:r>
-              <a:rPr lang="en-US" sz="1050" dirty="0" err="1">
+              <a:rPr lang="en-US" sz="1050" dirty="0">
                 <a:solidFill>
                   <a:schemeClr val="bg1"/>
                 </a:solidFill>
@@ -3908,7 +3904,7 @@
         <p:spPr>
           <a:xfrm>
             <a:off x="3255418" y="3554995"/>
-            <a:ext cx="1045323" cy="384497"/>
+            <a:ext cx="1295330" cy="384497"/>
           </a:xfrm>
           <a:prstGeom prst="rect">
             <a:avLst/>
@@ -3939,18 +3935,13 @@
           <a:p>
             <a:pPr algn="ctr"/>
             <a:r>
-              <a:rPr lang="en-US" sz="1050" dirty="0" err="1" smtClean="0">
+              <a:rPr lang="en-US" sz="1050" dirty="0">
                 <a:solidFill>
                   <a:schemeClr val="bg1"/>
                 </a:solidFill>
               </a:rPr>
-              <a:t>AddressBook</a:t>
-            </a:r>
-            <a:endParaRPr lang="en-US" sz="1050" dirty="0">
-              <a:solidFill>
-                <a:schemeClr val="bg1"/>
-              </a:solidFill>
-            </a:endParaRPr>
+              <a:t>EquipmentManager</a:t>
+            </a:r>
           </a:p>
           <a:p>
             <a:pPr algn="ctr"/>
@@ -4777,18 +4768,13 @@
           <a:p>
             <a:pPr algn="ctr"/>
             <a:r>
-              <a:rPr lang="en-SG" sz="1050" dirty="0" err="1">
+              <a:rPr lang="en-SG" sz="1050" dirty="0">
                 <a:solidFill>
                   <a:schemeClr val="bg1"/>
                 </a:solidFill>
               </a:rPr>
               <a:t>CliSyntax</a:t>
             </a:r>
-            <a:endParaRPr lang="en-SG" sz="1050" dirty="0">
-              <a:solidFill>
-                <a:schemeClr val="bg1"/>
-              </a:solidFill>
-            </a:endParaRPr>
           </a:p>
         </p:txBody>
       </p:sp>
@@ -4842,18 +4828,13 @@
           <a:p>
             <a:pPr algn="ctr"/>
             <a:r>
-              <a:rPr lang="en-SG" sz="1050" dirty="0" err="1">
+              <a:rPr lang="en-SG" sz="1050" dirty="0">
                 <a:solidFill>
                   <a:schemeClr val="bg1"/>
                 </a:solidFill>
               </a:rPr>
               <a:t>ParserUtil</a:t>
             </a:r>
-            <a:endParaRPr lang="en-SG" sz="1050" dirty="0">
-              <a:solidFill>
-                <a:schemeClr val="bg1"/>
-              </a:solidFill>
-            </a:endParaRPr>
           </a:p>
         </p:txBody>
       </p:sp>
@@ -5815,18 +5796,13 @@
           <a:p>
             <a:pPr algn="ctr"/>
             <a:r>
-              <a:rPr lang="en-US" sz="1050" b="1" dirty="0" err="1" smtClean="0">
+              <a:rPr lang="en-US" sz="1050" b="1" dirty="0">
                 <a:solidFill>
                   <a:schemeClr val="bg1"/>
                 </a:solidFill>
               </a:rPr>
               <a:t>XYZCommand</a:t>
             </a:r>
-            <a:endParaRPr lang="en-US" sz="1050" b="1" dirty="0">
-              <a:solidFill>
-                <a:schemeClr val="bg1"/>
-              </a:solidFill>
-            </a:endParaRPr>
           </a:p>
           <a:p>
             <a:pPr algn="ctr"/>
@@ -6038,6 +6014,7 @@
         <p:nvCxnSpPr>
           <p:cNvPr id="51" name="Elbow Connector 50"/>
           <p:cNvCxnSpPr>
+            <a:cxnSpLocks/>
             <a:stCxn id="16" idx="3"/>
             <a:endCxn id="42" idx="2"/>
           </p:cNvCxnSpPr>
@@ -6045,8 +6022,8 @@
         </p:nvCxnSpPr>
         <p:spPr>
           <a:xfrm flipV="1">
-            <a:off x="4300741" y="3087571"/>
-            <a:ext cx="1269594" cy="659673"/>
+            <a:off x="4550748" y="3087571"/>
+            <a:ext cx="1019587" cy="659673"/>
           </a:xfrm>
           <a:prstGeom prst="bentConnector2">
             <a:avLst/>
@@ -6165,58 +6142,13 @@
           <a:p>
             <a:pPr algn="ctr"/>
             <a:r>
-              <a:rPr lang="en-US" sz="1050" dirty="0" err="1" smtClean="0">
+              <a:rPr lang="en-US" sz="1050" dirty="0">
                 <a:solidFill>
                   <a:schemeClr val="bg1"/>
                 </a:solidFill>
               </a:rPr>
-              <a:t>XYZCommand</a:t>
-            </a:r>
-            <a:r>
-              <a:rPr lang="en-US" sz="1050" dirty="0" smtClean="0">
-                <a:solidFill>
-                  <a:schemeClr val="bg1"/>
-                </a:solidFill>
-              </a:rPr>
-              <a:t> = </a:t>
-            </a:r>
-            <a:r>
-              <a:rPr lang="en-US" sz="1050" dirty="0" err="1" smtClean="0">
-                <a:solidFill>
-                  <a:schemeClr val="bg1"/>
-                </a:solidFill>
-              </a:rPr>
-              <a:t>AddCommand</a:t>
-            </a:r>
-            <a:r>
-              <a:rPr lang="en-US" sz="1050" dirty="0" smtClean="0">
-                <a:solidFill>
-                  <a:schemeClr val="bg1"/>
-                </a:solidFill>
-              </a:rPr>
-              <a:t>, </a:t>
-            </a:r>
-            <a:r>
-              <a:rPr lang="en-US" sz="1050" dirty="0" err="1" smtClean="0">
-                <a:solidFill>
-                  <a:schemeClr val="bg1"/>
-                </a:solidFill>
-              </a:rPr>
-              <a:t>FindCommand</a:t>
-            </a:r>
-            <a:r>
-              <a:rPr lang="en-US" sz="1050" dirty="0" smtClean="0">
-                <a:solidFill>
-                  <a:schemeClr val="bg1"/>
-                </a:solidFill>
-              </a:rPr>
-              <a:t>, etc.</a:t>
-            </a:r>
-            <a:endParaRPr lang="en-US" sz="1050" dirty="0">
-              <a:solidFill>
-                <a:schemeClr val="bg1"/>
-              </a:solidFill>
-            </a:endParaRPr>
+              <a:t>XYZCommand = AddCommand, FindCommand, etc.</a:t>
+            </a:r>
           </a:p>
         </p:txBody>
       </p:sp>

</xml_diff>

<commit_message>
Remove all traces of AddressBook from Dev Guide
</commit_message>
<xml_diff>
--- a/docs/diagrams/LogicComponentClassDiagram.pptx
+++ b/docs/diagrams/LogicComponentClassDiagram.pptx
@@ -126,10 +126,6 @@
 </p:presentation>
 </file>
 
-<file path=ppt/revisionInfo.xml><?xml version="1.0" encoding="utf-8"?>
-<p1510:revInfo xmlns:a="http://schemas.openxmlformats.org/drawingml/2006/main" xmlns:r="http://schemas.openxmlformats.org/officeDocument/2006/relationships" xmlns:p1510="http://schemas.microsoft.com/office/powerpoint/2015/10/main"/>
-</file>
-
 <file path=ppt/notesMasters/notesMaster1.xml><?xml version="1.0" encoding="utf-8"?>
 <p:notesMaster xmlns:a="http://schemas.openxmlformats.org/drawingml/2006/main" xmlns:r="http://schemas.openxmlformats.org/officeDocument/2006/relationships" xmlns:p="http://schemas.openxmlformats.org/presentationml/2006/main">
   <p:cSld>
@@ -212,7 +208,7 @@
           <a:p>
             <a:fld id="{F5CC4B3F-88C1-4FFA-B1B6-F41C21DC6924}" type="datetimeFigureOut">
               <a:rPr lang="en-US" smtClean="0"/>
-              <a:t>4/16/2018</a:t>
+              <a:t>3/20/2019</a:t>
             </a:fld>
             <a:endParaRPr lang="en-US"/>
           </a:p>
@@ -658,7 +654,7 @@
           <a:p>
             <a:fld id="{78C97017-6FC3-485B-9764-EAC9E56C1D49}" type="datetimeFigureOut">
               <a:rPr lang="en-US" smtClean="0"/>
-              <a:t>4/16/2018</a:t>
+              <a:t>3/20/2019</a:t>
             </a:fld>
             <a:endParaRPr lang="en-US"/>
           </a:p>
@@ -826,7 +822,7 @@
           <a:p>
             <a:fld id="{78C97017-6FC3-485B-9764-EAC9E56C1D49}" type="datetimeFigureOut">
               <a:rPr lang="en-US" smtClean="0"/>
-              <a:t>4/16/2018</a:t>
+              <a:t>3/20/2019</a:t>
             </a:fld>
             <a:endParaRPr lang="en-US"/>
           </a:p>
@@ -1004,7 +1000,7 @@
           <a:p>
             <a:fld id="{78C97017-6FC3-485B-9764-EAC9E56C1D49}" type="datetimeFigureOut">
               <a:rPr lang="en-US" smtClean="0"/>
-              <a:t>4/16/2018</a:t>
+              <a:t>3/20/2019</a:t>
             </a:fld>
             <a:endParaRPr lang="en-US"/>
           </a:p>
@@ -1172,7 +1168,7 @@
           <a:p>
             <a:fld id="{78C97017-6FC3-485B-9764-EAC9E56C1D49}" type="datetimeFigureOut">
               <a:rPr lang="en-US" smtClean="0"/>
-              <a:t>4/16/2018</a:t>
+              <a:t>3/20/2019</a:t>
             </a:fld>
             <a:endParaRPr lang="en-US"/>
           </a:p>
@@ -1417,7 +1413,7 @@
           <a:p>
             <a:fld id="{78C97017-6FC3-485B-9764-EAC9E56C1D49}" type="datetimeFigureOut">
               <a:rPr lang="en-US" smtClean="0"/>
-              <a:t>4/16/2018</a:t>
+              <a:t>3/20/2019</a:t>
             </a:fld>
             <a:endParaRPr lang="en-US"/>
           </a:p>
@@ -1702,7 +1698,7 @@
           <a:p>
             <a:fld id="{78C97017-6FC3-485B-9764-EAC9E56C1D49}" type="datetimeFigureOut">
               <a:rPr lang="en-US" smtClean="0"/>
-              <a:t>4/16/2018</a:t>
+              <a:t>3/20/2019</a:t>
             </a:fld>
             <a:endParaRPr lang="en-US"/>
           </a:p>
@@ -2121,7 +2117,7 @@
           <a:p>
             <a:fld id="{78C97017-6FC3-485B-9764-EAC9E56C1D49}" type="datetimeFigureOut">
               <a:rPr lang="en-US" smtClean="0"/>
-              <a:t>4/16/2018</a:t>
+              <a:t>3/20/2019</a:t>
             </a:fld>
             <a:endParaRPr lang="en-US"/>
           </a:p>
@@ -2238,7 +2234,7 @@
           <a:p>
             <a:fld id="{78C97017-6FC3-485B-9764-EAC9E56C1D49}" type="datetimeFigureOut">
               <a:rPr lang="en-US" smtClean="0"/>
-              <a:t>4/16/2018</a:t>
+              <a:t>3/20/2019</a:t>
             </a:fld>
             <a:endParaRPr lang="en-US"/>
           </a:p>
@@ -2333,7 +2329,7 @@
           <a:p>
             <a:fld id="{78C97017-6FC3-485B-9764-EAC9E56C1D49}" type="datetimeFigureOut">
               <a:rPr lang="en-US" smtClean="0"/>
-              <a:t>4/16/2018</a:t>
+              <a:t>3/20/2019</a:t>
             </a:fld>
             <a:endParaRPr lang="en-US"/>
           </a:p>
@@ -2608,7 +2604,7 @@
           <a:p>
             <a:fld id="{78C97017-6FC3-485B-9764-EAC9E56C1D49}" type="datetimeFigureOut">
               <a:rPr lang="en-US" smtClean="0"/>
-              <a:t>4/16/2018</a:t>
+              <a:t>3/20/2019</a:t>
             </a:fld>
             <a:endParaRPr lang="en-US"/>
           </a:p>
@@ -2860,7 +2856,7 @@
           <a:p>
             <a:fld id="{78C97017-6FC3-485B-9764-EAC9E56C1D49}" type="datetimeFigureOut">
               <a:rPr lang="en-US" smtClean="0"/>
-              <a:t>4/16/2018</a:t>
+              <a:t>3/20/2019</a:t>
             </a:fld>
             <a:endParaRPr lang="en-US"/>
           </a:p>
@@ -3071,7 +3067,7 @@
           <a:p>
             <a:fld id="{78C97017-6FC3-485B-9764-EAC9E56C1D49}" type="datetimeFigureOut">
               <a:rPr lang="en-US" smtClean="0"/>
-              <a:t>4/16/2018</a:t>
+              <a:t>3/20/2019</a:t>
             </a:fld>
             <a:endParaRPr lang="en-US"/>
           </a:p>
@@ -3607,7 +3603,7 @@
           <a:p>
             <a:pPr algn="ctr"/>
             <a:r>
-              <a:rPr lang="en-US" sz="1050" b="1" dirty="0" err="1" smtClean="0">
+              <a:rPr lang="en-US" sz="1050" b="1" dirty="0" err="1">
                 <a:solidFill>
                   <a:srgbClr val="0070C0"/>
                 </a:solidFill>
@@ -3939,18 +3935,13 @@
           <a:p>
             <a:pPr algn="ctr"/>
             <a:r>
-              <a:rPr lang="en-US" sz="1050" dirty="0" err="1" smtClean="0">
+              <a:rPr lang="en-US" sz="1050" dirty="0">
                 <a:solidFill>
                   <a:schemeClr val="bg1"/>
                 </a:solidFill>
               </a:rPr>
-              <a:t>AddressBook</a:t>
-            </a:r>
-            <a:endParaRPr lang="en-US" sz="1050" dirty="0">
-              <a:solidFill>
-                <a:schemeClr val="bg1"/>
-              </a:solidFill>
-            </a:endParaRPr>
+              <a:t>Inventory</a:t>
+            </a:r>
           </a:p>
           <a:p>
             <a:pPr algn="ctr"/>
@@ -5815,7 +5806,7 @@
           <a:p>
             <a:pPr algn="ctr"/>
             <a:r>
-              <a:rPr lang="en-US" sz="1050" b="1" dirty="0" err="1" smtClean="0">
+              <a:rPr lang="en-US" sz="1050" b="1" dirty="0" err="1">
                 <a:solidFill>
                   <a:schemeClr val="bg1"/>
                 </a:solidFill>
@@ -6165,7 +6156,7 @@
           <a:p>
             <a:pPr algn="ctr"/>
             <a:r>
-              <a:rPr lang="en-US" sz="1050" dirty="0" err="1" smtClean="0">
+              <a:rPr lang="en-US" sz="1050" dirty="0" err="1">
                 <a:solidFill>
                   <a:schemeClr val="bg1"/>
                 </a:solidFill>
@@ -6173,7 +6164,7 @@
               <a:t>XYZCommand</a:t>
             </a:r>
             <a:r>
-              <a:rPr lang="en-US" sz="1050" dirty="0" smtClean="0">
+              <a:rPr lang="en-US" sz="1050" dirty="0">
                 <a:solidFill>
                   <a:schemeClr val="bg1"/>
                 </a:solidFill>
@@ -6181,7 +6172,7 @@
               <a:t> = </a:t>
             </a:r>
             <a:r>
-              <a:rPr lang="en-US" sz="1050" dirty="0" err="1" smtClean="0">
+              <a:rPr lang="en-US" sz="1050" dirty="0" err="1">
                 <a:solidFill>
                   <a:schemeClr val="bg1"/>
                 </a:solidFill>
@@ -6189,7 +6180,7 @@
               <a:t>AddCommand</a:t>
             </a:r>
             <a:r>
-              <a:rPr lang="en-US" sz="1050" dirty="0" smtClean="0">
+              <a:rPr lang="en-US" sz="1050" dirty="0">
                 <a:solidFill>
                   <a:schemeClr val="bg1"/>
                 </a:solidFill>
@@ -6197,7 +6188,7 @@
               <a:t>, </a:t>
             </a:r>
             <a:r>
-              <a:rPr lang="en-US" sz="1050" dirty="0" err="1" smtClean="0">
+              <a:rPr lang="en-US" sz="1050" dirty="0" err="1">
                 <a:solidFill>
                   <a:schemeClr val="bg1"/>
                 </a:solidFill>
@@ -6205,18 +6196,13 @@
               <a:t>FindCommand</a:t>
             </a:r>
             <a:r>
-              <a:rPr lang="en-US" sz="1050" dirty="0" smtClean="0">
+              <a:rPr lang="en-US" sz="1050" dirty="0">
                 <a:solidFill>
                   <a:schemeClr val="bg1"/>
                 </a:solidFill>
               </a:rPr>
               <a:t>, etc.</a:t>
             </a:r>
-            <a:endParaRPr lang="en-US" sz="1050" dirty="0">
-              <a:solidFill>
-                <a:schemeClr val="bg1"/>
-              </a:solidFill>
-            </a:endParaRPr>
           </a:p>
         </p:txBody>
       </p:sp>

</xml_diff>

<commit_message>
updated DG and diagrams
</commit_message>
<xml_diff>
--- a/docs/diagrams/LogicComponentClassDiagram.pptx
+++ b/docs/diagrams/LogicComponentClassDiagram.pptx
@@ -109,7 +109,7 @@
   </p:defaultTextStyle>
   <p:extLst>
     <p:ext uri="{EFAFB233-063F-42B5-8137-9DF3F51BA10A}">
-      <p15:sldGuideLst xmlns:p15="http://schemas.microsoft.com/office/powerpoint/2012/main">
+      <p15:sldGuideLst xmlns:p15="http://schemas.microsoft.com/office/powerpoint/2012/main" xmlns="">
         <p15:guide id="1" orient="horz" pos="1488">
           <p15:clr>
             <a:srgbClr val="A4A3A4"/>
@@ -212,7 +212,8 @@
           <a:p>
             <a:fld id="{F5CC4B3F-88C1-4FFA-B1B6-F41C21DC6924}" type="datetimeFigureOut">
               <a:rPr lang="en-US" smtClean="0"/>
-              <a:t>4/16/2018</a:t>
+              <a:pPr/>
+              <a:t>3/31/2019</a:t>
             </a:fld>
             <a:endParaRPr lang="en-US"/>
           </a:p>
@@ -370,6 +371,7 @@
           <a:p>
             <a:fld id="{5A7AB025-77E3-4BD1-A2FD-B3183DBA47A3}" type="slidenum">
               <a:rPr lang="en-US" smtClean="0"/>
+              <a:pPr/>
               <a:t>‹#›</a:t>
             </a:fld>
             <a:endParaRPr lang="en-US"/>
@@ -379,7 +381,7 @@
     </p:spTree>
     <p:extLst>
       <p:ext uri="{BB962C8B-B14F-4D97-AF65-F5344CB8AC3E}">
-        <p14:creationId xmlns:p14="http://schemas.microsoft.com/office/powerpoint/2010/main" val="2023976206"/>
+        <p14:creationId xmlns:p14="http://schemas.microsoft.com/office/powerpoint/2010/main" xmlns="" val="2023976206"/>
       </p:ext>
     </p:extLst>
   </p:cSld>
@@ -658,7 +660,8 @@
           <a:p>
             <a:fld id="{78C97017-6FC3-485B-9764-EAC9E56C1D49}" type="datetimeFigureOut">
               <a:rPr lang="en-US" smtClean="0"/>
-              <a:t>4/16/2018</a:t>
+              <a:pPr/>
+              <a:t>3/31/2019</a:t>
             </a:fld>
             <a:endParaRPr lang="en-US"/>
           </a:p>
@@ -700,6 +703,7 @@
           <a:p>
             <a:fld id="{FB34683C-161B-4520-BF45-B179E228CF2A}" type="slidenum">
               <a:rPr lang="en-US" smtClean="0"/>
+              <a:pPr/>
               <a:t>‹#›</a:t>
             </a:fld>
             <a:endParaRPr lang="en-US"/>
@@ -709,7 +713,7 @@
     </p:spTree>
     <p:extLst>
       <p:ext uri="{BB962C8B-B14F-4D97-AF65-F5344CB8AC3E}">
-        <p14:creationId xmlns:p14="http://schemas.microsoft.com/office/powerpoint/2010/main" val="3246593157"/>
+        <p14:creationId xmlns:p14="http://schemas.microsoft.com/office/powerpoint/2010/main" xmlns="" val="3246593157"/>
       </p:ext>
     </p:extLst>
   </p:cSld>
@@ -826,7 +830,8 @@
           <a:p>
             <a:fld id="{78C97017-6FC3-485B-9764-EAC9E56C1D49}" type="datetimeFigureOut">
               <a:rPr lang="en-US" smtClean="0"/>
-              <a:t>4/16/2018</a:t>
+              <a:pPr/>
+              <a:t>3/31/2019</a:t>
             </a:fld>
             <a:endParaRPr lang="en-US"/>
           </a:p>
@@ -868,6 +873,7 @@
           <a:p>
             <a:fld id="{FB34683C-161B-4520-BF45-B179E228CF2A}" type="slidenum">
               <a:rPr lang="en-US" smtClean="0"/>
+              <a:pPr/>
               <a:t>‹#›</a:t>
             </a:fld>
             <a:endParaRPr lang="en-US"/>
@@ -877,7 +883,7 @@
     </p:spTree>
     <p:extLst>
       <p:ext uri="{BB962C8B-B14F-4D97-AF65-F5344CB8AC3E}">
-        <p14:creationId xmlns:p14="http://schemas.microsoft.com/office/powerpoint/2010/main" val="2707025021"/>
+        <p14:creationId xmlns:p14="http://schemas.microsoft.com/office/powerpoint/2010/main" xmlns="" val="2707025021"/>
       </p:ext>
     </p:extLst>
   </p:cSld>
@@ -1004,7 +1010,8 @@
           <a:p>
             <a:fld id="{78C97017-6FC3-485B-9764-EAC9E56C1D49}" type="datetimeFigureOut">
               <a:rPr lang="en-US" smtClean="0"/>
-              <a:t>4/16/2018</a:t>
+              <a:pPr/>
+              <a:t>3/31/2019</a:t>
             </a:fld>
             <a:endParaRPr lang="en-US"/>
           </a:p>
@@ -1046,6 +1053,7 @@
           <a:p>
             <a:fld id="{FB34683C-161B-4520-BF45-B179E228CF2A}" type="slidenum">
               <a:rPr lang="en-US" smtClean="0"/>
+              <a:pPr/>
               <a:t>‹#›</a:t>
             </a:fld>
             <a:endParaRPr lang="en-US"/>
@@ -1055,7 +1063,7 @@
     </p:spTree>
     <p:extLst>
       <p:ext uri="{BB962C8B-B14F-4D97-AF65-F5344CB8AC3E}">
-        <p14:creationId xmlns:p14="http://schemas.microsoft.com/office/powerpoint/2010/main" val="568378986"/>
+        <p14:creationId xmlns:p14="http://schemas.microsoft.com/office/powerpoint/2010/main" xmlns="" val="568378986"/>
       </p:ext>
     </p:extLst>
   </p:cSld>
@@ -1172,7 +1180,8 @@
           <a:p>
             <a:fld id="{78C97017-6FC3-485B-9764-EAC9E56C1D49}" type="datetimeFigureOut">
               <a:rPr lang="en-US" smtClean="0"/>
-              <a:t>4/16/2018</a:t>
+              <a:pPr/>
+              <a:t>3/31/2019</a:t>
             </a:fld>
             <a:endParaRPr lang="en-US"/>
           </a:p>
@@ -1214,6 +1223,7 @@
           <a:p>
             <a:fld id="{FB34683C-161B-4520-BF45-B179E228CF2A}" type="slidenum">
               <a:rPr lang="en-US" smtClean="0"/>
+              <a:pPr/>
               <a:t>‹#›</a:t>
             </a:fld>
             <a:endParaRPr lang="en-US"/>
@@ -1223,7 +1233,7 @@
     </p:spTree>
     <p:extLst>
       <p:ext uri="{BB962C8B-B14F-4D97-AF65-F5344CB8AC3E}">
-        <p14:creationId xmlns:p14="http://schemas.microsoft.com/office/powerpoint/2010/main" val="266658052"/>
+        <p14:creationId xmlns:p14="http://schemas.microsoft.com/office/powerpoint/2010/main" xmlns="" val="266658052"/>
       </p:ext>
     </p:extLst>
   </p:cSld>
@@ -1417,7 +1427,8 @@
           <a:p>
             <a:fld id="{78C97017-6FC3-485B-9764-EAC9E56C1D49}" type="datetimeFigureOut">
               <a:rPr lang="en-US" smtClean="0"/>
-              <a:t>4/16/2018</a:t>
+              <a:pPr/>
+              <a:t>3/31/2019</a:t>
             </a:fld>
             <a:endParaRPr lang="en-US"/>
           </a:p>
@@ -1459,6 +1470,7 @@
           <a:p>
             <a:fld id="{FB34683C-161B-4520-BF45-B179E228CF2A}" type="slidenum">
               <a:rPr lang="en-US" smtClean="0"/>
+              <a:pPr/>
               <a:t>‹#›</a:t>
             </a:fld>
             <a:endParaRPr lang="en-US"/>
@@ -1468,7 +1480,7 @@
     </p:spTree>
     <p:extLst>
       <p:ext uri="{BB962C8B-B14F-4D97-AF65-F5344CB8AC3E}">
-        <p14:creationId xmlns:p14="http://schemas.microsoft.com/office/powerpoint/2010/main" val="474686344"/>
+        <p14:creationId xmlns:p14="http://schemas.microsoft.com/office/powerpoint/2010/main" xmlns="" val="474686344"/>
       </p:ext>
     </p:extLst>
   </p:cSld>
@@ -1702,7 +1714,8 @@
           <a:p>
             <a:fld id="{78C97017-6FC3-485B-9764-EAC9E56C1D49}" type="datetimeFigureOut">
               <a:rPr lang="en-US" smtClean="0"/>
-              <a:t>4/16/2018</a:t>
+              <a:pPr/>
+              <a:t>3/31/2019</a:t>
             </a:fld>
             <a:endParaRPr lang="en-US"/>
           </a:p>
@@ -1744,6 +1757,7 @@
           <a:p>
             <a:fld id="{FB34683C-161B-4520-BF45-B179E228CF2A}" type="slidenum">
               <a:rPr lang="en-US" smtClean="0"/>
+              <a:pPr/>
               <a:t>‹#›</a:t>
             </a:fld>
             <a:endParaRPr lang="en-US"/>
@@ -1753,7 +1767,7 @@
     </p:spTree>
     <p:extLst>
       <p:ext uri="{BB962C8B-B14F-4D97-AF65-F5344CB8AC3E}">
-        <p14:creationId xmlns:p14="http://schemas.microsoft.com/office/powerpoint/2010/main" val="562293251"/>
+        <p14:creationId xmlns:p14="http://schemas.microsoft.com/office/powerpoint/2010/main" xmlns="" val="562293251"/>
       </p:ext>
     </p:extLst>
   </p:cSld>
@@ -2121,7 +2135,8 @@
           <a:p>
             <a:fld id="{78C97017-6FC3-485B-9764-EAC9E56C1D49}" type="datetimeFigureOut">
               <a:rPr lang="en-US" smtClean="0"/>
-              <a:t>4/16/2018</a:t>
+              <a:pPr/>
+              <a:t>3/31/2019</a:t>
             </a:fld>
             <a:endParaRPr lang="en-US"/>
           </a:p>
@@ -2163,6 +2178,7 @@
           <a:p>
             <a:fld id="{FB34683C-161B-4520-BF45-B179E228CF2A}" type="slidenum">
               <a:rPr lang="en-US" smtClean="0"/>
+              <a:pPr/>
               <a:t>‹#›</a:t>
             </a:fld>
             <a:endParaRPr lang="en-US"/>
@@ -2172,7 +2188,7 @@
     </p:spTree>
     <p:extLst>
       <p:ext uri="{BB962C8B-B14F-4D97-AF65-F5344CB8AC3E}">
-        <p14:creationId xmlns:p14="http://schemas.microsoft.com/office/powerpoint/2010/main" val="1126424250"/>
+        <p14:creationId xmlns:p14="http://schemas.microsoft.com/office/powerpoint/2010/main" xmlns="" val="1126424250"/>
       </p:ext>
     </p:extLst>
   </p:cSld>
@@ -2238,7 +2254,8 @@
           <a:p>
             <a:fld id="{78C97017-6FC3-485B-9764-EAC9E56C1D49}" type="datetimeFigureOut">
               <a:rPr lang="en-US" smtClean="0"/>
-              <a:t>4/16/2018</a:t>
+              <a:pPr/>
+              <a:t>3/31/2019</a:t>
             </a:fld>
             <a:endParaRPr lang="en-US"/>
           </a:p>
@@ -2280,6 +2297,7 @@
           <a:p>
             <a:fld id="{FB34683C-161B-4520-BF45-B179E228CF2A}" type="slidenum">
               <a:rPr lang="en-US" smtClean="0"/>
+              <a:pPr/>
               <a:t>‹#›</a:t>
             </a:fld>
             <a:endParaRPr lang="en-US"/>
@@ -2289,7 +2307,7 @@
     </p:spTree>
     <p:extLst>
       <p:ext uri="{BB962C8B-B14F-4D97-AF65-F5344CB8AC3E}">
-        <p14:creationId xmlns:p14="http://schemas.microsoft.com/office/powerpoint/2010/main" val="4159724230"/>
+        <p14:creationId xmlns:p14="http://schemas.microsoft.com/office/powerpoint/2010/main" xmlns="" val="4159724230"/>
       </p:ext>
     </p:extLst>
   </p:cSld>
@@ -2333,7 +2351,8 @@
           <a:p>
             <a:fld id="{78C97017-6FC3-485B-9764-EAC9E56C1D49}" type="datetimeFigureOut">
               <a:rPr lang="en-US" smtClean="0"/>
-              <a:t>4/16/2018</a:t>
+              <a:pPr/>
+              <a:t>3/31/2019</a:t>
             </a:fld>
             <a:endParaRPr lang="en-US"/>
           </a:p>
@@ -2375,6 +2394,7 @@
           <a:p>
             <a:fld id="{FB34683C-161B-4520-BF45-B179E228CF2A}" type="slidenum">
               <a:rPr lang="en-US" smtClean="0"/>
+              <a:pPr/>
               <a:t>‹#›</a:t>
             </a:fld>
             <a:endParaRPr lang="en-US"/>
@@ -2384,7 +2404,7 @@
     </p:spTree>
     <p:extLst>
       <p:ext uri="{BB962C8B-B14F-4D97-AF65-F5344CB8AC3E}">
-        <p14:creationId xmlns:p14="http://schemas.microsoft.com/office/powerpoint/2010/main" val="1793928710"/>
+        <p14:creationId xmlns:p14="http://schemas.microsoft.com/office/powerpoint/2010/main" xmlns="" val="1793928710"/>
       </p:ext>
     </p:extLst>
   </p:cSld>
@@ -2608,7 +2628,8 @@
           <a:p>
             <a:fld id="{78C97017-6FC3-485B-9764-EAC9E56C1D49}" type="datetimeFigureOut">
               <a:rPr lang="en-US" smtClean="0"/>
-              <a:t>4/16/2018</a:t>
+              <a:pPr/>
+              <a:t>3/31/2019</a:t>
             </a:fld>
             <a:endParaRPr lang="en-US"/>
           </a:p>
@@ -2650,6 +2671,7 @@
           <a:p>
             <a:fld id="{FB34683C-161B-4520-BF45-B179E228CF2A}" type="slidenum">
               <a:rPr lang="en-US" smtClean="0"/>
+              <a:pPr/>
               <a:t>‹#›</a:t>
             </a:fld>
             <a:endParaRPr lang="en-US"/>
@@ -2659,7 +2681,7 @@
     </p:spTree>
     <p:extLst>
       <p:ext uri="{BB962C8B-B14F-4D97-AF65-F5344CB8AC3E}">
-        <p14:creationId xmlns:p14="http://schemas.microsoft.com/office/powerpoint/2010/main" val="2076802089"/>
+        <p14:creationId xmlns:p14="http://schemas.microsoft.com/office/powerpoint/2010/main" xmlns="" val="2076802089"/>
       </p:ext>
     </p:extLst>
   </p:cSld>
@@ -2860,7 +2882,8 @@
           <a:p>
             <a:fld id="{78C97017-6FC3-485B-9764-EAC9E56C1D49}" type="datetimeFigureOut">
               <a:rPr lang="en-US" smtClean="0"/>
-              <a:t>4/16/2018</a:t>
+              <a:pPr/>
+              <a:t>3/31/2019</a:t>
             </a:fld>
             <a:endParaRPr lang="en-US"/>
           </a:p>
@@ -2902,6 +2925,7 @@
           <a:p>
             <a:fld id="{FB34683C-161B-4520-BF45-B179E228CF2A}" type="slidenum">
               <a:rPr lang="en-US" smtClean="0"/>
+              <a:pPr/>
               <a:t>‹#›</a:t>
             </a:fld>
             <a:endParaRPr lang="en-US"/>
@@ -2911,7 +2935,7 @@
     </p:spTree>
     <p:extLst>
       <p:ext uri="{BB962C8B-B14F-4D97-AF65-F5344CB8AC3E}">
-        <p14:creationId xmlns:p14="http://schemas.microsoft.com/office/powerpoint/2010/main" val="201835938"/>
+        <p14:creationId xmlns:p14="http://schemas.microsoft.com/office/powerpoint/2010/main" xmlns="" val="201835938"/>
       </p:ext>
     </p:extLst>
   </p:cSld>
@@ -3071,7 +3095,8 @@
           <a:p>
             <a:fld id="{78C97017-6FC3-485B-9764-EAC9E56C1D49}" type="datetimeFigureOut">
               <a:rPr lang="en-US" smtClean="0"/>
-              <a:t>4/16/2018</a:t>
+              <a:pPr/>
+              <a:t>3/31/2019</a:t>
             </a:fld>
             <a:endParaRPr lang="en-US"/>
           </a:p>
@@ -3149,6 +3174,7 @@
           <a:p>
             <a:fld id="{FB34683C-161B-4520-BF45-B179E228CF2A}" type="slidenum">
               <a:rPr lang="en-US" smtClean="0"/>
+              <a:pPr/>
               <a:t>‹#›</a:t>
             </a:fld>
             <a:endParaRPr lang="en-US"/>
@@ -3158,7 +3184,7 @@
     </p:spTree>
     <p:extLst>
       <p:ext uri="{BB962C8B-B14F-4D97-AF65-F5344CB8AC3E}">
-        <p14:creationId xmlns:p14="http://schemas.microsoft.com/office/powerpoint/2010/main" val="2341400630"/>
+        <p14:creationId xmlns:p14="http://schemas.microsoft.com/office/powerpoint/2010/main" xmlns="" val="2341400630"/>
       </p:ext>
     </p:extLst>
   </p:cSld>
@@ -3944,7 +3970,7 @@
                   <a:schemeClr val="bg1"/>
                 </a:solidFill>
               </a:rPr>
-              <a:t>AddressBook</a:t>
+              <a:t>GradTrak</a:t>
             </a:r>
             <a:endParaRPr lang="en-US" sz="1050" dirty="0">
               <a:solidFill>
@@ -5517,7 +5543,7 @@
           <p:cNvPr id="97" name="Rectangle 96">
             <a:extLst>
               <a:ext uri="{FF2B5EF4-FFF2-40B4-BE49-F238E27FC236}">
-                <a16:creationId xmlns:a16="http://schemas.microsoft.com/office/drawing/2014/main" id="{AADE6A0C-89AB-467B-8CEA-5FCF36CE0D21}"/>
+                <a16:creationId xmlns:a16="http://schemas.microsoft.com/office/drawing/2014/main" xmlns="" id="{AADE6A0C-89AB-467B-8CEA-5FCF36CE0D21}"/>
               </a:ext>
             </a:extLst>
           </p:cNvPr>
@@ -6223,7 +6249,7 @@
     </p:spTree>
     <p:extLst>
       <p:ext uri="{BB962C8B-B14F-4D97-AF65-F5344CB8AC3E}">
-        <p14:creationId xmlns:p14="http://schemas.microsoft.com/office/powerpoint/2010/main" val="211586602"/>
+        <p14:creationId xmlns:p14="http://schemas.microsoft.com/office/powerpoint/2010/main" xmlns="" val="211586602"/>
       </p:ext>
     </p:extLst>
   </p:cSld>

</xml_diff>

<commit_message>
Update DG class and sequence diagram
</commit_message>
<xml_diff>
--- a/docs/diagrams/LogicComponentClassDiagram.pptx
+++ b/docs/diagrams/LogicComponentClassDiagram.pptx
@@ -5,10 +5,11 @@
     <p:sldMasterId id="2147483648" r:id="rId1"/>
   </p:sldMasterIdLst>
   <p:notesMasterIdLst>
-    <p:notesMasterId r:id="rId3"/>
+    <p:notesMasterId r:id="rId4"/>
   </p:notesMasterIdLst>
   <p:sldIdLst>
-    <p:sldId id="262" r:id="rId2"/>
+    <p:sldId id="263" r:id="rId2"/>
+    <p:sldId id="262" r:id="rId3"/>
   </p:sldIdLst>
   <p:sldSz cx="9144000" cy="6858000" type="screen4x3"/>
   <p:notesSz cx="6858000" cy="9144000"/>
@@ -208,7 +209,7 @@
           <a:p>
             <a:fld id="{F5CC4B3F-88C1-4FFA-B1B6-F41C21DC6924}" type="datetimeFigureOut">
               <a:rPr lang="en-US" smtClean="0"/>
-              <a:t>3/8/2019</a:t>
+              <a:t>3/31/2019</a:t>
             </a:fld>
             <a:endParaRPr lang="en-US"/>
           </a:p>
@@ -654,7 +655,7 @@
           <a:p>
             <a:fld id="{78C97017-6FC3-485B-9764-EAC9E56C1D49}" type="datetimeFigureOut">
               <a:rPr lang="en-US" smtClean="0"/>
-              <a:t>3/8/2019</a:t>
+              <a:t>3/31/2019</a:t>
             </a:fld>
             <a:endParaRPr lang="en-US"/>
           </a:p>
@@ -822,7 +823,7 @@
           <a:p>
             <a:fld id="{78C97017-6FC3-485B-9764-EAC9E56C1D49}" type="datetimeFigureOut">
               <a:rPr lang="en-US" smtClean="0"/>
-              <a:t>3/8/2019</a:t>
+              <a:t>3/31/2019</a:t>
             </a:fld>
             <a:endParaRPr lang="en-US"/>
           </a:p>
@@ -1000,7 +1001,7 @@
           <a:p>
             <a:fld id="{78C97017-6FC3-485B-9764-EAC9E56C1D49}" type="datetimeFigureOut">
               <a:rPr lang="en-US" smtClean="0"/>
-              <a:t>3/8/2019</a:t>
+              <a:t>3/31/2019</a:t>
             </a:fld>
             <a:endParaRPr lang="en-US"/>
           </a:p>
@@ -1168,7 +1169,7 @@
           <a:p>
             <a:fld id="{78C97017-6FC3-485B-9764-EAC9E56C1D49}" type="datetimeFigureOut">
               <a:rPr lang="en-US" smtClean="0"/>
-              <a:t>3/8/2019</a:t>
+              <a:t>3/31/2019</a:t>
             </a:fld>
             <a:endParaRPr lang="en-US"/>
           </a:p>
@@ -1413,7 +1414,7 @@
           <a:p>
             <a:fld id="{78C97017-6FC3-485B-9764-EAC9E56C1D49}" type="datetimeFigureOut">
               <a:rPr lang="en-US" smtClean="0"/>
-              <a:t>3/8/2019</a:t>
+              <a:t>3/31/2019</a:t>
             </a:fld>
             <a:endParaRPr lang="en-US"/>
           </a:p>
@@ -1698,7 +1699,7 @@
           <a:p>
             <a:fld id="{78C97017-6FC3-485B-9764-EAC9E56C1D49}" type="datetimeFigureOut">
               <a:rPr lang="en-US" smtClean="0"/>
-              <a:t>3/8/2019</a:t>
+              <a:t>3/31/2019</a:t>
             </a:fld>
             <a:endParaRPr lang="en-US"/>
           </a:p>
@@ -2117,7 +2118,7 @@
           <a:p>
             <a:fld id="{78C97017-6FC3-485B-9764-EAC9E56C1D49}" type="datetimeFigureOut">
               <a:rPr lang="en-US" smtClean="0"/>
-              <a:t>3/8/2019</a:t>
+              <a:t>3/31/2019</a:t>
             </a:fld>
             <a:endParaRPr lang="en-US"/>
           </a:p>
@@ -2234,7 +2235,7 @@
           <a:p>
             <a:fld id="{78C97017-6FC3-485B-9764-EAC9E56C1D49}" type="datetimeFigureOut">
               <a:rPr lang="en-US" smtClean="0"/>
-              <a:t>3/8/2019</a:t>
+              <a:t>3/31/2019</a:t>
             </a:fld>
             <a:endParaRPr lang="en-US"/>
           </a:p>
@@ -2329,7 +2330,7 @@
           <a:p>
             <a:fld id="{78C97017-6FC3-485B-9764-EAC9E56C1D49}" type="datetimeFigureOut">
               <a:rPr lang="en-US" smtClean="0"/>
-              <a:t>3/8/2019</a:t>
+              <a:t>3/31/2019</a:t>
             </a:fld>
             <a:endParaRPr lang="en-US"/>
           </a:p>
@@ -2604,7 +2605,7 @@
           <a:p>
             <a:fld id="{78C97017-6FC3-485B-9764-EAC9E56C1D49}" type="datetimeFigureOut">
               <a:rPr lang="en-US" smtClean="0"/>
-              <a:t>3/8/2019</a:t>
+              <a:t>3/31/2019</a:t>
             </a:fld>
             <a:endParaRPr lang="en-US"/>
           </a:p>
@@ -2856,7 +2857,7 @@
           <a:p>
             <a:fld id="{78C97017-6FC3-485B-9764-EAC9E56C1D49}" type="datetimeFigureOut">
               <a:rPr lang="en-US" smtClean="0"/>
-              <a:t>3/8/2019</a:t>
+              <a:t>3/31/2019</a:t>
             </a:fld>
             <a:endParaRPr lang="en-US"/>
           </a:p>
@@ -3067,7 +3068,7 @@
           <a:p>
             <a:fld id="{78C97017-6FC3-485B-9764-EAC9E56C1D49}" type="datetimeFigureOut">
               <a:rPr lang="en-US" smtClean="0"/>
-              <a:t>3/8/2019</a:t>
+              <a:t>3/31/2019</a:t>
             </a:fld>
             <a:endParaRPr lang="en-US"/>
           </a:p>
@@ -3450,8 +3451,8 @@
         </p:nvSpPr>
         <p:spPr>
           <a:xfrm>
-            <a:off x="741132" y="1008011"/>
-            <a:ext cx="7848600" cy="4017784"/>
+            <a:off x="741131" y="1008010"/>
+            <a:ext cx="8098057" cy="4528447"/>
           </a:xfrm>
           <a:prstGeom prst="roundRect">
             <a:avLst>
@@ -3682,18 +3683,19 @@
           <p:cNvPr id="6" name="Elbow Connector 63"/>
           <p:cNvCxnSpPr>
             <a:cxnSpLocks/>
-            <a:stCxn id="12" idx="3"/>
+            <a:stCxn id="84" idx="3"/>
+            <a:endCxn id="3" idx="3"/>
           </p:cNvCxnSpPr>
           <p:nvPr/>
         </p:nvCxnSpPr>
         <p:spPr>
           <a:xfrm flipH="1" flipV="1">
-            <a:off x="2853969" y="1637121"/>
-            <a:ext cx="5200166" cy="2474866"/>
+            <a:off x="2857227" y="1520057"/>
+            <a:ext cx="5545636" cy="3755155"/>
           </a:xfrm>
           <a:prstGeom prst="bentConnector3">
             <a:avLst>
-              <a:gd name="adj1" fmla="val -4396"/>
+              <a:gd name="adj1" fmla="val -4122"/>
             </a:avLst>
           </a:prstGeom>
           <a:ln w="19050">
@@ -3772,8 +3774,8 @@
         </p:nvSpPr>
         <p:spPr>
           <a:xfrm>
-            <a:off x="734444" y="5173582"/>
-            <a:ext cx="7848600" cy="328045"/>
+            <a:off x="734443" y="5735070"/>
+            <a:ext cx="8098049" cy="328045"/>
           </a:xfrm>
           <a:prstGeom prst="roundRect">
             <a:avLst/>
@@ -3832,8 +3834,8 @@
         </p:nvSpPr>
         <p:spPr>
           <a:xfrm>
-            <a:off x="7282092" y="3938607"/>
-            <a:ext cx="772043" cy="346760"/>
+            <a:off x="7143794" y="3938606"/>
+            <a:ext cx="1203418" cy="498173"/>
           </a:xfrm>
           <a:prstGeom prst="rect">
             <a:avLst/>
@@ -3885,6 +3887,21 @@
                   <a:srgbClr val="0070C0"/>
                 </a:solidFill>
               </a:rPr>
+              <a:t>Management</a:t>
+            </a:r>
+            <a:br>
+              <a:rPr lang="en-US" sz="1050" b="1" dirty="0">
+                <a:solidFill>
+                  <a:srgbClr val="0070C0"/>
+                </a:solidFill>
+              </a:rPr>
+            </a:br>
+            <a:r>
+              <a:rPr lang="en-US" sz="1050" b="1" dirty="0">
+                <a:solidFill>
+                  <a:srgbClr val="0070C0"/>
+                </a:solidFill>
+              </a:rPr>
               <a:t>Command</a:t>
             </a:r>
             <a:endParaRPr lang="en-SG" sz="1050" b="1" dirty="0">
@@ -3895,48 +3912,6 @@
           </a:p>
         </p:txBody>
       </p:sp>
-      <p:cxnSp>
-        <p:nvCxnSpPr>
-          <p:cNvPr id="18" name="Straight Arrow Connector 110"/>
-          <p:cNvCxnSpPr>
-            <a:cxnSpLocks/>
-            <a:stCxn id="12" idx="2"/>
-          </p:cNvCxnSpPr>
-          <p:nvPr/>
-        </p:nvCxnSpPr>
-        <p:spPr>
-          <a:xfrm>
-            <a:off x="7668114" y="4285367"/>
-            <a:ext cx="0" cy="896233"/>
-          </a:xfrm>
-          <a:prstGeom prst="straightConnector1">
-            <a:avLst/>
-          </a:prstGeom>
-          <a:ln w="19050">
-            <a:solidFill>
-              <a:srgbClr val="0070C0"/>
-            </a:solidFill>
-            <a:prstDash val="sysDot"/>
-            <a:headEnd type="none" w="med" len="med"/>
-            <a:tailEnd type="arrow" w="med" len="med"/>
-          </a:ln>
-          <a:effectLst/>
-        </p:spPr>
-        <p:style>
-          <a:lnRef idx="1">
-            <a:schemeClr val="accent2"/>
-          </a:lnRef>
-          <a:fillRef idx="2">
-            <a:schemeClr val="accent2"/>
-          </a:fillRef>
-          <a:effectRef idx="1">
-            <a:schemeClr val="accent2"/>
-          </a:effectRef>
-          <a:fontRef idx="minor">
-            <a:schemeClr val="dk1"/>
-          </a:fontRef>
-        </p:style>
-      </p:cxnSp>
       <p:sp>
         <p:nvSpPr>
           <p:cNvPr id="19" name="Rectangle 62"/>
@@ -4115,7 +4090,7 @@
         <p:spPr>
           <a:xfrm>
             <a:off x="1996957" y="4023900"/>
-            <a:ext cx="0" cy="1149682"/>
+            <a:ext cx="0" cy="1711170"/>
           </a:xfrm>
           <a:prstGeom prst="straightConnector1">
             <a:avLst/>
@@ -4187,249 +4162,6 @@
           </a:fontRef>
         </p:style>
       </p:cxnSp>
-      <p:cxnSp>
-        <p:nvCxnSpPr>
-          <p:cNvPr id="25" name="Elbow Connector 63"/>
-          <p:cNvCxnSpPr>
-            <a:cxnSpLocks/>
-            <a:endCxn id="12" idx="1"/>
-          </p:cNvCxnSpPr>
-          <p:nvPr/>
-        </p:nvCxnSpPr>
-        <p:spPr>
-          <a:xfrm>
-            <a:off x="2348902" y="3999966"/>
-            <a:ext cx="4933190" cy="112021"/>
-          </a:xfrm>
-          <a:prstGeom prst="bentConnector3">
-            <a:avLst>
-              <a:gd name="adj1" fmla="val 185"/>
-            </a:avLst>
-          </a:prstGeom>
-          <a:ln w="19050">
-            <a:solidFill>
-              <a:srgbClr val="0070C0"/>
-            </a:solidFill>
-            <a:prstDash val="sysDot"/>
-            <a:headEnd type="none" w="med" len="med"/>
-            <a:tailEnd type="arrow" w="med" len="med"/>
-          </a:ln>
-          <a:effectLst/>
-        </p:spPr>
-        <p:style>
-          <a:lnRef idx="1">
-            <a:schemeClr val="accent2"/>
-          </a:lnRef>
-          <a:fillRef idx="2">
-            <a:schemeClr val="accent2"/>
-          </a:fillRef>
-          <a:effectRef idx="1">
-            <a:schemeClr val="accent2"/>
-          </a:effectRef>
-          <a:fontRef idx="minor">
-            <a:schemeClr val="dk1"/>
-          </a:fontRef>
-        </p:style>
-      </p:cxnSp>
-      <p:grpSp>
-        <p:nvGrpSpPr>
-          <p:cNvPr id="26" name="Group 25"/>
-          <p:cNvGrpSpPr/>
-          <p:nvPr/>
-        </p:nvGrpSpPr>
-        <p:grpSpPr>
-          <a:xfrm>
-            <a:off x="4103381" y="4089642"/>
-            <a:ext cx="851022" cy="230832"/>
-            <a:chOff x="2627664" y="781502"/>
-            <a:chExt cx="851022" cy="230832"/>
-          </a:xfrm>
-        </p:grpSpPr>
-        <p:sp>
-          <p:nvSpPr>
-            <p:cNvPr id="27" name="TextBox 26"/>
-            <p:cNvSpPr txBox="1"/>
-            <p:nvPr/>
-          </p:nvSpPr>
-          <p:spPr>
-            <a:xfrm>
-              <a:off x="2627664" y="781502"/>
-              <a:ext cx="728806" cy="230832"/>
-            </a:xfrm>
-            <a:prstGeom prst="rect">
-              <a:avLst/>
-            </a:prstGeom>
-            <a:noFill/>
-          </p:spPr>
-          <p:txBody>
-            <a:bodyPr wrap="square" lIns="0" tIns="0" rIns="0" bIns="0" rtlCol="0">
-              <a:noAutofit/>
-            </a:bodyPr>
-            <a:lstStyle/>
-            <a:p>
-              <a:pPr algn="r"/>
-              <a:r>
-                <a:rPr lang="en-US" sz="1100" dirty="0">
-                  <a:solidFill>
-                    <a:srgbClr val="0070C0"/>
-                  </a:solidFill>
-                </a:rPr>
-                <a:t>executes</a:t>
-              </a:r>
-              <a:endParaRPr lang="en-SG" sz="1100" dirty="0">
-                <a:solidFill>
-                  <a:srgbClr val="0070C0"/>
-                </a:solidFill>
-              </a:endParaRPr>
-            </a:p>
-          </p:txBody>
-        </p:sp>
-        <p:sp>
-          <p:nvSpPr>
-            <p:cNvPr id="28" name="Isosceles Triangle 27"/>
-            <p:cNvSpPr/>
-            <p:nvPr/>
-          </p:nvSpPr>
-          <p:spPr>
-            <a:xfrm rot="5400000">
-              <a:off x="3377610" y="840682"/>
-              <a:ext cx="125951" cy="76201"/>
-            </a:xfrm>
-            <a:prstGeom prst="triangle">
-              <a:avLst/>
-            </a:prstGeom>
-            <a:solidFill>
-              <a:srgbClr val="0070C0"/>
-            </a:solidFill>
-            <a:ln>
-              <a:noFill/>
-            </a:ln>
-          </p:spPr>
-          <p:style>
-            <a:lnRef idx="2">
-              <a:schemeClr val="accent1">
-                <a:shade val="50000"/>
-              </a:schemeClr>
-            </a:lnRef>
-            <a:fillRef idx="1">
-              <a:schemeClr val="accent1"/>
-            </a:fillRef>
-            <a:effectRef idx="0">
-              <a:schemeClr val="accent1"/>
-            </a:effectRef>
-            <a:fontRef idx="minor">
-              <a:schemeClr val="lt1"/>
-            </a:fontRef>
-          </p:style>
-          <p:txBody>
-            <a:bodyPr rtlCol="0" anchor="ctr"/>
-            <a:lstStyle/>
-            <a:p>
-              <a:pPr algn="ctr"/>
-              <a:endParaRPr lang="en-SG"/>
-            </a:p>
-          </p:txBody>
-        </p:sp>
-      </p:grpSp>
-      <p:grpSp>
-        <p:nvGrpSpPr>
-          <p:cNvPr id="29" name="Group 28"/>
-          <p:cNvGrpSpPr/>
-          <p:nvPr/>
-        </p:nvGrpSpPr>
-        <p:grpSpPr>
-          <a:xfrm>
-            <a:off x="4307702" y="1447009"/>
-            <a:ext cx="868568" cy="230832"/>
-            <a:chOff x="2755838" y="789460"/>
-            <a:chExt cx="868568" cy="230832"/>
-          </a:xfrm>
-        </p:grpSpPr>
-        <p:sp>
-          <p:nvSpPr>
-            <p:cNvPr id="30" name="TextBox 29"/>
-            <p:cNvSpPr txBox="1"/>
-            <p:nvPr/>
-          </p:nvSpPr>
-          <p:spPr>
-            <a:xfrm>
-              <a:off x="2895600" y="789460"/>
-              <a:ext cx="728806" cy="230832"/>
-            </a:xfrm>
-            <a:prstGeom prst="rect">
-              <a:avLst/>
-            </a:prstGeom>
-            <a:noFill/>
-          </p:spPr>
-          <p:txBody>
-            <a:bodyPr wrap="square" lIns="0" tIns="0" rIns="0" bIns="0" rtlCol="0">
-              <a:noAutofit/>
-            </a:bodyPr>
-            <a:lstStyle/>
-            <a:p>
-              <a:r>
-                <a:rPr lang="en-US" sz="1100" dirty="0">
-                  <a:solidFill>
-                    <a:srgbClr val="0070C0"/>
-                  </a:solidFill>
-                </a:rPr>
-                <a:t>produces</a:t>
-              </a:r>
-              <a:endParaRPr lang="en-SG" sz="1100" dirty="0">
-                <a:solidFill>
-                  <a:srgbClr val="0070C0"/>
-                </a:solidFill>
-              </a:endParaRPr>
-            </a:p>
-          </p:txBody>
-        </p:sp>
-        <p:sp>
-          <p:nvSpPr>
-            <p:cNvPr id="31" name="Isosceles Triangle 30"/>
-            <p:cNvSpPr/>
-            <p:nvPr/>
-          </p:nvSpPr>
-          <p:spPr>
-            <a:xfrm rot="16200000" flipH="1">
-              <a:off x="2730963" y="857181"/>
-              <a:ext cx="125951" cy="76201"/>
-            </a:xfrm>
-            <a:prstGeom prst="triangle">
-              <a:avLst/>
-            </a:prstGeom>
-            <a:solidFill>
-              <a:srgbClr val="0070C0"/>
-            </a:solidFill>
-            <a:ln>
-              <a:noFill/>
-            </a:ln>
-          </p:spPr>
-          <p:style>
-            <a:lnRef idx="2">
-              <a:schemeClr val="accent1">
-                <a:shade val="50000"/>
-              </a:schemeClr>
-            </a:lnRef>
-            <a:fillRef idx="1">
-              <a:schemeClr val="accent1"/>
-            </a:fillRef>
-            <a:effectRef idx="0">
-              <a:schemeClr val="accent1"/>
-            </a:effectRef>
-            <a:fontRef idx="minor">
-              <a:schemeClr val="lt1"/>
-            </a:fontRef>
-          </p:style>
-          <p:txBody>
-            <a:bodyPr rtlCol="0" anchor="ctr"/>
-            <a:lstStyle/>
-            <a:p>
-              <a:pPr algn="ctr"/>
-              <a:endParaRPr lang="en-SG"/>
-            </a:p>
-          </p:txBody>
-        </p:sp>
-      </p:grpSp>
       <p:cxnSp>
         <p:nvCxnSpPr>
           <p:cNvPr id="39" name="Elbow Connector 122"/>
@@ -5787,7 +5519,7 @@
         <p:spPr>
           <a:xfrm>
             <a:off x="2899963" y="3656672"/>
-            <a:ext cx="1045323" cy="384497"/>
+            <a:ext cx="1278674" cy="384497"/>
           </a:xfrm>
           <a:prstGeom prst="rect">
             <a:avLst/>
@@ -5823,7 +5555,7 @@
                   <a:schemeClr val="bg1"/>
                 </a:solidFill>
               </a:rPr>
-              <a:t>BrainTrain</a:t>
+              <a:t>ManagementMode</a:t>
             </a:r>
             <a:endParaRPr lang="en-US" sz="1050" dirty="0">
               <a:solidFill>
@@ -6048,8 +5780,8 @@
         </p:nvCxnSpPr>
         <p:spPr>
           <a:xfrm flipV="1">
-            <a:off x="3945286" y="3181181"/>
-            <a:ext cx="1292693" cy="667740"/>
+            <a:off x="4178637" y="3181181"/>
+            <a:ext cx="1059342" cy="667740"/>
           </a:xfrm>
           <a:prstGeom prst="bentConnector2">
             <a:avLst/>
@@ -6309,7 +6041,7 @@
         </p:nvSpPr>
         <p:spPr>
           <a:xfrm>
-            <a:off x="2106044" y="4557297"/>
+            <a:off x="2050392" y="4557090"/>
             <a:ext cx="131116" cy="230832"/>
           </a:xfrm>
           <a:prstGeom prst="rect">
@@ -6823,56 +6555,6 @@
           </p:style>
         </p:cxnSp>
       </p:grpSp>
-      <p:cxnSp>
-        <p:nvCxnSpPr>
-          <p:cNvPr id="99" name="Elbow Connector 63">
-            <a:extLst>
-              <a:ext uri="{FF2B5EF4-FFF2-40B4-BE49-F238E27FC236}">
-                <a16:creationId xmlns:a16="http://schemas.microsoft.com/office/drawing/2014/main" id="{E4517CB6-EF88-4061-B966-746AB404D3E7}"/>
-              </a:ext>
-            </a:extLst>
-          </p:cNvPr>
-          <p:cNvCxnSpPr>
-            <a:cxnSpLocks/>
-            <a:stCxn id="82" idx="3"/>
-          </p:cNvCxnSpPr>
-          <p:nvPr/>
-        </p:nvCxnSpPr>
-        <p:spPr>
-          <a:xfrm flipH="1" flipV="1">
-            <a:off x="2853970" y="1411727"/>
-            <a:ext cx="4243830" cy="3158960"/>
-          </a:xfrm>
-          <a:prstGeom prst="bentConnector3">
-            <a:avLst>
-              <a:gd name="adj1" fmla="val -31674"/>
-            </a:avLst>
-          </a:prstGeom>
-          <a:ln w="19050">
-            <a:solidFill>
-              <a:srgbClr val="0070C0"/>
-            </a:solidFill>
-            <a:prstDash val="sysDot"/>
-            <a:headEnd type="none" w="med" len="med"/>
-            <a:tailEnd type="arrow" w="med" len="med"/>
-          </a:ln>
-          <a:effectLst/>
-        </p:spPr>
-        <p:style>
-          <a:lnRef idx="1">
-            <a:schemeClr val="accent2"/>
-          </a:lnRef>
-          <a:fillRef idx="2">
-            <a:schemeClr val="accent2"/>
-          </a:fillRef>
-          <a:effectRef idx="1">
-            <a:schemeClr val="accent2"/>
-          </a:effectRef>
-          <a:fontRef idx="minor">
-            <a:schemeClr val="dk1"/>
-          </a:fontRef>
-        </p:style>
-      </p:cxnSp>
       <p:grpSp>
         <p:nvGrpSpPr>
           <p:cNvPr id="100" name="Group 99">
@@ -6887,7 +6569,7 @@
         </p:nvGrpSpPr>
         <p:grpSpPr>
           <a:xfrm>
-            <a:off x="4307702" y="1213400"/>
+            <a:off x="4461741" y="1321542"/>
             <a:ext cx="868568" cy="230832"/>
             <a:chOff x="2755838" y="821201"/>
             <a:chExt cx="868568" cy="230832"/>
@@ -6992,6 +6674,4078 @@
       </p:grpSp>
       <p:sp>
         <p:nvSpPr>
+          <p:cNvPr id="128" name="Folded Corner 126">
+            <a:extLst>
+              <a:ext uri="{FF2B5EF4-FFF2-40B4-BE49-F238E27FC236}">
+                <a16:creationId xmlns:a16="http://schemas.microsoft.com/office/drawing/2014/main" id="{85E12A01-6A60-41F3-9519-094A7079F506}"/>
+              </a:ext>
+            </a:extLst>
+          </p:cNvPr>
+          <p:cNvSpPr/>
+          <p:nvPr/>
+        </p:nvSpPr>
+        <p:spPr>
+          <a:xfrm>
+            <a:off x="5337909" y="3409534"/>
+            <a:ext cx="1499727" cy="630473"/>
+          </a:xfrm>
+          <a:prstGeom prst="foldedCorner">
+            <a:avLst/>
+          </a:prstGeom>
+          <a:solidFill>
+            <a:schemeClr val="accent5">
+              <a:lumMod val="60000"/>
+              <a:lumOff val="40000"/>
+            </a:schemeClr>
+          </a:solidFill>
+          <a:ln w="19050">
+            <a:solidFill>
+              <a:schemeClr val="bg1"/>
+            </a:solidFill>
+          </a:ln>
+          <a:effectLst/>
+        </p:spPr>
+        <p:style>
+          <a:lnRef idx="1">
+            <a:schemeClr val="accent2"/>
+          </a:lnRef>
+          <a:fillRef idx="2">
+            <a:schemeClr val="accent2"/>
+          </a:fillRef>
+          <a:effectRef idx="1">
+            <a:schemeClr val="accent2"/>
+          </a:effectRef>
+          <a:fontRef idx="minor">
+            <a:schemeClr val="dk1"/>
+          </a:fontRef>
+        </p:style>
+        <p:txBody>
+          <a:bodyPr rtlCol="0" anchor="ctr"/>
+          <a:lstStyle/>
+          <a:p>
+            <a:pPr algn="ctr"/>
+            <a:r>
+              <a:rPr lang="en-US" sz="1050" dirty="0" err="1">
+                <a:solidFill>
+                  <a:schemeClr val="bg1"/>
+                </a:solidFill>
+              </a:rPr>
+              <a:t>QuizXYZCommand</a:t>
+            </a:r>
+            <a:r>
+              <a:rPr lang="en-US" sz="1050" dirty="0">
+                <a:solidFill>
+                  <a:schemeClr val="bg1"/>
+                </a:solidFill>
+              </a:rPr>
+              <a:t> = </a:t>
+            </a:r>
+            <a:r>
+              <a:rPr lang="en-US" sz="1050" dirty="0" err="1">
+                <a:solidFill>
+                  <a:schemeClr val="bg1"/>
+                </a:solidFill>
+              </a:rPr>
+              <a:t>QuizAnswerCommand</a:t>
+            </a:r>
+            <a:r>
+              <a:rPr lang="en-US" sz="1050" dirty="0">
+                <a:solidFill>
+                  <a:schemeClr val="bg1"/>
+                </a:solidFill>
+              </a:rPr>
+              <a:t>, </a:t>
+            </a:r>
+            <a:r>
+              <a:rPr lang="en-US" sz="1050" dirty="0" err="1">
+                <a:solidFill>
+                  <a:schemeClr val="bg1"/>
+                </a:solidFill>
+              </a:rPr>
+              <a:t>QuizHelpCommand</a:t>
+            </a:r>
+            <a:r>
+              <a:rPr lang="en-US" sz="1050" dirty="0">
+                <a:solidFill>
+                  <a:schemeClr val="bg1"/>
+                </a:solidFill>
+              </a:rPr>
+              <a:t>, etc.</a:t>
+            </a:r>
+          </a:p>
+        </p:txBody>
+      </p:sp>
+      <p:cxnSp>
+        <p:nvCxnSpPr>
+          <p:cNvPr id="150" name="Connector: Elbow 149">
+            <a:extLst>
+              <a:ext uri="{FF2B5EF4-FFF2-40B4-BE49-F238E27FC236}">
+                <a16:creationId xmlns:a16="http://schemas.microsoft.com/office/drawing/2014/main" id="{1872641F-5C5C-4F24-8951-C2F967995378}"/>
+              </a:ext>
+            </a:extLst>
+          </p:cNvPr>
+          <p:cNvCxnSpPr>
+            <a:cxnSpLocks/>
+            <a:endCxn id="84" idx="1"/>
+          </p:cNvCxnSpPr>
+          <p:nvPr/>
+        </p:nvCxnSpPr>
+        <p:spPr>
+          <a:xfrm>
+            <a:off x="2237160" y="4031146"/>
+            <a:ext cx="3849286" cy="1244066"/>
+          </a:xfrm>
+          <a:prstGeom prst="bentConnector3">
+            <a:avLst>
+              <a:gd name="adj1" fmla="val -727"/>
+            </a:avLst>
+          </a:prstGeom>
+          <a:ln w="19050">
+            <a:solidFill>
+              <a:srgbClr val="0070C0"/>
+            </a:solidFill>
+            <a:prstDash val="sysDot"/>
+            <a:tailEnd type="triangle"/>
+          </a:ln>
+        </p:spPr>
+        <p:style>
+          <a:lnRef idx="1">
+            <a:schemeClr val="accent1"/>
+          </a:lnRef>
+          <a:fillRef idx="0">
+            <a:schemeClr val="accent1"/>
+          </a:fillRef>
+          <a:effectRef idx="0">
+            <a:schemeClr val="accent1"/>
+          </a:effectRef>
+          <a:fontRef idx="minor">
+            <a:schemeClr val="tx1"/>
+          </a:fontRef>
+        </p:style>
+      </p:cxnSp>
+      <p:sp>
+        <p:nvSpPr>
+          <p:cNvPr id="84" name="Rectangle 62">
+            <a:extLst>
+              <a:ext uri="{FF2B5EF4-FFF2-40B4-BE49-F238E27FC236}">
+                <a16:creationId xmlns:a16="http://schemas.microsoft.com/office/drawing/2014/main" id="{24E37B12-03AC-474A-8462-EC1D8F976E7A}"/>
+              </a:ext>
+            </a:extLst>
+          </p:cNvPr>
+          <p:cNvSpPr/>
+          <p:nvPr/>
+        </p:nvSpPr>
+        <p:spPr>
+          <a:xfrm>
+            <a:off x="6086446" y="5101832"/>
+            <a:ext cx="2316417" cy="346760"/>
+          </a:xfrm>
+          <a:prstGeom prst="rect">
+            <a:avLst/>
+          </a:prstGeom>
+          <a:ln w="19050">
+            <a:solidFill>
+              <a:srgbClr val="0070C0"/>
+            </a:solidFill>
+          </a:ln>
+          <a:effectLst/>
+        </p:spPr>
+        <p:style>
+          <a:lnRef idx="1">
+            <a:schemeClr val="accent1"/>
+          </a:lnRef>
+          <a:fillRef idx="2">
+            <a:schemeClr val="accent1"/>
+          </a:fillRef>
+          <a:effectRef idx="1">
+            <a:schemeClr val="accent1"/>
+          </a:effectRef>
+          <a:fontRef idx="minor">
+            <a:schemeClr val="dk1"/>
+          </a:fontRef>
+        </p:style>
+        <p:txBody>
+          <a:bodyPr rtlCol="0" anchor="ctr"/>
+          <a:lstStyle/>
+          <a:p>
+            <a:pPr algn="ctr"/>
+            <a:r>
+              <a:rPr lang="en-US" sz="1050" b="1" dirty="0">
+                <a:solidFill>
+                  <a:srgbClr val="0070C0"/>
+                </a:solidFill>
+              </a:rPr>
+              <a:t>&lt;&lt;interface&gt;&gt;</a:t>
+            </a:r>
+            <a:br>
+              <a:rPr lang="en-US" sz="1050" b="1" dirty="0">
+                <a:solidFill>
+                  <a:srgbClr val="0070C0"/>
+                </a:solidFill>
+              </a:rPr>
+            </a:br>
+            <a:r>
+              <a:rPr lang="en-US" sz="1050" b="1" dirty="0">
+                <a:solidFill>
+                  <a:srgbClr val="0070C0"/>
+                </a:solidFill>
+              </a:rPr>
+              <a:t>Command</a:t>
+            </a:r>
+            <a:endParaRPr lang="en-SG" sz="1050" b="1" dirty="0">
+              <a:solidFill>
+                <a:srgbClr val="0070C0"/>
+              </a:solidFill>
+            </a:endParaRPr>
+          </a:p>
+        </p:txBody>
+      </p:sp>
+      <p:sp>
+        <p:nvSpPr>
+          <p:cNvPr id="90" name="Isosceles Triangle 102">
+            <a:extLst>
+              <a:ext uri="{FF2B5EF4-FFF2-40B4-BE49-F238E27FC236}">
+                <a16:creationId xmlns:a16="http://schemas.microsoft.com/office/drawing/2014/main" id="{A55CF868-64BF-469B-9EDB-22B9DDC34AF3}"/>
+              </a:ext>
+            </a:extLst>
+          </p:cNvPr>
+          <p:cNvSpPr/>
+          <p:nvPr/>
+        </p:nvSpPr>
+        <p:spPr>
+          <a:xfrm flipV="1">
+            <a:off x="7610251" y="4922386"/>
+            <a:ext cx="270504" cy="175523"/>
+          </a:xfrm>
+          <a:prstGeom prst="triangle">
+            <a:avLst/>
+          </a:prstGeom>
+          <a:solidFill>
+            <a:schemeClr val="bg1"/>
+          </a:solidFill>
+          <a:ln w="19050">
+            <a:solidFill>
+              <a:srgbClr val="0070C0"/>
+            </a:solidFill>
+          </a:ln>
+          <a:effectLst/>
+        </p:spPr>
+        <p:style>
+          <a:lnRef idx="1">
+            <a:schemeClr val="accent1"/>
+          </a:lnRef>
+          <a:fillRef idx="2">
+            <a:schemeClr val="accent1"/>
+          </a:fillRef>
+          <a:effectRef idx="1">
+            <a:schemeClr val="accent1"/>
+          </a:effectRef>
+          <a:fontRef idx="minor">
+            <a:schemeClr val="dk1"/>
+          </a:fontRef>
+        </p:style>
+        <p:txBody>
+          <a:bodyPr rtlCol="0" anchor="ctr"/>
+          <a:lstStyle/>
+          <a:p>
+            <a:pPr algn="ctr"/>
+            <a:endParaRPr lang="en-SG" sz="1050" b="1" dirty="0">
+              <a:solidFill>
+                <a:srgbClr val="92D050"/>
+              </a:solidFill>
+            </a:endParaRPr>
+          </a:p>
+        </p:txBody>
+      </p:sp>
+      <p:cxnSp>
+        <p:nvCxnSpPr>
+          <p:cNvPr id="98" name="Elbow Connector 95">
+            <a:extLst>
+              <a:ext uri="{FF2B5EF4-FFF2-40B4-BE49-F238E27FC236}">
+                <a16:creationId xmlns:a16="http://schemas.microsoft.com/office/drawing/2014/main" id="{6F123ACC-925F-4AF9-A421-810B9E0762F4}"/>
+              </a:ext>
+            </a:extLst>
+          </p:cNvPr>
+          <p:cNvCxnSpPr>
+            <a:cxnSpLocks/>
+            <a:stCxn id="90" idx="3"/>
+            <a:endCxn id="12" idx="2"/>
+          </p:cNvCxnSpPr>
+          <p:nvPr/>
+        </p:nvCxnSpPr>
+        <p:spPr>
+          <a:xfrm flipV="1">
+            <a:off x="7745503" y="4436779"/>
+            <a:ext cx="0" cy="485607"/>
+          </a:xfrm>
+          <a:prstGeom prst="straightConnector1">
+            <a:avLst/>
+          </a:prstGeom>
+          <a:ln w="19050">
+            <a:prstDash val="sysDash"/>
+            <a:headEnd type="none" w="med" len="med"/>
+            <a:tailEnd type="none" w="med" len="med"/>
+          </a:ln>
+        </p:spPr>
+        <p:style>
+          <a:lnRef idx="1">
+            <a:schemeClr val="accent1"/>
+          </a:lnRef>
+          <a:fillRef idx="0">
+            <a:schemeClr val="accent1"/>
+          </a:fillRef>
+          <a:effectRef idx="0">
+            <a:schemeClr val="accent1"/>
+          </a:effectRef>
+          <a:fontRef idx="minor">
+            <a:schemeClr val="tx1"/>
+          </a:fontRef>
+        </p:style>
+      </p:cxnSp>
+      <p:sp>
+        <p:nvSpPr>
+          <p:cNvPr id="107" name="Isosceles Triangle 102">
+            <a:extLst>
+              <a:ext uri="{FF2B5EF4-FFF2-40B4-BE49-F238E27FC236}">
+                <a16:creationId xmlns:a16="http://schemas.microsoft.com/office/drawing/2014/main" id="{8E70E723-88DA-454E-9135-21CF00C1B5F1}"/>
+              </a:ext>
+            </a:extLst>
+          </p:cNvPr>
+          <p:cNvSpPr/>
+          <p:nvPr/>
+        </p:nvSpPr>
+        <p:spPr>
+          <a:xfrm flipV="1">
+            <a:off x="6451145" y="4922386"/>
+            <a:ext cx="270504" cy="175523"/>
+          </a:xfrm>
+          <a:prstGeom prst="triangle">
+            <a:avLst/>
+          </a:prstGeom>
+          <a:solidFill>
+            <a:schemeClr val="bg1"/>
+          </a:solidFill>
+          <a:ln w="19050">
+            <a:solidFill>
+              <a:srgbClr val="0070C0"/>
+            </a:solidFill>
+          </a:ln>
+          <a:effectLst/>
+        </p:spPr>
+        <p:style>
+          <a:lnRef idx="1">
+            <a:schemeClr val="accent1"/>
+          </a:lnRef>
+          <a:fillRef idx="2">
+            <a:schemeClr val="accent1"/>
+          </a:fillRef>
+          <a:effectRef idx="1">
+            <a:schemeClr val="accent1"/>
+          </a:effectRef>
+          <a:fontRef idx="minor">
+            <a:schemeClr val="dk1"/>
+          </a:fontRef>
+        </p:style>
+        <p:txBody>
+          <a:bodyPr rtlCol="0" anchor="ctr"/>
+          <a:lstStyle/>
+          <a:p>
+            <a:pPr algn="ctr"/>
+            <a:endParaRPr lang="en-SG" sz="1050" b="1" dirty="0">
+              <a:solidFill>
+                <a:srgbClr val="92D050"/>
+              </a:solidFill>
+            </a:endParaRPr>
+          </a:p>
+        </p:txBody>
+      </p:sp>
+      <p:cxnSp>
+        <p:nvCxnSpPr>
+          <p:cNvPr id="108" name="Elbow Connector 95">
+            <a:extLst>
+              <a:ext uri="{FF2B5EF4-FFF2-40B4-BE49-F238E27FC236}">
+                <a16:creationId xmlns:a16="http://schemas.microsoft.com/office/drawing/2014/main" id="{4FD98D2A-971E-4DAF-A1E5-F1B495BB4EB3}"/>
+              </a:ext>
+            </a:extLst>
+          </p:cNvPr>
+          <p:cNvCxnSpPr>
+            <a:cxnSpLocks/>
+            <a:stCxn id="107" idx="3"/>
+            <a:endCxn id="82" idx="2"/>
+          </p:cNvCxnSpPr>
+          <p:nvPr/>
+        </p:nvCxnSpPr>
+        <p:spPr>
+          <a:xfrm flipV="1">
+            <a:off x="6586397" y="4744067"/>
+            <a:ext cx="0" cy="178319"/>
+          </a:xfrm>
+          <a:prstGeom prst="straightConnector1">
+            <a:avLst/>
+          </a:prstGeom>
+          <a:ln w="19050">
+            <a:prstDash val="sysDash"/>
+            <a:headEnd type="none" w="med" len="med"/>
+            <a:tailEnd type="none" w="med" len="med"/>
+          </a:ln>
+        </p:spPr>
+        <p:style>
+          <a:lnRef idx="1">
+            <a:schemeClr val="accent1"/>
+          </a:lnRef>
+          <a:fillRef idx="0">
+            <a:schemeClr val="accent1"/>
+          </a:fillRef>
+          <a:effectRef idx="0">
+            <a:schemeClr val="accent1"/>
+          </a:effectRef>
+          <a:fontRef idx="minor">
+            <a:schemeClr val="tx1"/>
+          </a:fontRef>
+        </p:style>
+      </p:cxnSp>
+      <p:cxnSp>
+        <p:nvCxnSpPr>
+          <p:cNvPr id="111" name="Straight Arrow Connector 110">
+            <a:extLst>
+              <a:ext uri="{FF2B5EF4-FFF2-40B4-BE49-F238E27FC236}">
+                <a16:creationId xmlns:a16="http://schemas.microsoft.com/office/drawing/2014/main" id="{46D96253-BD7C-46CC-AAFD-C0E8699FDF53}"/>
+              </a:ext>
+            </a:extLst>
+          </p:cNvPr>
+          <p:cNvCxnSpPr>
+            <a:cxnSpLocks/>
+          </p:cNvCxnSpPr>
+          <p:nvPr/>
+        </p:nvCxnSpPr>
+        <p:spPr>
+          <a:xfrm>
+            <a:off x="7315200" y="5448592"/>
+            <a:ext cx="0" cy="286478"/>
+          </a:xfrm>
+          <a:prstGeom prst="straightConnector1">
+            <a:avLst/>
+          </a:prstGeom>
+          <a:ln w="19050">
+            <a:solidFill>
+              <a:srgbClr val="0070C0"/>
+            </a:solidFill>
+            <a:prstDash val="sysDot"/>
+            <a:headEnd type="none" w="med" len="med"/>
+            <a:tailEnd type="arrow" w="med" len="med"/>
+          </a:ln>
+          <a:effectLst/>
+        </p:spPr>
+        <p:style>
+          <a:lnRef idx="1">
+            <a:schemeClr val="accent2"/>
+          </a:lnRef>
+          <a:fillRef idx="2">
+            <a:schemeClr val="accent2"/>
+          </a:fillRef>
+          <a:effectRef idx="1">
+            <a:schemeClr val="accent2"/>
+          </a:effectRef>
+          <a:fontRef idx="minor">
+            <a:schemeClr val="dk1"/>
+          </a:fontRef>
+        </p:style>
+      </p:cxnSp>
+    </p:spTree>
+    <p:extLst>
+      <p:ext uri="{BB962C8B-B14F-4D97-AF65-F5344CB8AC3E}">
+        <p14:creationId xmlns:p14="http://schemas.microsoft.com/office/powerpoint/2010/main" val="3238488140"/>
+      </p:ext>
+    </p:extLst>
+  </p:cSld>
+  <p:clrMapOvr>
+    <a:masterClrMapping/>
+  </p:clrMapOvr>
+</p:sld>
+</file>
+
+<file path=ppt/slides/slide2.xml><?xml version="1.0" encoding="utf-8"?>
+<p:sld xmlns:a="http://schemas.openxmlformats.org/drawingml/2006/main" xmlns:r="http://schemas.openxmlformats.org/officeDocument/2006/relationships" xmlns:p="http://schemas.openxmlformats.org/presentationml/2006/main">
+  <p:cSld>
+    <p:spTree>
+      <p:nvGrpSpPr>
+        <p:cNvPr id="1" name=""/>
+        <p:cNvGrpSpPr/>
+        <p:nvPr/>
+      </p:nvGrpSpPr>
+      <p:grpSpPr>
+        <a:xfrm>
+          <a:off x="0" y="0"/>
+          <a:ext cx="0" cy="0"/>
+          <a:chOff x="0" y="0"/>
+          <a:chExt cx="0" cy="0"/>
+        </a:xfrm>
+      </p:grpSpPr>
+      <p:sp>
+        <p:nvSpPr>
+          <p:cNvPr id="2" name="Big blue box"/>
+          <p:cNvSpPr/>
+          <p:nvPr/>
+        </p:nvSpPr>
+        <p:spPr>
+          <a:xfrm>
+            <a:off x="741132" y="1008011"/>
+            <a:ext cx="7945668" cy="4017784"/>
+          </a:xfrm>
+          <a:prstGeom prst="roundRect">
+            <a:avLst>
+              <a:gd name="adj" fmla="val 3484"/>
+            </a:avLst>
+          </a:prstGeom>
+          <a:solidFill>
+            <a:schemeClr val="accent1">
+              <a:lumMod val="20000"/>
+              <a:lumOff val="80000"/>
+            </a:schemeClr>
+          </a:solidFill>
+          <a:ln w="19050">
+            <a:noFill/>
+          </a:ln>
+          <a:effectLst/>
+        </p:spPr>
+        <p:style>
+          <a:lnRef idx="1">
+            <a:schemeClr val="accent2"/>
+          </a:lnRef>
+          <a:fillRef idx="2">
+            <a:schemeClr val="accent2"/>
+          </a:fillRef>
+          <a:effectRef idx="1">
+            <a:schemeClr val="accent2"/>
+          </a:effectRef>
+          <a:fontRef idx="minor">
+            <a:schemeClr val="dk1"/>
+          </a:fontRef>
+        </p:style>
+        <p:txBody>
+          <a:bodyPr rtlCol="0" anchor="t"/>
+          <a:lstStyle/>
+          <a:p>
+            <a:r>
+              <a:rPr lang="en-US" sz="1200" b="1" dirty="0">
+                <a:solidFill>
+                  <a:srgbClr val="0070C0"/>
+                </a:solidFill>
+              </a:rPr>
+              <a:t>Logic</a:t>
+            </a:r>
+            <a:endParaRPr lang="en-SG" sz="1200" b="1" dirty="0">
+              <a:solidFill>
+                <a:srgbClr val="0070C0"/>
+              </a:solidFill>
+            </a:endParaRPr>
+          </a:p>
+        </p:txBody>
+      </p:sp>
+      <p:sp>
+        <p:nvSpPr>
+          <p:cNvPr id="3" name="Rectangle 8"/>
+          <p:cNvSpPr/>
+          <p:nvPr/>
+        </p:nvSpPr>
+        <p:spPr>
+          <a:xfrm>
+            <a:off x="1763592" y="1346677"/>
+            <a:ext cx="1093635" cy="346760"/>
+          </a:xfrm>
+          <a:prstGeom prst="rect">
+            <a:avLst/>
+          </a:prstGeom>
+          <a:solidFill>
+            <a:srgbClr val="0070C0"/>
+          </a:solidFill>
+          <a:ln w="19050">
+            <a:solidFill>
+              <a:srgbClr val="0070C0"/>
+            </a:solidFill>
+          </a:ln>
+          <a:effectLst/>
+        </p:spPr>
+        <p:style>
+          <a:lnRef idx="1">
+            <a:schemeClr val="accent2"/>
+          </a:lnRef>
+          <a:fillRef idx="2">
+            <a:schemeClr val="accent2"/>
+          </a:fillRef>
+          <a:effectRef idx="1">
+            <a:schemeClr val="accent2"/>
+          </a:effectRef>
+          <a:fontRef idx="minor">
+            <a:schemeClr val="dk1"/>
+          </a:fontRef>
+        </p:style>
+        <p:txBody>
+          <a:bodyPr rtlCol="0" anchor="ctr"/>
+          <a:lstStyle/>
+          <a:p>
+            <a:pPr algn="ctr"/>
+            <a:r>
+              <a:rPr lang="en-US" sz="1050" dirty="0" err="1">
+                <a:solidFill>
+                  <a:schemeClr val="bg1"/>
+                </a:solidFill>
+              </a:rPr>
+              <a:t>CommandResult</a:t>
+            </a:r>
+            <a:endParaRPr lang="en-SG" sz="1050" dirty="0">
+              <a:solidFill>
+                <a:schemeClr val="bg1"/>
+              </a:solidFill>
+            </a:endParaRPr>
+          </a:p>
+        </p:txBody>
+      </p:sp>
+      <p:sp>
+        <p:nvSpPr>
+          <p:cNvPr id="4" name="Rectangle 11"/>
+          <p:cNvSpPr/>
+          <p:nvPr/>
+        </p:nvSpPr>
+        <p:spPr>
+          <a:xfrm flipH="1">
+            <a:off x="7188502" y="2833762"/>
+            <a:ext cx="970326" cy="346760"/>
+          </a:xfrm>
+          <a:prstGeom prst="rect">
+            <a:avLst/>
+          </a:prstGeom>
+          <a:ln w="19050">
+            <a:solidFill>
+              <a:srgbClr val="0070C0"/>
+            </a:solidFill>
+          </a:ln>
+          <a:effectLst/>
+        </p:spPr>
+        <p:style>
+          <a:lnRef idx="1">
+            <a:schemeClr val="accent1"/>
+          </a:lnRef>
+          <a:fillRef idx="2">
+            <a:schemeClr val="accent1"/>
+          </a:fillRef>
+          <a:effectRef idx="1">
+            <a:schemeClr val="accent1"/>
+          </a:effectRef>
+          <a:fontRef idx="minor">
+            <a:schemeClr val="dk1"/>
+          </a:fontRef>
+        </p:style>
+        <p:txBody>
+          <a:bodyPr rtlCol="0" anchor="ctr"/>
+          <a:lstStyle/>
+          <a:p>
+            <a:pPr algn="ctr"/>
+            <a:r>
+              <a:rPr lang="en-US" sz="1050" b="1" dirty="0" err="1">
+                <a:solidFill>
+                  <a:srgbClr val="0070C0"/>
+                </a:solidFill>
+              </a:rPr>
+              <a:t>XYZCommand</a:t>
+            </a:r>
+            <a:endParaRPr lang="en-SG" sz="1050" b="1" dirty="0">
+              <a:solidFill>
+                <a:srgbClr val="0070C0"/>
+              </a:solidFill>
+            </a:endParaRPr>
+          </a:p>
+        </p:txBody>
+      </p:sp>
+      <p:sp>
+        <p:nvSpPr>
+          <p:cNvPr id="5" name="Rectangle 62"/>
+          <p:cNvSpPr/>
+          <p:nvPr/>
+        </p:nvSpPr>
+        <p:spPr>
+          <a:xfrm>
+            <a:off x="1450139" y="3677140"/>
+            <a:ext cx="1093635" cy="346760"/>
+          </a:xfrm>
+          <a:prstGeom prst="rect">
+            <a:avLst/>
+          </a:prstGeom>
+          <a:solidFill>
+            <a:srgbClr val="0070C0"/>
+          </a:solidFill>
+          <a:ln w="19050">
+            <a:solidFill>
+              <a:srgbClr val="0070C0"/>
+            </a:solidFill>
+          </a:ln>
+          <a:effectLst/>
+        </p:spPr>
+        <p:style>
+          <a:lnRef idx="1">
+            <a:schemeClr val="accent2"/>
+          </a:lnRef>
+          <a:fillRef idx="2">
+            <a:schemeClr val="accent2"/>
+          </a:fillRef>
+          <a:effectRef idx="1">
+            <a:schemeClr val="accent2"/>
+          </a:effectRef>
+          <a:fontRef idx="minor">
+            <a:schemeClr val="dk1"/>
+          </a:fontRef>
+        </p:style>
+        <p:txBody>
+          <a:bodyPr rtlCol="0" anchor="ctr"/>
+          <a:lstStyle/>
+          <a:p>
+            <a:pPr algn="ctr"/>
+            <a:r>
+              <a:rPr lang="en-US" sz="1050" dirty="0" err="1">
+                <a:solidFill>
+                  <a:schemeClr val="bg1"/>
+                </a:solidFill>
+              </a:rPr>
+              <a:t>LogicManager</a:t>
+            </a:r>
+            <a:endParaRPr lang="en-SG" sz="1050" dirty="0">
+              <a:solidFill>
+                <a:schemeClr val="bg1"/>
+              </a:solidFill>
+            </a:endParaRPr>
+          </a:p>
+        </p:txBody>
+      </p:sp>
+      <p:cxnSp>
+        <p:nvCxnSpPr>
+          <p:cNvPr id="6" name="Elbow Connector 63"/>
+          <p:cNvCxnSpPr>
+            <a:cxnSpLocks/>
+            <a:stCxn id="12" idx="3"/>
+          </p:cNvCxnSpPr>
+          <p:nvPr/>
+        </p:nvCxnSpPr>
+        <p:spPr>
+          <a:xfrm flipH="1" flipV="1">
+            <a:off x="2853970" y="1637121"/>
+            <a:ext cx="5493242" cy="2550572"/>
+          </a:xfrm>
+          <a:prstGeom prst="bentConnector3">
+            <a:avLst>
+              <a:gd name="adj1" fmla="val -4161"/>
+            </a:avLst>
+          </a:prstGeom>
+          <a:ln w="19050">
+            <a:solidFill>
+              <a:srgbClr val="0070C0"/>
+            </a:solidFill>
+            <a:prstDash val="sysDot"/>
+            <a:headEnd type="none" w="med" len="med"/>
+            <a:tailEnd type="arrow" w="med" len="med"/>
+          </a:ln>
+          <a:effectLst/>
+        </p:spPr>
+        <p:style>
+          <a:lnRef idx="1">
+            <a:schemeClr val="accent2"/>
+          </a:lnRef>
+          <a:fillRef idx="2">
+            <a:schemeClr val="accent2"/>
+          </a:fillRef>
+          <a:effectRef idx="1">
+            <a:schemeClr val="accent2"/>
+          </a:effectRef>
+          <a:fontRef idx="minor">
+            <a:schemeClr val="dk1"/>
+          </a:fontRef>
+        </p:style>
+      </p:cxnSp>
+      <p:cxnSp>
+        <p:nvCxnSpPr>
+          <p:cNvPr id="8" name="Elbow Connector 122"/>
+          <p:cNvCxnSpPr>
+            <a:endCxn id="3" idx="1"/>
+          </p:cNvCxnSpPr>
+          <p:nvPr/>
+        </p:nvCxnSpPr>
+        <p:spPr>
+          <a:xfrm>
+            <a:off x="1344044" y="1517197"/>
+            <a:ext cx="419548" cy="2860"/>
+          </a:xfrm>
+          <a:prstGeom prst="bentConnector3">
+            <a:avLst>
+              <a:gd name="adj1" fmla="val 50000"/>
+            </a:avLst>
+          </a:prstGeom>
+          <a:ln w="19050">
+            <a:solidFill>
+              <a:srgbClr val="0070C0"/>
+            </a:solidFill>
+            <a:prstDash val="sysDot"/>
+            <a:headEnd type="none" w="med" len="med"/>
+            <a:tailEnd type="arrow" w="med" len="med"/>
+          </a:ln>
+          <a:effectLst/>
+        </p:spPr>
+        <p:style>
+          <a:lnRef idx="1">
+            <a:schemeClr val="accent2"/>
+          </a:lnRef>
+          <a:fillRef idx="2">
+            <a:schemeClr val="accent2"/>
+          </a:fillRef>
+          <a:effectRef idx="1">
+            <a:schemeClr val="accent2"/>
+          </a:effectRef>
+          <a:fontRef idx="minor">
+            <a:schemeClr val="dk1"/>
+          </a:fontRef>
+        </p:style>
+      </p:cxnSp>
+      <p:sp>
+        <p:nvSpPr>
+          <p:cNvPr id="9" name="Rectangle 65"/>
+          <p:cNvSpPr/>
+          <p:nvPr/>
+        </p:nvSpPr>
+        <p:spPr>
+          <a:xfrm>
+            <a:off x="734444" y="5173582"/>
+            <a:ext cx="7945668" cy="328045"/>
+          </a:xfrm>
+          <a:prstGeom prst="roundRect">
+            <a:avLst/>
+          </a:prstGeom>
+          <a:solidFill>
+            <a:schemeClr val="accent4">
+              <a:lumMod val="20000"/>
+              <a:lumOff val="80000"/>
+            </a:schemeClr>
+          </a:solidFill>
+          <a:ln w="19050">
+            <a:noFill/>
+          </a:ln>
+          <a:effectLst/>
+        </p:spPr>
+        <p:style>
+          <a:lnRef idx="1">
+            <a:schemeClr val="accent2"/>
+          </a:lnRef>
+          <a:fillRef idx="2">
+            <a:schemeClr val="accent2"/>
+          </a:fillRef>
+          <a:effectRef idx="1">
+            <a:schemeClr val="accent2"/>
+          </a:effectRef>
+          <a:fontRef idx="minor">
+            <a:schemeClr val="dk1"/>
+          </a:fontRef>
+        </p:style>
+        <p:txBody>
+          <a:bodyPr rtlCol="0" anchor="ctr"/>
+          <a:lstStyle/>
+          <a:p>
+            <a:pPr algn="ctr"/>
+            <a:r>
+              <a:rPr lang="en-US" sz="1100" b="1" dirty="0" err="1">
+                <a:solidFill>
+                  <a:schemeClr val="bg1"/>
+                </a:solidFill>
+              </a:rPr>
+              <a:t>ManagementModel</a:t>
+            </a:r>
+            <a:endParaRPr lang="en-SG" sz="1100" b="1" dirty="0">
+              <a:solidFill>
+                <a:schemeClr val="bg1"/>
+              </a:solidFill>
+            </a:endParaRPr>
+          </a:p>
+        </p:txBody>
+      </p:sp>
+      <p:sp>
+        <p:nvSpPr>
+          <p:cNvPr id="12" name="Rectangle 62"/>
+          <p:cNvSpPr/>
+          <p:nvPr/>
+        </p:nvSpPr>
+        <p:spPr>
+          <a:xfrm>
+            <a:off x="7143794" y="3938606"/>
+            <a:ext cx="1203418" cy="498173"/>
+          </a:xfrm>
+          <a:prstGeom prst="rect">
+            <a:avLst/>
+          </a:prstGeom>
+          <a:ln w="19050">
+            <a:solidFill>
+              <a:srgbClr val="0070C0"/>
+            </a:solidFill>
+          </a:ln>
+          <a:effectLst/>
+        </p:spPr>
+        <p:style>
+          <a:lnRef idx="1">
+            <a:schemeClr val="accent1"/>
+          </a:lnRef>
+          <a:fillRef idx="2">
+            <a:schemeClr val="accent1"/>
+          </a:fillRef>
+          <a:effectRef idx="1">
+            <a:schemeClr val="accent1"/>
+          </a:effectRef>
+          <a:fontRef idx="minor">
+            <a:schemeClr val="dk1"/>
+          </a:fontRef>
+        </p:style>
+        <p:txBody>
+          <a:bodyPr rtlCol="0" anchor="ctr"/>
+          <a:lstStyle/>
+          <a:p>
+            <a:pPr algn="ctr"/>
+            <a:r>
+              <a:rPr lang="en-US" sz="1050" b="1" dirty="0">
+                <a:solidFill>
+                  <a:srgbClr val="0070C0"/>
+                </a:solidFill>
+              </a:rPr>
+              <a:t>{abstract}</a:t>
+            </a:r>
+            <a:br>
+              <a:rPr lang="en-US" sz="1050" b="1" dirty="0">
+                <a:solidFill>
+                  <a:srgbClr val="0070C0"/>
+                </a:solidFill>
+              </a:rPr>
+            </a:br>
+            <a:r>
+              <a:rPr lang="en-US" sz="1050" b="1" dirty="0">
+                <a:solidFill>
+                  <a:srgbClr val="0070C0"/>
+                </a:solidFill>
+              </a:rPr>
+              <a:t>Management</a:t>
+            </a:r>
+            <a:br>
+              <a:rPr lang="en-US" sz="1050" b="1" dirty="0">
+                <a:solidFill>
+                  <a:srgbClr val="0070C0"/>
+                </a:solidFill>
+              </a:rPr>
+            </a:br>
+            <a:r>
+              <a:rPr lang="en-US" sz="1050" b="1" dirty="0">
+                <a:solidFill>
+                  <a:srgbClr val="0070C0"/>
+                </a:solidFill>
+              </a:rPr>
+              <a:t>Command</a:t>
+            </a:r>
+            <a:endParaRPr lang="en-SG" sz="1050" b="1" dirty="0">
+              <a:solidFill>
+                <a:srgbClr val="0070C0"/>
+              </a:solidFill>
+            </a:endParaRPr>
+          </a:p>
+        </p:txBody>
+      </p:sp>
+      <p:cxnSp>
+        <p:nvCxnSpPr>
+          <p:cNvPr id="18" name="Straight Arrow Connector 110"/>
+          <p:cNvCxnSpPr>
+            <a:cxnSpLocks/>
+            <a:stCxn id="12" idx="2"/>
+          </p:cNvCxnSpPr>
+          <p:nvPr/>
+        </p:nvCxnSpPr>
+        <p:spPr>
+          <a:xfrm>
+            <a:off x="7745503" y="4436779"/>
+            <a:ext cx="0" cy="779128"/>
+          </a:xfrm>
+          <a:prstGeom prst="straightConnector1">
+            <a:avLst/>
+          </a:prstGeom>
+          <a:ln w="19050">
+            <a:solidFill>
+              <a:srgbClr val="0070C0"/>
+            </a:solidFill>
+            <a:prstDash val="sysDot"/>
+            <a:headEnd type="none" w="med" len="med"/>
+            <a:tailEnd type="arrow" w="med" len="med"/>
+          </a:ln>
+          <a:effectLst/>
+        </p:spPr>
+        <p:style>
+          <a:lnRef idx="1">
+            <a:schemeClr val="accent2"/>
+          </a:lnRef>
+          <a:fillRef idx="2">
+            <a:schemeClr val="accent2"/>
+          </a:fillRef>
+          <a:effectRef idx="1">
+            <a:schemeClr val="accent2"/>
+          </a:effectRef>
+          <a:fontRef idx="minor">
+            <a:schemeClr val="dk1"/>
+          </a:fontRef>
+        </p:style>
+      </p:cxnSp>
+      <p:sp>
+        <p:nvSpPr>
+          <p:cNvPr id="19" name="Rectangle 62"/>
+          <p:cNvSpPr/>
+          <p:nvPr/>
+        </p:nvSpPr>
+        <p:spPr>
+          <a:xfrm rot="16200000">
+            <a:off x="65764" y="2244330"/>
+            <a:ext cx="2209800" cy="346760"/>
+          </a:xfrm>
+          <a:prstGeom prst="rect">
+            <a:avLst/>
+          </a:prstGeom>
+          <a:solidFill>
+            <a:srgbClr val="0070C0"/>
+          </a:solidFill>
+          <a:ln w="19050">
+            <a:solidFill>
+              <a:srgbClr val="0070C0"/>
+            </a:solidFill>
+          </a:ln>
+          <a:effectLst/>
+        </p:spPr>
+        <p:style>
+          <a:lnRef idx="1">
+            <a:schemeClr val="accent2"/>
+          </a:lnRef>
+          <a:fillRef idx="2">
+            <a:schemeClr val="accent2"/>
+          </a:fillRef>
+          <a:effectRef idx="1">
+            <a:schemeClr val="accent2"/>
+          </a:effectRef>
+          <a:fontRef idx="minor">
+            <a:schemeClr val="dk1"/>
+          </a:fontRef>
+        </p:style>
+        <p:txBody>
+          <a:bodyPr rtlCol="0" anchor="ctr"/>
+          <a:lstStyle/>
+          <a:p>
+            <a:pPr algn="ctr"/>
+            <a:r>
+              <a:rPr lang="en-US" sz="1050" dirty="0">
+                <a:solidFill>
+                  <a:schemeClr val="bg1"/>
+                </a:solidFill>
+              </a:rPr>
+              <a:t>&lt;&lt;interface&gt;&gt;</a:t>
+            </a:r>
+          </a:p>
+          <a:p>
+            <a:pPr algn="ctr"/>
+            <a:r>
+              <a:rPr lang="en-US" sz="1050" dirty="0">
+                <a:solidFill>
+                  <a:schemeClr val="bg1"/>
+                </a:solidFill>
+              </a:rPr>
+              <a:t>Logic</a:t>
+            </a:r>
+            <a:endParaRPr lang="en-SG" sz="1050" dirty="0">
+              <a:solidFill>
+                <a:schemeClr val="bg1"/>
+              </a:solidFill>
+            </a:endParaRPr>
+          </a:p>
+        </p:txBody>
+      </p:sp>
+      <p:sp>
+        <p:nvSpPr>
+          <p:cNvPr id="20" name="Isosceles Triangle 102"/>
+          <p:cNvSpPr/>
+          <p:nvPr/>
+        </p:nvSpPr>
+        <p:spPr>
+          <a:xfrm>
+            <a:off x="1026683" y="3522610"/>
+            <a:ext cx="270504" cy="175523"/>
+          </a:xfrm>
+          <a:prstGeom prst="triangle">
+            <a:avLst/>
+          </a:prstGeom>
+          <a:solidFill>
+            <a:schemeClr val="tx2">
+              <a:lumMod val="60000"/>
+              <a:lumOff val="40000"/>
+            </a:schemeClr>
+          </a:solidFill>
+          <a:ln w="19050">
+            <a:solidFill>
+              <a:srgbClr val="0070C0"/>
+            </a:solidFill>
+          </a:ln>
+          <a:effectLst/>
+        </p:spPr>
+        <p:style>
+          <a:lnRef idx="1">
+            <a:schemeClr val="accent1"/>
+          </a:lnRef>
+          <a:fillRef idx="2">
+            <a:schemeClr val="accent1"/>
+          </a:fillRef>
+          <a:effectRef idx="1">
+            <a:schemeClr val="accent1"/>
+          </a:effectRef>
+          <a:fontRef idx="minor">
+            <a:schemeClr val="dk1"/>
+          </a:fontRef>
+        </p:style>
+        <p:txBody>
+          <a:bodyPr rtlCol="0" anchor="ctr"/>
+          <a:lstStyle/>
+          <a:p>
+            <a:pPr algn="ctr"/>
+            <a:endParaRPr lang="en-SG" sz="1050" b="1">
+              <a:solidFill>
+                <a:srgbClr val="92D050"/>
+              </a:solidFill>
+            </a:endParaRPr>
+          </a:p>
+        </p:txBody>
+      </p:sp>
+      <p:cxnSp>
+        <p:nvCxnSpPr>
+          <p:cNvPr id="21" name="Elbow Connector 63"/>
+          <p:cNvCxnSpPr>
+            <a:stCxn id="5" idx="1"/>
+            <a:endCxn id="20" idx="3"/>
+          </p:cNvCxnSpPr>
+          <p:nvPr/>
+        </p:nvCxnSpPr>
+        <p:spPr>
+          <a:xfrm rot="10800000">
+            <a:off x="1161935" y="3698134"/>
+            <a:ext cx="288204" cy="152387"/>
+          </a:xfrm>
+          <a:prstGeom prst="bentConnector2">
+            <a:avLst/>
+          </a:prstGeom>
+          <a:ln w="19050">
+            <a:solidFill>
+              <a:srgbClr val="0070C0"/>
+            </a:solidFill>
+            <a:prstDash val="sysDot"/>
+            <a:headEnd type="none" w="med" len="med"/>
+            <a:tailEnd type="none" w="med" len="med"/>
+          </a:ln>
+          <a:effectLst/>
+        </p:spPr>
+        <p:style>
+          <a:lnRef idx="1">
+            <a:schemeClr val="accent2"/>
+          </a:lnRef>
+          <a:fillRef idx="2">
+            <a:schemeClr val="accent2"/>
+          </a:fillRef>
+          <a:effectRef idx="1">
+            <a:schemeClr val="accent2"/>
+          </a:effectRef>
+          <a:fontRef idx="minor">
+            <a:schemeClr val="dk1"/>
+          </a:fontRef>
+        </p:style>
+      </p:cxnSp>
+      <p:cxnSp>
+        <p:nvCxnSpPr>
+          <p:cNvPr id="23" name="Straight Arrow Connector 57"/>
+          <p:cNvCxnSpPr>
+            <a:cxnSpLocks/>
+            <a:stCxn id="5" idx="2"/>
+          </p:cNvCxnSpPr>
+          <p:nvPr/>
+        </p:nvCxnSpPr>
+        <p:spPr>
+          <a:xfrm>
+            <a:off x="1996957" y="4023900"/>
+            <a:ext cx="0" cy="1149682"/>
+          </a:xfrm>
+          <a:prstGeom prst="straightConnector1">
+            <a:avLst/>
+          </a:prstGeom>
+          <a:ln w="19050">
+            <a:solidFill>
+              <a:srgbClr val="0070C0"/>
+            </a:solidFill>
+            <a:headEnd type="none" w="med" len="med"/>
+            <a:tailEnd type="arrow" w="med" len="med"/>
+          </a:ln>
+          <a:effectLst/>
+        </p:spPr>
+        <p:style>
+          <a:lnRef idx="1">
+            <a:schemeClr val="accent2"/>
+          </a:lnRef>
+          <a:fillRef idx="2">
+            <a:schemeClr val="accent2"/>
+          </a:fillRef>
+          <a:effectRef idx="1">
+            <a:schemeClr val="accent2"/>
+          </a:effectRef>
+          <a:fontRef idx="minor">
+            <a:schemeClr val="dk1"/>
+          </a:fontRef>
+        </p:style>
+      </p:cxnSp>
+      <p:cxnSp>
+        <p:nvCxnSpPr>
+          <p:cNvPr id="24" name="Elbow Connector 122"/>
+          <p:cNvCxnSpPr/>
+          <p:nvPr/>
+        </p:nvCxnSpPr>
+        <p:spPr>
+          <a:xfrm>
+            <a:off x="560955" y="2926115"/>
+            <a:ext cx="419548" cy="2860"/>
+          </a:xfrm>
+          <a:prstGeom prst="bentConnector3">
+            <a:avLst>
+              <a:gd name="adj1" fmla="val 50000"/>
+            </a:avLst>
+          </a:prstGeom>
+          <a:ln w="19050">
+            <a:solidFill>
+              <a:schemeClr val="bg1">
+                <a:lumMod val="75000"/>
+              </a:schemeClr>
+            </a:solidFill>
+            <a:prstDash val="sysDot"/>
+            <a:headEnd type="none" w="med" len="med"/>
+            <a:tailEnd type="arrow" w="med" len="med"/>
+          </a:ln>
+          <a:effectLst/>
+        </p:spPr>
+        <p:style>
+          <a:lnRef idx="1">
+            <a:schemeClr val="accent2"/>
+          </a:lnRef>
+          <a:fillRef idx="2">
+            <a:schemeClr val="accent2"/>
+          </a:fillRef>
+          <a:effectRef idx="1">
+            <a:schemeClr val="accent2"/>
+          </a:effectRef>
+          <a:fontRef idx="minor">
+            <a:schemeClr val="dk1"/>
+          </a:fontRef>
+        </p:style>
+      </p:cxnSp>
+      <p:cxnSp>
+        <p:nvCxnSpPr>
+          <p:cNvPr id="25" name="Elbow Connector 63"/>
+          <p:cNvCxnSpPr>
+            <a:cxnSpLocks/>
+            <a:endCxn id="12" idx="1"/>
+          </p:cNvCxnSpPr>
+          <p:nvPr/>
+        </p:nvCxnSpPr>
+        <p:spPr>
+          <a:xfrm>
+            <a:off x="2348902" y="3999966"/>
+            <a:ext cx="4794892" cy="187727"/>
+          </a:xfrm>
+          <a:prstGeom prst="bentConnector3">
+            <a:avLst>
+              <a:gd name="adj1" fmla="val 404"/>
+            </a:avLst>
+          </a:prstGeom>
+          <a:ln w="19050">
+            <a:solidFill>
+              <a:srgbClr val="0070C0"/>
+            </a:solidFill>
+            <a:prstDash val="sysDot"/>
+            <a:headEnd type="none" w="med" len="med"/>
+            <a:tailEnd type="arrow" w="med" len="med"/>
+          </a:ln>
+          <a:effectLst/>
+        </p:spPr>
+        <p:style>
+          <a:lnRef idx="1">
+            <a:schemeClr val="accent2"/>
+          </a:lnRef>
+          <a:fillRef idx="2">
+            <a:schemeClr val="accent2"/>
+          </a:fillRef>
+          <a:effectRef idx="1">
+            <a:schemeClr val="accent2"/>
+          </a:effectRef>
+          <a:fontRef idx="minor">
+            <a:schemeClr val="dk1"/>
+          </a:fontRef>
+        </p:style>
+      </p:cxnSp>
+      <p:grpSp>
+        <p:nvGrpSpPr>
+          <p:cNvPr id="26" name="Group 25"/>
+          <p:cNvGrpSpPr/>
+          <p:nvPr/>
+        </p:nvGrpSpPr>
+        <p:grpSpPr>
+          <a:xfrm>
+            <a:off x="4264695" y="4007212"/>
+            <a:ext cx="851022" cy="230832"/>
+            <a:chOff x="2627664" y="781502"/>
+            <a:chExt cx="851022" cy="230832"/>
+          </a:xfrm>
+        </p:grpSpPr>
+        <p:sp>
+          <p:nvSpPr>
+            <p:cNvPr id="27" name="TextBox 26"/>
+            <p:cNvSpPr txBox="1"/>
+            <p:nvPr/>
+          </p:nvSpPr>
+          <p:spPr>
+            <a:xfrm>
+              <a:off x="2627664" y="781502"/>
+              <a:ext cx="728806" cy="230832"/>
+            </a:xfrm>
+            <a:prstGeom prst="rect">
+              <a:avLst/>
+            </a:prstGeom>
+            <a:noFill/>
+          </p:spPr>
+          <p:txBody>
+            <a:bodyPr wrap="square" lIns="0" tIns="0" rIns="0" bIns="0" rtlCol="0">
+              <a:noAutofit/>
+            </a:bodyPr>
+            <a:lstStyle/>
+            <a:p>
+              <a:pPr algn="r"/>
+              <a:r>
+                <a:rPr lang="en-US" sz="1100" dirty="0">
+                  <a:solidFill>
+                    <a:srgbClr val="0070C0"/>
+                  </a:solidFill>
+                </a:rPr>
+                <a:t>executes</a:t>
+              </a:r>
+              <a:endParaRPr lang="en-SG" sz="1100" dirty="0">
+                <a:solidFill>
+                  <a:srgbClr val="0070C0"/>
+                </a:solidFill>
+              </a:endParaRPr>
+            </a:p>
+          </p:txBody>
+        </p:sp>
+        <p:sp>
+          <p:nvSpPr>
+            <p:cNvPr id="28" name="Isosceles Triangle 27"/>
+            <p:cNvSpPr/>
+            <p:nvPr/>
+          </p:nvSpPr>
+          <p:spPr>
+            <a:xfrm rot="5400000">
+              <a:off x="3377610" y="840682"/>
+              <a:ext cx="125951" cy="76201"/>
+            </a:xfrm>
+            <a:prstGeom prst="triangle">
+              <a:avLst/>
+            </a:prstGeom>
+            <a:solidFill>
+              <a:srgbClr val="0070C0"/>
+            </a:solidFill>
+            <a:ln>
+              <a:noFill/>
+            </a:ln>
+          </p:spPr>
+          <p:style>
+            <a:lnRef idx="2">
+              <a:schemeClr val="accent1">
+                <a:shade val="50000"/>
+              </a:schemeClr>
+            </a:lnRef>
+            <a:fillRef idx="1">
+              <a:schemeClr val="accent1"/>
+            </a:fillRef>
+            <a:effectRef idx="0">
+              <a:schemeClr val="accent1"/>
+            </a:effectRef>
+            <a:fontRef idx="minor">
+              <a:schemeClr val="lt1"/>
+            </a:fontRef>
+          </p:style>
+          <p:txBody>
+            <a:bodyPr rtlCol="0" anchor="ctr"/>
+            <a:lstStyle/>
+            <a:p>
+              <a:pPr algn="ctr"/>
+              <a:endParaRPr lang="en-SG"/>
+            </a:p>
+          </p:txBody>
+        </p:sp>
+      </p:grpSp>
+      <p:grpSp>
+        <p:nvGrpSpPr>
+          <p:cNvPr id="29" name="Group 28"/>
+          <p:cNvGrpSpPr/>
+          <p:nvPr/>
+        </p:nvGrpSpPr>
+        <p:grpSpPr>
+          <a:xfrm>
+            <a:off x="4307702" y="1447009"/>
+            <a:ext cx="868568" cy="230832"/>
+            <a:chOff x="2755838" y="789460"/>
+            <a:chExt cx="868568" cy="230832"/>
+          </a:xfrm>
+        </p:grpSpPr>
+        <p:sp>
+          <p:nvSpPr>
+            <p:cNvPr id="30" name="TextBox 29"/>
+            <p:cNvSpPr txBox="1"/>
+            <p:nvPr/>
+          </p:nvSpPr>
+          <p:spPr>
+            <a:xfrm>
+              <a:off x="2895600" y="789460"/>
+              <a:ext cx="728806" cy="230832"/>
+            </a:xfrm>
+            <a:prstGeom prst="rect">
+              <a:avLst/>
+            </a:prstGeom>
+            <a:noFill/>
+          </p:spPr>
+          <p:txBody>
+            <a:bodyPr wrap="square" lIns="0" tIns="0" rIns="0" bIns="0" rtlCol="0">
+              <a:noAutofit/>
+            </a:bodyPr>
+            <a:lstStyle/>
+            <a:p>
+              <a:r>
+                <a:rPr lang="en-US" sz="1100" dirty="0">
+                  <a:solidFill>
+                    <a:srgbClr val="0070C0"/>
+                  </a:solidFill>
+                </a:rPr>
+                <a:t>produces</a:t>
+              </a:r>
+              <a:endParaRPr lang="en-SG" sz="1100" dirty="0">
+                <a:solidFill>
+                  <a:srgbClr val="0070C0"/>
+                </a:solidFill>
+              </a:endParaRPr>
+            </a:p>
+          </p:txBody>
+        </p:sp>
+        <p:sp>
+          <p:nvSpPr>
+            <p:cNvPr id="31" name="Isosceles Triangle 30"/>
+            <p:cNvSpPr/>
+            <p:nvPr/>
+          </p:nvSpPr>
+          <p:spPr>
+            <a:xfrm rot="16200000" flipH="1">
+              <a:off x="2730963" y="857181"/>
+              <a:ext cx="125951" cy="76201"/>
+            </a:xfrm>
+            <a:prstGeom prst="triangle">
+              <a:avLst/>
+            </a:prstGeom>
+            <a:solidFill>
+              <a:srgbClr val="0070C0"/>
+            </a:solidFill>
+            <a:ln>
+              <a:noFill/>
+            </a:ln>
+          </p:spPr>
+          <p:style>
+            <a:lnRef idx="2">
+              <a:schemeClr val="accent1">
+                <a:shade val="50000"/>
+              </a:schemeClr>
+            </a:lnRef>
+            <a:fillRef idx="1">
+              <a:schemeClr val="accent1"/>
+            </a:fillRef>
+            <a:effectRef idx="0">
+              <a:schemeClr val="accent1"/>
+            </a:effectRef>
+            <a:fontRef idx="minor">
+              <a:schemeClr val="lt1"/>
+            </a:fontRef>
+          </p:style>
+          <p:txBody>
+            <a:bodyPr rtlCol="0" anchor="ctr"/>
+            <a:lstStyle/>
+            <a:p>
+              <a:pPr algn="ctr"/>
+              <a:endParaRPr lang="en-SG"/>
+            </a:p>
+          </p:txBody>
+        </p:sp>
+      </p:grpSp>
+      <p:cxnSp>
+        <p:nvCxnSpPr>
+          <p:cNvPr id="39" name="Elbow Connector 122"/>
+          <p:cNvCxnSpPr/>
+          <p:nvPr/>
+        </p:nvCxnSpPr>
+        <p:spPr>
+          <a:xfrm rot="5400000" flipH="1" flipV="1">
+            <a:off x="860920" y="2695478"/>
+            <a:ext cx="1969553" cy="2764"/>
+          </a:xfrm>
+          <a:prstGeom prst="bentConnector3">
+            <a:avLst>
+              <a:gd name="adj1" fmla="val 50000"/>
+            </a:avLst>
+          </a:prstGeom>
+          <a:ln w="19050">
+            <a:solidFill>
+              <a:srgbClr val="0070C0"/>
+            </a:solidFill>
+            <a:prstDash val="sysDot"/>
+            <a:headEnd type="none" w="med" len="med"/>
+            <a:tailEnd type="arrow" w="med" len="med"/>
+          </a:ln>
+          <a:effectLst/>
+        </p:spPr>
+        <p:style>
+          <a:lnRef idx="1">
+            <a:schemeClr val="accent2"/>
+          </a:lnRef>
+          <a:fillRef idx="2">
+            <a:schemeClr val="accent2"/>
+          </a:fillRef>
+          <a:effectRef idx="1">
+            <a:schemeClr val="accent2"/>
+          </a:effectRef>
+          <a:fontRef idx="minor">
+            <a:schemeClr val="dk1"/>
+          </a:fontRef>
+        </p:style>
+      </p:cxnSp>
+      <p:sp>
+        <p:nvSpPr>
+          <p:cNvPr id="56" name="Rectangle 62"/>
+          <p:cNvSpPr/>
+          <p:nvPr/>
+        </p:nvSpPr>
+        <p:spPr>
+          <a:xfrm>
+            <a:off x="2841858" y="1956405"/>
+            <a:ext cx="751107" cy="346760"/>
+          </a:xfrm>
+          <a:prstGeom prst="rect">
+            <a:avLst/>
+          </a:prstGeom>
+          <a:solidFill>
+            <a:schemeClr val="accent5">
+              <a:lumMod val="60000"/>
+              <a:lumOff val="40000"/>
+            </a:schemeClr>
+          </a:solidFill>
+          <a:ln w="19050">
+            <a:solidFill>
+              <a:schemeClr val="accent5">
+                <a:lumMod val="60000"/>
+                <a:lumOff val="40000"/>
+              </a:schemeClr>
+            </a:solidFill>
+          </a:ln>
+          <a:effectLst/>
+        </p:spPr>
+        <p:style>
+          <a:lnRef idx="1">
+            <a:schemeClr val="accent2"/>
+          </a:lnRef>
+          <a:fillRef idx="2">
+            <a:schemeClr val="accent2"/>
+          </a:fillRef>
+          <a:effectRef idx="1">
+            <a:schemeClr val="accent2"/>
+          </a:effectRef>
+          <a:fontRef idx="minor">
+            <a:schemeClr val="dk1"/>
+          </a:fontRef>
+        </p:style>
+        <p:txBody>
+          <a:bodyPr rtlCol="0" anchor="ctr"/>
+          <a:lstStyle/>
+          <a:p>
+            <a:pPr algn="ctr"/>
+            <a:r>
+              <a:rPr lang="en-US" sz="1050">
+                <a:solidFill>
+                  <a:schemeClr val="bg1"/>
+                </a:solidFill>
+              </a:rPr>
+              <a:t>Argument</a:t>
+            </a:r>
+            <a:br>
+              <a:rPr lang="en-US" sz="1050">
+                <a:solidFill>
+                  <a:schemeClr val="bg1"/>
+                </a:solidFill>
+              </a:rPr>
+            </a:br>
+            <a:r>
+              <a:rPr lang="en-US" sz="1050">
+                <a:solidFill>
+                  <a:schemeClr val="bg1"/>
+                </a:solidFill>
+              </a:rPr>
+              <a:t>Tokenizer</a:t>
+            </a:r>
+            <a:endParaRPr lang="en-SG" sz="1050" dirty="0">
+              <a:solidFill>
+                <a:schemeClr val="bg1"/>
+              </a:solidFill>
+            </a:endParaRPr>
+          </a:p>
+        </p:txBody>
+      </p:sp>
+      <p:sp>
+        <p:nvSpPr>
+          <p:cNvPr id="58" name="Rectangle 62"/>
+          <p:cNvSpPr/>
+          <p:nvPr/>
+        </p:nvSpPr>
+        <p:spPr>
+          <a:xfrm>
+            <a:off x="1906140" y="2548091"/>
+            <a:ext cx="726243" cy="174580"/>
+          </a:xfrm>
+          <a:prstGeom prst="rect">
+            <a:avLst/>
+          </a:prstGeom>
+          <a:solidFill>
+            <a:schemeClr val="accent5">
+              <a:lumMod val="60000"/>
+              <a:lumOff val="40000"/>
+            </a:schemeClr>
+          </a:solidFill>
+          <a:ln w="19050">
+            <a:solidFill>
+              <a:schemeClr val="accent5">
+                <a:lumMod val="60000"/>
+                <a:lumOff val="40000"/>
+              </a:schemeClr>
+            </a:solidFill>
+          </a:ln>
+          <a:effectLst/>
+        </p:spPr>
+        <p:style>
+          <a:lnRef idx="1">
+            <a:schemeClr val="accent2"/>
+          </a:lnRef>
+          <a:fillRef idx="2">
+            <a:schemeClr val="accent2"/>
+          </a:fillRef>
+          <a:effectRef idx="1">
+            <a:schemeClr val="accent2"/>
+          </a:effectRef>
+          <a:fontRef idx="minor">
+            <a:schemeClr val="dk1"/>
+          </a:fontRef>
+        </p:style>
+        <p:txBody>
+          <a:bodyPr rtlCol="0" anchor="ctr"/>
+          <a:lstStyle/>
+          <a:p>
+            <a:pPr algn="ctr"/>
+            <a:r>
+              <a:rPr lang="en-US" sz="1050" dirty="0">
+                <a:solidFill>
+                  <a:schemeClr val="bg1"/>
+                </a:solidFill>
+              </a:rPr>
+              <a:t>Prefix</a:t>
+            </a:r>
+            <a:endParaRPr lang="en-SG" sz="1050" dirty="0">
+              <a:solidFill>
+                <a:schemeClr val="bg1"/>
+              </a:solidFill>
+            </a:endParaRPr>
+          </a:p>
+        </p:txBody>
+      </p:sp>
+      <p:sp>
+        <p:nvSpPr>
+          <p:cNvPr id="60" name="Rectangle 62"/>
+          <p:cNvSpPr/>
+          <p:nvPr/>
+        </p:nvSpPr>
+        <p:spPr>
+          <a:xfrm>
+            <a:off x="2853970" y="2935335"/>
+            <a:ext cx="731636" cy="283820"/>
+          </a:xfrm>
+          <a:prstGeom prst="rect">
+            <a:avLst/>
+          </a:prstGeom>
+          <a:solidFill>
+            <a:schemeClr val="accent5">
+              <a:lumMod val="60000"/>
+              <a:lumOff val="40000"/>
+            </a:schemeClr>
+          </a:solidFill>
+          <a:ln w="19050">
+            <a:solidFill>
+              <a:schemeClr val="accent5">
+                <a:lumMod val="60000"/>
+                <a:lumOff val="40000"/>
+              </a:schemeClr>
+            </a:solidFill>
+          </a:ln>
+          <a:effectLst/>
+        </p:spPr>
+        <p:style>
+          <a:lnRef idx="1">
+            <a:schemeClr val="accent2"/>
+          </a:lnRef>
+          <a:fillRef idx="2">
+            <a:schemeClr val="accent2"/>
+          </a:fillRef>
+          <a:effectRef idx="1">
+            <a:schemeClr val="accent2"/>
+          </a:effectRef>
+          <a:fontRef idx="minor">
+            <a:schemeClr val="dk1"/>
+          </a:fontRef>
+        </p:style>
+        <p:txBody>
+          <a:bodyPr rtlCol="0" anchor="ctr"/>
+          <a:lstStyle/>
+          <a:p>
+            <a:pPr algn="ctr"/>
+            <a:r>
+              <a:rPr lang="en-SG" sz="1050" dirty="0" err="1">
+                <a:solidFill>
+                  <a:schemeClr val="bg1"/>
+                </a:solidFill>
+              </a:rPr>
+              <a:t>CliSyntax</a:t>
+            </a:r>
+            <a:endParaRPr lang="en-SG" sz="1050" dirty="0">
+              <a:solidFill>
+                <a:schemeClr val="bg1"/>
+              </a:solidFill>
+            </a:endParaRPr>
+          </a:p>
+        </p:txBody>
+      </p:sp>
+      <p:sp>
+        <p:nvSpPr>
+          <p:cNvPr id="62" name="Rectangle 62"/>
+          <p:cNvSpPr/>
+          <p:nvPr/>
+        </p:nvSpPr>
+        <p:spPr>
+          <a:xfrm>
+            <a:off x="2853970" y="3284492"/>
+            <a:ext cx="731636" cy="283820"/>
+          </a:xfrm>
+          <a:prstGeom prst="rect">
+            <a:avLst/>
+          </a:prstGeom>
+          <a:solidFill>
+            <a:schemeClr val="accent5">
+              <a:lumMod val="60000"/>
+              <a:lumOff val="40000"/>
+            </a:schemeClr>
+          </a:solidFill>
+          <a:ln w="19050">
+            <a:solidFill>
+              <a:schemeClr val="accent5">
+                <a:lumMod val="60000"/>
+                <a:lumOff val="40000"/>
+              </a:schemeClr>
+            </a:solidFill>
+          </a:ln>
+          <a:effectLst/>
+        </p:spPr>
+        <p:style>
+          <a:lnRef idx="1">
+            <a:schemeClr val="accent2"/>
+          </a:lnRef>
+          <a:fillRef idx="2">
+            <a:schemeClr val="accent2"/>
+          </a:fillRef>
+          <a:effectRef idx="1">
+            <a:schemeClr val="accent2"/>
+          </a:effectRef>
+          <a:fontRef idx="minor">
+            <a:schemeClr val="dk1"/>
+          </a:fontRef>
+        </p:style>
+        <p:txBody>
+          <a:bodyPr rtlCol="0" anchor="ctr"/>
+          <a:lstStyle/>
+          <a:p>
+            <a:pPr algn="ctr"/>
+            <a:r>
+              <a:rPr lang="en-SG" sz="1050" dirty="0" err="1">
+                <a:solidFill>
+                  <a:schemeClr val="bg1"/>
+                </a:solidFill>
+              </a:rPr>
+              <a:t>ParserUtil</a:t>
+            </a:r>
+            <a:endParaRPr lang="en-SG" sz="1050" dirty="0">
+              <a:solidFill>
+                <a:schemeClr val="bg1"/>
+              </a:solidFill>
+            </a:endParaRPr>
+          </a:p>
+        </p:txBody>
+      </p:sp>
+      <p:cxnSp>
+        <p:nvCxnSpPr>
+          <p:cNvPr id="13" name="Elbow Connector 12"/>
+          <p:cNvCxnSpPr>
+            <a:cxnSpLocks/>
+            <a:stCxn id="60" idx="1"/>
+            <a:endCxn id="58" idx="2"/>
+          </p:cNvCxnSpPr>
+          <p:nvPr/>
+        </p:nvCxnSpPr>
+        <p:spPr>
+          <a:xfrm rot="10800000">
+            <a:off x="2269262" y="2722671"/>
+            <a:ext cx="584708" cy="354574"/>
+          </a:xfrm>
+          <a:prstGeom prst="bentConnector2">
+            <a:avLst/>
+          </a:prstGeom>
+          <a:ln w="19050">
+            <a:solidFill>
+              <a:schemeClr val="accent5">
+                <a:lumMod val="60000"/>
+                <a:lumOff val="40000"/>
+              </a:schemeClr>
+            </a:solidFill>
+            <a:prstDash val="sysDot"/>
+            <a:headEnd type="none" w="med" len="med"/>
+            <a:tailEnd type="arrow" w="med" len="med"/>
+          </a:ln>
+          <a:effectLst/>
+        </p:spPr>
+        <p:style>
+          <a:lnRef idx="1">
+            <a:schemeClr val="accent2"/>
+          </a:lnRef>
+          <a:fillRef idx="2">
+            <a:schemeClr val="accent2"/>
+          </a:fillRef>
+          <a:effectRef idx="1">
+            <a:schemeClr val="accent2"/>
+          </a:effectRef>
+          <a:fontRef idx="minor">
+            <a:schemeClr val="dk1"/>
+          </a:fontRef>
+        </p:style>
+      </p:cxnSp>
+      <p:cxnSp>
+        <p:nvCxnSpPr>
+          <p:cNvPr id="50" name="Elbow Connector 49"/>
+          <p:cNvCxnSpPr>
+            <a:cxnSpLocks/>
+            <a:stCxn id="56" idx="1"/>
+            <a:endCxn id="58" idx="0"/>
+          </p:cNvCxnSpPr>
+          <p:nvPr/>
+        </p:nvCxnSpPr>
+        <p:spPr>
+          <a:xfrm rot="10800000" flipV="1">
+            <a:off x="2269262" y="2129785"/>
+            <a:ext cx="572596" cy="418306"/>
+          </a:xfrm>
+          <a:prstGeom prst="bentConnector2">
+            <a:avLst/>
+          </a:prstGeom>
+          <a:ln w="19050">
+            <a:solidFill>
+              <a:schemeClr val="accent5">
+                <a:lumMod val="60000"/>
+                <a:lumOff val="40000"/>
+              </a:schemeClr>
+            </a:solidFill>
+            <a:prstDash val="sysDot"/>
+            <a:headEnd type="none" w="med" len="med"/>
+            <a:tailEnd type="arrow" w="med" len="med"/>
+          </a:ln>
+          <a:effectLst/>
+        </p:spPr>
+        <p:style>
+          <a:lnRef idx="1">
+            <a:schemeClr val="accent2"/>
+          </a:lnRef>
+          <a:fillRef idx="2">
+            <a:schemeClr val="accent2"/>
+          </a:fillRef>
+          <a:effectRef idx="1">
+            <a:schemeClr val="accent2"/>
+          </a:effectRef>
+          <a:fontRef idx="minor">
+            <a:schemeClr val="dk1"/>
+          </a:fontRef>
+        </p:style>
+      </p:cxnSp>
+      <p:sp>
+        <p:nvSpPr>
+          <p:cNvPr id="87" name="Isosceles Triangle 102"/>
+          <p:cNvSpPr/>
+          <p:nvPr/>
+        </p:nvSpPr>
+        <p:spPr>
+          <a:xfrm flipV="1">
+            <a:off x="7542205" y="3750554"/>
+            <a:ext cx="270504" cy="175523"/>
+          </a:xfrm>
+          <a:prstGeom prst="triangle">
+            <a:avLst/>
+          </a:prstGeom>
+          <a:solidFill>
+            <a:schemeClr val="tx2">
+              <a:lumMod val="60000"/>
+              <a:lumOff val="40000"/>
+            </a:schemeClr>
+          </a:solidFill>
+          <a:ln w="19050">
+            <a:solidFill>
+              <a:srgbClr val="0070C0"/>
+            </a:solidFill>
+          </a:ln>
+          <a:effectLst/>
+        </p:spPr>
+        <p:style>
+          <a:lnRef idx="1">
+            <a:schemeClr val="accent1"/>
+          </a:lnRef>
+          <a:fillRef idx="2">
+            <a:schemeClr val="accent1"/>
+          </a:fillRef>
+          <a:effectRef idx="1">
+            <a:schemeClr val="accent1"/>
+          </a:effectRef>
+          <a:fontRef idx="minor">
+            <a:schemeClr val="dk1"/>
+          </a:fontRef>
+        </p:style>
+        <p:txBody>
+          <a:bodyPr rtlCol="0" anchor="ctr"/>
+          <a:lstStyle/>
+          <a:p>
+            <a:pPr algn="ctr"/>
+            <a:endParaRPr lang="en-SG" sz="1050" b="1">
+              <a:solidFill>
+                <a:srgbClr val="92D050"/>
+              </a:solidFill>
+            </a:endParaRPr>
+          </a:p>
+        </p:txBody>
+      </p:sp>
+      <p:cxnSp>
+        <p:nvCxnSpPr>
+          <p:cNvPr id="96" name="Elbow Connector 95"/>
+          <p:cNvCxnSpPr>
+            <a:cxnSpLocks/>
+            <a:stCxn id="87" idx="3"/>
+            <a:endCxn id="4" idx="2"/>
+          </p:cNvCxnSpPr>
+          <p:nvPr/>
+        </p:nvCxnSpPr>
+        <p:spPr>
+          <a:xfrm flipH="1" flipV="1">
+            <a:off x="7673665" y="3180522"/>
+            <a:ext cx="3792" cy="570032"/>
+          </a:xfrm>
+          <a:prstGeom prst="straightConnector1">
+            <a:avLst/>
+          </a:prstGeom>
+          <a:ln w="19050">
+            <a:headEnd type="none" w="med" len="med"/>
+            <a:tailEnd type="none" w="med" len="med"/>
+          </a:ln>
+        </p:spPr>
+        <p:style>
+          <a:lnRef idx="1">
+            <a:schemeClr val="accent1"/>
+          </a:lnRef>
+          <a:fillRef idx="0">
+            <a:schemeClr val="accent1"/>
+          </a:fillRef>
+          <a:effectRef idx="0">
+            <a:schemeClr val="accent1"/>
+          </a:effectRef>
+          <a:fontRef idx="minor">
+            <a:schemeClr val="tx1"/>
+          </a:fontRef>
+        </p:style>
+      </p:cxnSp>
+      <p:cxnSp>
+        <p:nvCxnSpPr>
+          <p:cNvPr id="122" name="Elbow Connector 63"/>
+          <p:cNvCxnSpPr>
+            <a:cxnSpLocks/>
+            <a:stCxn id="42" idx="1"/>
+            <a:endCxn id="4" idx="3"/>
+          </p:cNvCxnSpPr>
+          <p:nvPr/>
+        </p:nvCxnSpPr>
+        <p:spPr>
+          <a:xfrm flipV="1">
+            <a:off x="5733972" y="3007142"/>
+            <a:ext cx="1454530" cy="659"/>
+          </a:xfrm>
+          <a:prstGeom prst="bentConnector3">
+            <a:avLst>
+              <a:gd name="adj1" fmla="val 50000"/>
+            </a:avLst>
+          </a:prstGeom>
+          <a:ln w="19050">
+            <a:solidFill>
+              <a:schemeClr val="accent5">
+                <a:lumMod val="75000"/>
+              </a:schemeClr>
+            </a:solidFill>
+            <a:prstDash val="sysDot"/>
+            <a:headEnd type="none" w="med" len="med"/>
+            <a:tailEnd type="arrow" w="med" len="med"/>
+          </a:ln>
+          <a:effectLst/>
+        </p:spPr>
+        <p:style>
+          <a:lnRef idx="1">
+            <a:schemeClr val="accent2"/>
+          </a:lnRef>
+          <a:fillRef idx="2">
+            <a:schemeClr val="accent2"/>
+          </a:fillRef>
+          <a:effectRef idx="1">
+            <a:schemeClr val="accent2"/>
+          </a:effectRef>
+          <a:fontRef idx="minor">
+            <a:schemeClr val="dk1"/>
+          </a:fontRef>
+        </p:style>
+      </p:cxnSp>
+      <p:sp>
+        <p:nvSpPr>
+          <p:cNvPr id="109" name="Rectangle 62"/>
+          <p:cNvSpPr/>
+          <p:nvPr/>
+        </p:nvSpPr>
+        <p:spPr>
+          <a:xfrm>
+            <a:off x="2841858" y="2463741"/>
+            <a:ext cx="750156" cy="340758"/>
+          </a:xfrm>
+          <a:prstGeom prst="rect">
+            <a:avLst/>
+          </a:prstGeom>
+          <a:solidFill>
+            <a:schemeClr val="accent5">
+              <a:lumMod val="60000"/>
+              <a:lumOff val="40000"/>
+            </a:schemeClr>
+          </a:solidFill>
+          <a:ln w="19050">
+            <a:solidFill>
+              <a:schemeClr val="accent5">
+                <a:lumMod val="60000"/>
+                <a:lumOff val="40000"/>
+              </a:schemeClr>
+            </a:solidFill>
+          </a:ln>
+          <a:effectLst/>
+        </p:spPr>
+        <p:style>
+          <a:lnRef idx="1">
+            <a:schemeClr val="accent2"/>
+          </a:lnRef>
+          <a:fillRef idx="2">
+            <a:schemeClr val="accent2"/>
+          </a:fillRef>
+          <a:effectRef idx="1">
+            <a:schemeClr val="accent2"/>
+          </a:effectRef>
+          <a:fontRef idx="minor">
+            <a:schemeClr val="dk1"/>
+          </a:fontRef>
+        </p:style>
+        <p:txBody>
+          <a:bodyPr rtlCol="0" anchor="ctr"/>
+          <a:lstStyle/>
+          <a:p>
+            <a:pPr algn="ctr"/>
+            <a:r>
+              <a:rPr lang="en-SG" sz="1050" dirty="0">
+                <a:solidFill>
+                  <a:schemeClr val="bg1"/>
+                </a:solidFill>
+              </a:rPr>
+              <a:t>Argument</a:t>
+            </a:r>
+            <a:br>
+              <a:rPr lang="en-SG" sz="1050" dirty="0">
+                <a:solidFill>
+                  <a:schemeClr val="bg1"/>
+                </a:solidFill>
+              </a:rPr>
+            </a:br>
+            <a:r>
+              <a:rPr lang="en-SG" sz="1050" dirty="0">
+                <a:solidFill>
+                  <a:schemeClr val="bg1"/>
+                </a:solidFill>
+              </a:rPr>
+              <a:t>Multimap</a:t>
+            </a:r>
+          </a:p>
+        </p:txBody>
+      </p:sp>
+      <p:cxnSp>
+        <p:nvCxnSpPr>
+          <p:cNvPr id="112" name="Elbow Connector 12"/>
+          <p:cNvCxnSpPr>
+            <a:cxnSpLocks/>
+            <a:stCxn id="109" idx="1"/>
+            <a:endCxn id="58" idx="3"/>
+          </p:cNvCxnSpPr>
+          <p:nvPr/>
+        </p:nvCxnSpPr>
+        <p:spPr>
+          <a:xfrm rot="10800000" flipV="1">
+            <a:off x="2632384" y="2634119"/>
+            <a:ext cx="209475" cy="1261"/>
+          </a:xfrm>
+          <a:prstGeom prst="bentConnector3">
+            <a:avLst>
+              <a:gd name="adj1" fmla="val 50000"/>
+            </a:avLst>
+          </a:prstGeom>
+          <a:ln w="19050">
+            <a:solidFill>
+              <a:schemeClr val="accent5">
+                <a:lumMod val="60000"/>
+                <a:lumOff val="40000"/>
+              </a:schemeClr>
+            </a:solidFill>
+            <a:prstDash val="sysDot"/>
+            <a:headEnd type="none" w="med" len="med"/>
+            <a:tailEnd type="arrow" w="med" len="med"/>
+          </a:ln>
+          <a:effectLst/>
+        </p:spPr>
+        <p:style>
+          <a:lnRef idx="1">
+            <a:schemeClr val="accent2"/>
+          </a:lnRef>
+          <a:fillRef idx="2">
+            <a:schemeClr val="accent2"/>
+          </a:fillRef>
+          <a:effectRef idx="1">
+            <a:schemeClr val="accent2"/>
+          </a:effectRef>
+          <a:fontRef idx="minor">
+            <a:schemeClr val="dk1"/>
+          </a:fontRef>
+        </p:style>
+      </p:cxnSp>
+      <p:cxnSp>
+        <p:nvCxnSpPr>
+          <p:cNvPr id="118" name="Elbow Connector 49"/>
+          <p:cNvCxnSpPr>
+            <a:cxnSpLocks/>
+            <a:stCxn id="56" idx="2"/>
+            <a:endCxn id="109" idx="0"/>
+          </p:cNvCxnSpPr>
+          <p:nvPr/>
+        </p:nvCxnSpPr>
+        <p:spPr>
+          <a:xfrm rot="5400000">
+            <a:off x="3136886" y="2383215"/>
+            <a:ext cx="160576" cy="476"/>
+          </a:xfrm>
+          <a:prstGeom prst="bentConnector3">
+            <a:avLst>
+              <a:gd name="adj1" fmla="val 50000"/>
+            </a:avLst>
+          </a:prstGeom>
+          <a:ln w="19050">
+            <a:solidFill>
+              <a:schemeClr val="accent5">
+                <a:lumMod val="60000"/>
+                <a:lumOff val="40000"/>
+              </a:schemeClr>
+            </a:solidFill>
+            <a:prstDash val="sysDot"/>
+            <a:headEnd type="none" w="med" len="med"/>
+            <a:tailEnd type="arrow" w="med" len="med"/>
+          </a:ln>
+          <a:effectLst/>
+        </p:spPr>
+        <p:style>
+          <a:lnRef idx="1">
+            <a:schemeClr val="accent2"/>
+          </a:lnRef>
+          <a:fillRef idx="2">
+            <a:schemeClr val="accent2"/>
+          </a:fillRef>
+          <a:effectRef idx="1">
+            <a:schemeClr val="accent2"/>
+          </a:effectRef>
+          <a:fontRef idx="minor">
+            <a:schemeClr val="dk1"/>
+          </a:fontRef>
+        </p:style>
+      </p:cxnSp>
+      <p:sp>
+        <p:nvSpPr>
+          <p:cNvPr id="86" name="Rectangle 62"/>
+          <p:cNvSpPr/>
+          <p:nvPr/>
+        </p:nvSpPr>
+        <p:spPr>
+          <a:xfrm>
+            <a:off x="962709" y="4277034"/>
+            <a:ext cx="805984" cy="346760"/>
+          </a:xfrm>
+          <a:prstGeom prst="rect">
+            <a:avLst/>
+          </a:prstGeom>
+          <a:solidFill>
+            <a:srgbClr val="0070C0"/>
+          </a:solidFill>
+          <a:ln w="19050">
+            <a:solidFill>
+              <a:srgbClr val="0070C0"/>
+            </a:solidFill>
+          </a:ln>
+          <a:effectLst/>
+        </p:spPr>
+        <p:style>
+          <a:lnRef idx="1">
+            <a:schemeClr val="accent2"/>
+          </a:lnRef>
+          <a:fillRef idx="2">
+            <a:schemeClr val="accent2"/>
+          </a:fillRef>
+          <a:effectRef idx="1">
+            <a:schemeClr val="accent2"/>
+          </a:effectRef>
+          <a:fontRef idx="minor">
+            <a:schemeClr val="dk1"/>
+          </a:fontRef>
+        </p:style>
+        <p:txBody>
+          <a:bodyPr rtlCol="0" anchor="ctr"/>
+          <a:lstStyle/>
+          <a:p>
+            <a:pPr algn="ctr"/>
+            <a:r>
+              <a:rPr lang="en-US" sz="1050">
+                <a:solidFill>
+                  <a:schemeClr val="bg1"/>
+                </a:solidFill>
+              </a:rPr>
+              <a:t>Command</a:t>
+            </a:r>
+          </a:p>
+          <a:p>
+            <a:pPr algn="ctr"/>
+            <a:r>
+              <a:rPr lang="en-US" sz="1050" dirty="0">
+                <a:solidFill>
+                  <a:schemeClr val="bg1"/>
+                </a:solidFill>
+              </a:rPr>
+              <a:t>History</a:t>
+            </a:r>
+            <a:endParaRPr lang="en-SG" sz="1050" dirty="0">
+              <a:solidFill>
+                <a:schemeClr val="bg1"/>
+              </a:solidFill>
+            </a:endParaRPr>
+          </a:p>
+        </p:txBody>
+      </p:sp>
+      <p:cxnSp>
+        <p:nvCxnSpPr>
+          <p:cNvPr id="88" name="Straight Arrow Connector 57"/>
+          <p:cNvCxnSpPr/>
+          <p:nvPr/>
+        </p:nvCxnSpPr>
+        <p:spPr>
+          <a:xfrm>
+            <a:off x="1638801" y="4033102"/>
+            <a:ext cx="2022" cy="240622"/>
+          </a:xfrm>
+          <a:prstGeom prst="straightConnector1">
+            <a:avLst/>
+          </a:prstGeom>
+          <a:ln w="19050">
+            <a:solidFill>
+              <a:srgbClr val="0070C0"/>
+            </a:solidFill>
+            <a:headEnd type="none" w="med" len="med"/>
+            <a:tailEnd type="arrow" w="med" len="med"/>
+          </a:ln>
+          <a:effectLst/>
+        </p:spPr>
+        <p:style>
+          <a:lnRef idx="1">
+            <a:schemeClr val="accent2"/>
+          </a:lnRef>
+          <a:fillRef idx="2">
+            <a:schemeClr val="accent2"/>
+          </a:fillRef>
+          <a:effectRef idx="1">
+            <a:schemeClr val="accent2"/>
+          </a:effectRef>
+          <a:fontRef idx="minor">
+            <a:schemeClr val="dk1"/>
+          </a:fontRef>
+        </p:style>
+      </p:cxnSp>
+      <p:sp>
+        <p:nvSpPr>
+          <p:cNvPr id="91" name="TextBox 90"/>
+          <p:cNvSpPr txBox="1"/>
+          <p:nvPr/>
+        </p:nvSpPr>
+        <p:spPr>
+          <a:xfrm>
+            <a:off x="1441624" y="4094005"/>
+            <a:ext cx="131116" cy="230832"/>
+          </a:xfrm>
+          <a:prstGeom prst="rect">
+            <a:avLst/>
+          </a:prstGeom>
+          <a:noFill/>
+        </p:spPr>
+        <p:txBody>
+          <a:bodyPr wrap="square" lIns="0" tIns="0" rIns="0" bIns="0" rtlCol="0">
+            <a:noAutofit/>
+          </a:bodyPr>
+          <a:lstStyle/>
+          <a:p>
+            <a:pPr algn="r"/>
+            <a:r>
+              <a:rPr lang="en-US" sz="1100" dirty="0">
+                <a:solidFill>
+                  <a:srgbClr val="0070C0"/>
+                </a:solidFill>
+              </a:rPr>
+              <a:t>1</a:t>
+            </a:r>
+            <a:endParaRPr lang="en-SG" sz="1100" dirty="0">
+              <a:solidFill>
+                <a:srgbClr val="0070C0"/>
+              </a:solidFill>
+            </a:endParaRPr>
+          </a:p>
+        </p:txBody>
+      </p:sp>
+      <p:sp>
+        <p:nvSpPr>
+          <p:cNvPr id="97" name="Rectangle 96">
+            <a:extLst>
+              <a:ext uri="{FF2B5EF4-FFF2-40B4-BE49-F238E27FC236}">
+                <a16:creationId xmlns:a16="http://schemas.microsoft.com/office/drawing/2014/main" id="{AADE6A0C-89AB-467B-8CEA-5FCF36CE0D21}"/>
+              </a:ext>
+            </a:extLst>
+          </p:cNvPr>
+          <p:cNvSpPr/>
+          <p:nvPr/>
+        </p:nvSpPr>
+        <p:spPr>
+          <a:xfrm flipH="1">
+            <a:off x="4735270" y="2074810"/>
+            <a:ext cx="998702" cy="346760"/>
+          </a:xfrm>
+          <a:prstGeom prst="rect">
+            <a:avLst/>
+          </a:prstGeom>
+          <a:solidFill>
+            <a:schemeClr val="accent5"/>
+          </a:solidFill>
+          <a:ln/>
+          <a:effectLst/>
+        </p:spPr>
+        <p:style>
+          <a:lnRef idx="1">
+            <a:schemeClr val="accent5"/>
+          </a:lnRef>
+          <a:fillRef idx="2">
+            <a:schemeClr val="accent5"/>
+          </a:fillRef>
+          <a:effectRef idx="1">
+            <a:schemeClr val="accent5"/>
+          </a:effectRef>
+          <a:fontRef idx="minor">
+            <a:schemeClr val="dk1"/>
+          </a:fontRef>
+        </p:style>
+        <p:txBody>
+          <a:bodyPr rtlCol="0" anchor="ctr"/>
+          <a:lstStyle/>
+          <a:p>
+            <a:pPr algn="ctr"/>
+            <a:r>
+              <a:rPr lang="en-US" sz="1050" b="1" dirty="0">
+                <a:solidFill>
+                  <a:schemeClr val="bg1"/>
+                </a:solidFill>
+              </a:rPr>
+              <a:t>&lt;&lt;interface&gt;&gt;</a:t>
+            </a:r>
+          </a:p>
+          <a:p>
+            <a:pPr algn="ctr"/>
+            <a:r>
+              <a:rPr lang="en-US" sz="1050" b="1" dirty="0">
+                <a:solidFill>
+                  <a:schemeClr val="bg1"/>
+                </a:solidFill>
+              </a:rPr>
+              <a:t>Parser</a:t>
+            </a:r>
+            <a:endParaRPr lang="en-SG" sz="1050" b="1" dirty="0">
+              <a:solidFill>
+                <a:schemeClr val="bg1"/>
+              </a:solidFill>
+            </a:endParaRPr>
+          </a:p>
+        </p:txBody>
+      </p:sp>
+      <p:sp>
+        <p:nvSpPr>
+          <p:cNvPr id="75" name="Isosceles Triangle 102"/>
+          <p:cNvSpPr/>
+          <p:nvPr/>
+        </p:nvSpPr>
+        <p:spPr>
+          <a:xfrm flipH="1">
+            <a:off x="5099369" y="2421570"/>
+            <a:ext cx="270504" cy="175523"/>
+          </a:xfrm>
+          <a:prstGeom prst="triangle">
+            <a:avLst/>
+          </a:prstGeom>
+          <a:ln w="12700"/>
+        </p:spPr>
+        <p:style>
+          <a:lnRef idx="2">
+            <a:schemeClr val="accent5">
+              <a:shade val="50000"/>
+            </a:schemeClr>
+          </a:lnRef>
+          <a:fillRef idx="1">
+            <a:schemeClr val="accent5"/>
+          </a:fillRef>
+          <a:effectRef idx="0">
+            <a:schemeClr val="accent5"/>
+          </a:effectRef>
+          <a:fontRef idx="minor">
+            <a:schemeClr val="lt1"/>
+          </a:fontRef>
+        </p:style>
+        <p:txBody>
+          <a:bodyPr rtlCol="0" anchor="ctr"/>
+          <a:lstStyle/>
+          <a:p>
+            <a:pPr algn="ctr"/>
+            <a:endParaRPr lang="en-SG" sz="1050" b="1">
+              <a:solidFill>
+                <a:srgbClr val="92D050"/>
+              </a:solidFill>
+            </a:endParaRPr>
+          </a:p>
+        </p:txBody>
+      </p:sp>
+      <p:grpSp>
+        <p:nvGrpSpPr>
+          <p:cNvPr id="85" name="Group 84"/>
+          <p:cNvGrpSpPr/>
+          <p:nvPr/>
+        </p:nvGrpSpPr>
+        <p:grpSpPr>
+          <a:xfrm rot="5400000">
+            <a:off x="6350085" y="2803309"/>
+            <a:ext cx="222304" cy="598286"/>
+            <a:chOff x="3965759" y="592436"/>
+            <a:chExt cx="254462" cy="503902"/>
+          </a:xfrm>
+        </p:grpSpPr>
+        <p:sp>
+          <p:nvSpPr>
+            <p:cNvPr id="89" name="TextBox 88"/>
+            <p:cNvSpPr txBox="1"/>
+            <p:nvPr/>
+          </p:nvSpPr>
+          <p:spPr>
+            <a:xfrm rot="16200000">
+              <a:off x="3841039" y="717156"/>
+              <a:ext cx="503902" cy="254462"/>
+            </a:xfrm>
+            <a:prstGeom prst="rect">
+              <a:avLst/>
+            </a:prstGeom>
+            <a:noFill/>
+          </p:spPr>
+          <p:txBody>
+            <a:bodyPr wrap="square" lIns="0" tIns="0" rIns="0" bIns="0" rtlCol="0">
+              <a:noAutofit/>
+            </a:bodyPr>
+            <a:lstStyle/>
+            <a:p>
+              <a:r>
+                <a:rPr lang="en-US" sz="1100" dirty="0">
+                  <a:solidFill>
+                    <a:schemeClr val="accent5">
+                      <a:lumMod val="75000"/>
+                    </a:schemeClr>
+                  </a:solidFill>
+                </a:rPr>
+                <a:t>creates</a:t>
+              </a:r>
+              <a:endParaRPr lang="en-SG" sz="1100" dirty="0">
+                <a:solidFill>
+                  <a:schemeClr val="accent5">
+                    <a:lumMod val="75000"/>
+                  </a:schemeClr>
+                </a:solidFill>
+              </a:endParaRPr>
+            </a:p>
+          </p:txBody>
+        </p:sp>
+        <p:sp>
+          <p:nvSpPr>
+            <p:cNvPr id="92" name="Isosceles Triangle 91"/>
+            <p:cNvSpPr/>
+            <p:nvPr/>
+          </p:nvSpPr>
+          <p:spPr>
+            <a:xfrm rot="10800000" flipV="1">
+              <a:off x="3995991" y="631624"/>
+              <a:ext cx="132157" cy="79956"/>
+            </a:xfrm>
+            <a:prstGeom prst="triangle">
+              <a:avLst/>
+            </a:prstGeom>
+            <a:solidFill>
+              <a:schemeClr val="accent5">
+                <a:lumMod val="75000"/>
+              </a:schemeClr>
+            </a:solidFill>
+            <a:ln>
+              <a:noFill/>
+            </a:ln>
+          </p:spPr>
+          <p:style>
+            <a:lnRef idx="2">
+              <a:schemeClr val="accent1">
+                <a:shade val="50000"/>
+              </a:schemeClr>
+            </a:lnRef>
+            <a:fillRef idx="1">
+              <a:schemeClr val="accent1"/>
+            </a:fillRef>
+            <a:effectRef idx="0">
+              <a:schemeClr val="accent1"/>
+            </a:effectRef>
+            <a:fontRef idx="minor">
+              <a:schemeClr val="lt1"/>
+            </a:fontRef>
+          </p:style>
+          <p:txBody>
+            <a:bodyPr rtlCol="0" anchor="ctr"/>
+            <a:lstStyle/>
+            <a:p>
+              <a:pPr algn="ctr"/>
+              <a:endParaRPr lang="en-SG"/>
+            </a:p>
+          </p:txBody>
+        </p:sp>
+      </p:grpSp>
+      <p:sp>
+        <p:nvSpPr>
+          <p:cNvPr id="42" name="Rectangle 11"/>
+          <p:cNvSpPr/>
+          <p:nvPr/>
+        </p:nvSpPr>
+        <p:spPr>
+          <a:xfrm flipH="1">
+            <a:off x="4741986" y="2834421"/>
+            <a:ext cx="991986" cy="346760"/>
+          </a:xfrm>
+          <a:prstGeom prst="rect">
+            <a:avLst/>
+          </a:prstGeom>
+          <a:solidFill>
+            <a:schemeClr val="accent5">
+              <a:alpha val="81000"/>
+            </a:schemeClr>
+          </a:solidFill>
+          <a:ln/>
+          <a:effectLst/>
+        </p:spPr>
+        <p:style>
+          <a:lnRef idx="1">
+            <a:schemeClr val="accent5"/>
+          </a:lnRef>
+          <a:fillRef idx="2">
+            <a:schemeClr val="accent5"/>
+          </a:fillRef>
+          <a:effectRef idx="1">
+            <a:schemeClr val="accent5"/>
+          </a:effectRef>
+          <a:fontRef idx="minor">
+            <a:schemeClr val="dk1"/>
+          </a:fontRef>
+        </p:style>
+        <p:txBody>
+          <a:bodyPr rtlCol="0" anchor="ctr"/>
+          <a:lstStyle/>
+          <a:p>
+            <a:pPr algn="ctr"/>
+            <a:r>
+              <a:rPr lang="en-US" sz="1050" b="1" dirty="0" err="1">
+                <a:solidFill>
+                  <a:schemeClr val="bg1"/>
+                </a:solidFill>
+              </a:rPr>
+              <a:t>XYZCommand</a:t>
+            </a:r>
+            <a:endParaRPr lang="en-US" sz="1050" b="1" dirty="0">
+              <a:solidFill>
+                <a:schemeClr val="bg1"/>
+              </a:solidFill>
+            </a:endParaRPr>
+          </a:p>
+          <a:p>
+            <a:pPr algn="ctr"/>
+            <a:r>
+              <a:rPr lang="en-US" sz="1050" b="1" dirty="0">
+                <a:solidFill>
+                  <a:schemeClr val="bg1"/>
+                </a:solidFill>
+              </a:rPr>
+              <a:t>Parser</a:t>
+            </a:r>
+            <a:endParaRPr lang="en-SG" sz="1050" b="1" dirty="0">
+              <a:solidFill>
+                <a:schemeClr val="bg1"/>
+              </a:solidFill>
+            </a:endParaRPr>
+          </a:p>
+        </p:txBody>
+      </p:sp>
+      <p:cxnSp>
+        <p:nvCxnSpPr>
+          <p:cNvPr id="101" name="Elbow Connector 12"/>
+          <p:cNvCxnSpPr>
+            <a:cxnSpLocks/>
+            <a:stCxn id="42" idx="3"/>
+          </p:cNvCxnSpPr>
+          <p:nvPr/>
+        </p:nvCxnSpPr>
+        <p:spPr>
+          <a:xfrm rot="10800000">
+            <a:off x="3585378" y="2152271"/>
+            <a:ext cx="1156608" cy="855530"/>
+          </a:xfrm>
+          <a:prstGeom prst="bentConnector3">
+            <a:avLst>
+              <a:gd name="adj1" fmla="val 50000"/>
+            </a:avLst>
+          </a:prstGeom>
+          <a:ln w="19050">
+            <a:solidFill>
+              <a:schemeClr val="accent5">
+                <a:lumMod val="60000"/>
+                <a:lumOff val="40000"/>
+              </a:schemeClr>
+            </a:solidFill>
+            <a:prstDash val="sysDot"/>
+            <a:headEnd type="none" w="med" len="med"/>
+            <a:tailEnd type="arrow" w="med" len="med"/>
+          </a:ln>
+          <a:effectLst/>
+        </p:spPr>
+        <p:style>
+          <a:lnRef idx="1">
+            <a:schemeClr val="accent2"/>
+          </a:lnRef>
+          <a:fillRef idx="2">
+            <a:schemeClr val="accent2"/>
+          </a:fillRef>
+          <a:effectRef idx="1">
+            <a:schemeClr val="accent2"/>
+          </a:effectRef>
+          <a:fontRef idx="minor">
+            <a:schemeClr val="dk1"/>
+          </a:fontRef>
+        </p:style>
+      </p:cxnSp>
+      <p:cxnSp>
+        <p:nvCxnSpPr>
+          <p:cNvPr id="102" name="Elbow Connector 12"/>
+          <p:cNvCxnSpPr>
+            <a:cxnSpLocks/>
+            <a:stCxn id="42" idx="3"/>
+          </p:cNvCxnSpPr>
+          <p:nvPr/>
+        </p:nvCxnSpPr>
+        <p:spPr>
+          <a:xfrm rot="10800000">
+            <a:off x="3589608" y="2634121"/>
+            <a:ext cx="1152379" cy="373681"/>
+          </a:xfrm>
+          <a:prstGeom prst="bentConnector3">
+            <a:avLst>
+              <a:gd name="adj1" fmla="val 50000"/>
+            </a:avLst>
+          </a:prstGeom>
+          <a:ln w="19050">
+            <a:solidFill>
+              <a:schemeClr val="accent5">
+                <a:lumMod val="60000"/>
+                <a:lumOff val="40000"/>
+              </a:schemeClr>
+            </a:solidFill>
+            <a:prstDash val="sysDot"/>
+            <a:headEnd type="none" w="med" len="med"/>
+            <a:tailEnd type="arrow" w="med" len="med"/>
+          </a:ln>
+          <a:effectLst/>
+        </p:spPr>
+        <p:style>
+          <a:lnRef idx="1">
+            <a:schemeClr val="accent2"/>
+          </a:lnRef>
+          <a:fillRef idx="2">
+            <a:schemeClr val="accent2"/>
+          </a:fillRef>
+          <a:effectRef idx="1">
+            <a:schemeClr val="accent2"/>
+          </a:effectRef>
+          <a:fontRef idx="minor">
+            <a:schemeClr val="dk1"/>
+          </a:fontRef>
+        </p:style>
+      </p:cxnSp>
+      <p:cxnSp>
+        <p:nvCxnSpPr>
+          <p:cNvPr id="103" name="Elbow Connector 12"/>
+          <p:cNvCxnSpPr>
+            <a:cxnSpLocks/>
+            <a:stCxn id="42" idx="3"/>
+          </p:cNvCxnSpPr>
+          <p:nvPr/>
+        </p:nvCxnSpPr>
+        <p:spPr>
+          <a:xfrm rot="10800000" flipV="1">
+            <a:off x="3593836" y="3007801"/>
+            <a:ext cx="1148150" cy="108168"/>
+          </a:xfrm>
+          <a:prstGeom prst="bentConnector3">
+            <a:avLst>
+              <a:gd name="adj1" fmla="val 50000"/>
+            </a:avLst>
+          </a:prstGeom>
+          <a:ln w="19050">
+            <a:solidFill>
+              <a:schemeClr val="accent5">
+                <a:lumMod val="60000"/>
+                <a:lumOff val="40000"/>
+              </a:schemeClr>
+            </a:solidFill>
+            <a:prstDash val="sysDot"/>
+            <a:headEnd type="none" w="med" len="med"/>
+            <a:tailEnd type="arrow" w="med" len="med"/>
+          </a:ln>
+          <a:effectLst/>
+        </p:spPr>
+        <p:style>
+          <a:lnRef idx="1">
+            <a:schemeClr val="accent2"/>
+          </a:lnRef>
+          <a:fillRef idx="2">
+            <a:schemeClr val="accent2"/>
+          </a:fillRef>
+          <a:effectRef idx="1">
+            <a:schemeClr val="accent2"/>
+          </a:effectRef>
+          <a:fontRef idx="minor">
+            <a:schemeClr val="dk1"/>
+          </a:fontRef>
+        </p:style>
+      </p:cxnSp>
+      <p:cxnSp>
+        <p:nvCxnSpPr>
+          <p:cNvPr id="104" name="Elbow Connector 12"/>
+          <p:cNvCxnSpPr>
+            <a:cxnSpLocks/>
+            <a:stCxn id="42" idx="3"/>
+          </p:cNvCxnSpPr>
+          <p:nvPr/>
+        </p:nvCxnSpPr>
+        <p:spPr>
+          <a:xfrm rot="10800000" flipV="1">
+            <a:off x="3598066" y="3007801"/>
+            <a:ext cx="1143921" cy="439870"/>
+          </a:xfrm>
+          <a:prstGeom prst="bentConnector3">
+            <a:avLst>
+              <a:gd name="adj1" fmla="val 50000"/>
+            </a:avLst>
+          </a:prstGeom>
+          <a:ln w="19050">
+            <a:solidFill>
+              <a:schemeClr val="accent5">
+                <a:lumMod val="60000"/>
+                <a:lumOff val="40000"/>
+              </a:schemeClr>
+            </a:solidFill>
+            <a:prstDash val="sysDot"/>
+            <a:headEnd type="none" w="med" len="med"/>
+            <a:tailEnd type="arrow" w="med" len="med"/>
+          </a:ln>
+          <a:effectLst/>
+        </p:spPr>
+        <p:style>
+          <a:lnRef idx="1">
+            <a:schemeClr val="accent2"/>
+          </a:lnRef>
+          <a:fillRef idx="2">
+            <a:schemeClr val="accent2"/>
+          </a:fillRef>
+          <a:effectRef idx="1">
+            <a:schemeClr val="accent2"/>
+          </a:effectRef>
+          <a:fontRef idx="minor">
+            <a:schemeClr val="dk1"/>
+          </a:fontRef>
+        </p:style>
+      </p:cxnSp>
+      <p:sp>
+        <p:nvSpPr>
+          <p:cNvPr id="16" name="Rectangle 62"/>
+          <p:cNvSpPr/>
+          <p:nvPr/>
+        </p:nvSpPr>
+        <p:spPr>
+          <a:xfrm>
+            <a:off x="2899963" y="3656672"/>
+            <a:ext cx="1278674" cy="384497"/>
+          </a:xfrm>
+          <a:prstGeom prst="rect">
+            <a:avLst/>
+          </a:prstGeom>
+          <a:solidFill>
+            <a:schemeClr val="accent5"/>
+          </a:solidFill>
+          <a:ln/>
+          <a:effectLst/>
+        </p:spPr>
+        <p:style>
+          <a:lnRef idx="1">
+            <a:schemeClr val="accent5"/>
+          </a:lnRef>
+          <a:fillRef idx="2">
+            <a:schemeClr val="accent5"/>
+          </a:fillRef>
+          <a:effectRef idx="1">
+            <a:schemeClr val="accent5"/>
+          </a:effectRef>
+          <a:fontRef idx="minor">
+            <a:schemeClr val="dk1"/>
+          </a:fontRef>
+        </p:style>
+        <p:txBody>
+          <a:bodyPr rtlCol="0" anchor="ctr"/>
+          <a:lstStyle/>
+          <a:p>
+            <a:pPr algn="ctr"/>
+            <a:r>
+              <a:rPr lang="en-US" sz="1050" dirty="0" err="1">
+                <a:solidFill>
+                  <a:schemeClr val="bg1"/>
+                </a:solidFill>
+              </a:rPr>
+              <a:t>ManagementMode</a:t>
+            </a:r>
+            <a:endParaRPr lang="en-US" sz="1050" dirty="0">
+              <a:solidFill>
+                <a:schemeClr val="bg1"/>
+              </a:solidFill>
+            </a:endParaRPr>
+          </a:p>
+          <a:p>
+            <a:pPr algn="ctr"/>
+            <a:r>
+              <a:rPr lang="en-US" sz="1050" dirty="0">
+                <a:solidFill>
+                  <a:schemeClr val="bg1"/>
+                </a:solidFill>
+              </a:rPr>
+              <a:t>Parser</a:t>
+            </a:r>
+            <a:endParaRPr lang="en-SG" sz="1050" dirty="0">
+              <a:solidFill>
+                <a:schemeClr val="bg1"/>
+              </a:solidFill>
+            </a:endParaRPr>
+          </a:p>
+        </p:txBody>
+      </p:sp>
+      <p:sp>
+        <p:nvSpPr>
+          <p:cNvPr id="33" name="TextBox 32"/>
+          <p:cNvSpPr txBox="1"/>
+          <p:nvPr/>
+        </p:nvSpPr>
+        <p:spPr>
+          <a:xfrm>
+            <a:off x="2715644" y="3901378"/>
+            <a:ext cx="131116" cy="230832"/>
+          </a:xfrm>
+          <a:prstGeom prst="rect">
+            <a:avLst/>
+          </a:prstGeom>
+          <a:noFill/>
+        </p:spPr>
+        <p:txBody>
+          <a:bodyPr wrap="square" lIns="0" tIns="0" rIns="0" bIns="0" rtlCol="0">
+            <a:noAutofit/>
+          </a:bodyPr>
+          <a:lstStyle/>
+          <a:p>
+            <a:pPr algn="r"/>
+            <a:r>
+              <a:rPr lang="en-US" sz="1100" dirty="0">
+                <a:solidFill>
+                  <a:srgbClr val="0070C0"/>
+                </a:solidFill>
+              </a:rPr>
+              <a:t>1</a:t>
+            </a:r>
+            <a:endParaRPr lang="en-SG" sz="1100" dirty="0">
+              <a:solidFill>
+                <a:srgbClr val="0070C0"/>
+              </a:solidFill>
+            </a:endParaRPr>
+          </a:p>
+        </p:txBody>
+      </p:sp>
+      <p:grpSp>
+        <p:nvGrpSpPr>
+          <p:cNvPr id="68" name="Group 67"/>
+          <p:cNvGrpSpPr/>
+          <p:nvPr/>
+        </p:nvGrpSpPr>
+        <p:grpSpPr>
+          <a:xfrm rot="10800000">
+            <a:off x="4313889" y="3852512"/>
+            <a:ext cx="555486" cy="254462"/>
+            <a:chOff x="3745011" y="829391"/>
+            <a:chExt cx="555486" cy="230832"/>
+          </a:xfrm>
+        </p:grpSpPr>
+        <p:sp>
+          <p:nvSpPr>
+            <p:cNvPr id="69" name="TextBox 68"/>
+            <p:cNvSpPr txBox="1"/>
+            <p:nvPr/>
+          </p:nvSpPr>
+          <p:spPr>
+            <a:xfrm rot="10800000">
+              <a:off x="3745011" y="829391"/>
+              <a:ext cx="555486" cy="230832"/>
+            </a:xfrm>
+            <a:prstGeom prst="rect">
+              <a:avLst/>
+            </a:prstGeom>
+            <a:noFill/>
+          </p:spPr>
+          <p:txBody>
+            <a:bodyPr wrap="square" lIns="0" tIns="0" rIns="0" bIns="0" rtlCol="0">
+              <a:noAutofit/>
+            </a:bodyPr>
+            <a:lstStyle/>
+            <a:p>
+              <a:r>
+                <a:rPr lang="en-US" sz="1100" dirty="0">
+                  <a:solidFill>
+                    <a:schemeClr val="accent5">
+                      <a:lumMod val="75000"/>
+                    </a:schemeClr>
+                  </a:solidFill>
+                </a:rPr>
+                <a:t>creates</a:t>
+              </a:r>
+              <a:endParaRPr lang="en-SG" sz="1100" dirty="0">
+                <a:solidFill>
+                  <a:schemeClr val="accent5">
+                    <a:lumMod val="75000"/>
+                  </a:schemeClr>
+                </a:solidFill>
+              </a:endParaRPr>
+            </a:p>
+          </p:txBody>
+        </p:sp>
+        <p:sp>
+          <p:nvSpPr>
+            <p:cNvPr id="70" name="Isosceles Triangle 69"/>
+            <p:cNvSpPr/>
+            <p:nvPr/>
+          </p:nvSpPr>
+          <p:spPr>
+            <a:xfrm rot="5400000" flipV="1">
+              <a:off x="3741999" y="927058"/>
+              <a:ext cx="119885" cy="88141"/>
+            </a:xfrm>
+            <a:prstGeom prst="triangle">
+              <a:avLst/>
+            </a:prstGeom>
+            <a:solidFill>
+              <a:schemeClr val="accent5">
+                <a:lumMod val="75000"/>
+              </a:schemeClr>
+            </a:solidFill>
+            <a:ln>
+              <a:noFill/>
+            </a:ln>
+          </p:spPr>
+          <p:style>
+            <a:lnRef idx="2">
+              <a:schemeClr val="accent1">
+                <a:shade val="50000"/>
+              </a:schemeClr>
+            </a:lnRef>
+            <a:fillRef idx="1">
+              <a:schemeClr val="accent1"/>
+            </a:fillRef>
+            <a:effectRef idx="0">
+              <a:schemeClr val="accent1"/>
+            </a:effectRef>
+            <a:fontRef idx="minor">
+              <a:schemeClr val="lt1"/>
+            </a:fontRef>
+          </p:style>
+          <p:txBody>
+            <a:bodyPr rtlCol="0" anchor="ctr"/>
+            <a:lstStyle/>
+            <a:p>
+              <a:pPr algn="ctr"/>
+              <a:endParaRPr lang="en-SG"/>
+            </a:p>
+          </p:txBody>
+        </p:sp>
+      </p:grpSp>
+      <p:cxnSp>
+        <p:nvCxnSpPr>
+          <p:cNvPr id="95" name="Straight Connector 94"/>
+          <p:cNvCxnSpPr>
+            <a:cxnSpLocks/>
+            <a:stCxn id="5" idx="3"/>
+            <a:endCxn id="16" idx="1"/>
+          </p:cNvCxnSpPr>
+          <p:nvPr/>
+        </p:nvCxnSpPr>
+        <p:spPr>
+          <a:xfrm flipV="1">
+            <a:off x="2543774" y="3848921"/>
+            <a:ext cx="356189" cy="1599"/>
+          </a:xfrm>
+          <a:prstGeom prst="line">
+            <a:avLst/>
+          </a:prstGeom>
+          <a:ln w="19050">
+            <a:solidFill>
+              <a:srgbClr val="0070C0"/>
+            </a:solidFill>
+            <a:prstDash val="solid"/>
+            <a:headEnd type="none" w="med" len="med"/>
+            <a:tailEnd type="arrow" w="med" len="med"/>
+          </a:ln>
+          <a:effectLst/>
+        </p:spPr>
+        <p:style>
+          <a:lnRef idx="1">
+            <a:schemeClr val="accent2"/>
+          </a:lnRef>
+          <a:fillRef idx="2">
+            <a:schemeClr val="accent2"/>
+          </a:fillRef>
+          <a:effectRef idx="1">
+            <a:schemeClr val="accent2"/>
+          </a:effectRef>
+          <a:fontRef idx="minor">
+            <a:schemeClr val="dk1"/>
+          </a:fontRef>
+        </p:style>
+      </p:cxnSp>
+      <p:cxnSp>
+        <p:nvCxnSpPr>
+          <p:cNvPr id="51" name="Elbow Connector 50"/>
+          <p:cNvCxnSpPr>
+            <a:cxnSpLocks/>
+            <a:stCxn id="16" idx="3"/>
+            <a:endCxn id="42" idx="2"/>
+          </p:cNvCxnSpPr>
+          <p:nvPr/>
+        </p:nvCxnSpPr>
+        <p:spPr>
+          <a:xfrm flipV="1">
+            <a:off x="4178637" y="3181181"/>
+            <a:ext cx="1059342" cy="667740"/>
+          </a:xfrm>
+          <a:prstGeom prst="bentConnector2">
+            <a:avLst/>
+          </a:prstGeom>
+          <a:ln w="19050">
+            <a:solidFill>
+              <a:schemeClr val="accent5">
+                <a:lumMod val="75000"/>
+              </a:schemeClr>
+            </a:solidFill>
+            <a:prstDash val="sysDot"/>
+            <a:headEnd type="none" w="med" len="med"/>
+            <a:tailEnd type="arrow" w="med" len="med"/>
+          </a:ln>
+          <a:effectLst/>
+        </p:spPr>
+        <p:style>
+          <a:lnRef idx="1">
+            <a:schemeClr val="accent2"/>
+          </a:lnRef>
+          <a:fillRef idx="2">
+            <a:schemeClr val="accent2"/>
+          </a:fillRef>
+          <a:effectRef idx="1">
+            <a:schemeClr val="accent2"/>
+          </a:effectRef>
+          <a:fontRef idx="minor">
+            <a:schemeClr val="dk1"/>
+          </a:fontRef>
+        </p:style>
+      </p:cxnSp>
+      <p:cxnSp>
+        <p:nvCxnSpPr>
+          <p:cNvPr id="83" name="Elbow Connector 82"/>
+          <p:cNvCxnSpPr>
+            <a:endCxn id="42" idx="0"/>
+          </p:cNvCxnSpPr>
+          <p:nvPr/>
+        </p:nvCxnSpPr>
+        <p:spPr>
+          <a:xfrm rot="16200000" flipH="1">
+            <a:off x="5118837" y="2715279"/>
+            <a:ext cx="234926" cy="3358"/>
+          </a:xfrm>
+          <a:prstGeom prst="bentConnector3">
+            <a:avLst/>
+          </a:prstGeom>
+          <a:ln>
+            <a:solidFill>
+              <a:schemeClr val="accent5">
+                <a:lumMod val="75000"/>
+              </a:schemeClr>
+            </a:solidFill>
+            <a:prstDash val="sysDot"/>
+          </a:ln>
+        </p:spPr>
+        <p:style>
+          <a:lnRef idx="1">
+            <a:schemeClr val="accent1"/>
+          </a:lnRef>
+          <a:fillRef idx="0">
+            <a:schemeClr val="accent1"/>
+          </a:fillRef>
+          <a:effectRef idx="0">
+            <a:schemeClr val="accent1"/>
+          </a:effectRef>
+          <a:fontRef idx="minor">
+            <a:schemeClr val="tx1"/>
+          </a:fontRef>
+        </p:style>
+      </p:cxnSp>
+      <p:sp>
+        <p:nvSpPr>
+          <p:cNvPr id="127" name="Folded Corner 126"/>
+          <p:cNvSpPr/>
+          <p:nvPr/>
+        </p:nvSpPr>
+        <p:spPr>
+          <a:xfrm>
+            <a:off x="5930774" y="2074810"/>
+            <a:ext cx="1276614" cy="630473"/>
+          </a:xfrm>
+          <a:prstGeom prst="foldedCorner">
+            <a:avLst/>
+          </a:prstGeom>
+          <a:solidFill>
+            <a:schemeClr val="accent5">
+              <a:lumMod val="60000"/>
+              <a:lumOff val="40000"/>
+            </a:schemeClr>
+          </a:solidFill>
+          <a:ln w="19050">
+            <a:solidFill>
+              <a:schemeClr val="bg1"/>
+            </a:solidFill>
+          </a:ln>
+          <a:effectLst/>
+        </p:spPr>
+        <p:style>
+          <a:lnRef idx="1">
+            <a:schemeClr val="accent2"/>
+          </a:lnRef>
+          <a:fillRef idx="2">
+            <a:schemeClr val="accent2"/>
+          </a:fillRef>
+          <a:effectRef idx="1">
+            <a:schemeClr val="accent2"/>
+          </a:effectRef>
+          <a:fontRef idx="minor">
+            <a:schemeClr val="dk1"/>
+          </a:fontRef>
+        </p:style>
+        <p:txBody>
+          <a:bodyPr rtlCol="0" anchor="ctr"/>
+          <a:lstStyle/>
+          <a:p>
+            <a:pPr algn="ctr"/>
+            <a:r>
+              <a:rPr lang="en-US" sz="1050" dirty="0" err="1">
+                <a:solidFill>
+                  <a:schemeClr val="bg1"/>
+                </a:solidFill>
+              </a:rPr>
+              <a:t>XYZCommand</a:t>
+            </a:r>
+            <a:r>
+              <a:rPr lang="en-US" sz="1050" dirty="0">
+                <a:solidFill>
+                  <a:schemeClr val="bg1"/>
+                </a:solidFill>
+              </a:rPr>
+              <a:t> = </a:t>
+            </a:r>
+            <a:r>
+              <a:rPr lang="en-US" sz="1050" dirty="0" err="1">
+                <a:solidFill>
+                  <a:schemeClr val="bg1"/>
+                </a:solidFill>
+              </a:rPr>
+              <a:t>AddCommand</a:t>
+            </a:r>
+            <a:r>
+              <a:rPr lang="en-US" sz="1050" dirty="0">
+                <a:solidFill>
+                  <a:schemeClr val="bg1"/>
+                </a:solidFill>
+              </a:rPr>
+              <a:t>, </a:t>
+            </a:r>
+            <a:r>
+              <a:rPr lang="en-US" sz="1050" dirty="0" err="1">
+                <a:solidFill>
+                  <a:schemeClr val="bg1"/>
+                </a:solidFill>
+              </a:rPr>
+              <a:t>FindCommand</a:t>
+            </a:r>
+            <a:r>
+              <a:rPr lang="en-US" sz="1050" dirty="0">
+                <a:solidFill>
+                  <a:schemeClr val="bg1"/>
+                </a:solidFill>
+              </a:rPr>
+              <a:t>, etc.</a:t>
+            </a:r>
+          </a:p>
+        </p:txBody>
+      </p:sp>
+      <p:sp>
+        <p:nvSpPr>
+          <p:cNvPr id="61" name="Rectangle 62">
+            <a:extLst>
+              <a:ext uri="{FF2B5EF4-FFF2-40B4-BE49-F238E27FC236}">
+                <a16:creationId xmlns:a16="http://schemas.microsoft.com/office/drawing/2014/main" id="{F4041EA0-9807-4C37-ABC1-DC73634A686B}"/>
+              </a:ext>
+            </a:extLst>
+          </p:cNvPr>
+          <p:cNvSpPr/>
+          <p:nvPr/>
+        </p:nvSpPr>
+        <p:spPr>
+          <a:xfrm>
+            <a:off x="2313462" y="4378492"/>
+            <a:ext cx="1045323" cy="384497"/>
+          </a:xfrm>
+          <a:prstGeom prst="rect">
+            <a:avLst/>
+          </a:prstGeom>
+          <a:solidFill>
+            <a:schemeClr val="accent5"/>
+          </a:solidFill>
+          <a:ln/>
+          <a:effectLst/>
+        </p:spPr>
+        <p:style>
+          <a:lnRef idx="1">
+            <a:schemeClr val="accent5"/>
+          </a:lnRef>
+          <a:fillRef idx="2">
+            <a:schemeClr val="accent5"/>
+          </a:fillRef>
+          <a:effectRef idx="1">
+            <a:schemeClr val="accent5"/>
+          </a:effectRef>
+          <a:fontRef idx="minor">
+            <a:schemeClr val="dk1"/>
+          </a:fontRef>
+        </p:style>
+        <p:txBody>
+          <a:bodyPr rtlCol="0" anchor="ctr"/>
+          <a:lstStyle/>
+          <a:p>
+            <a:pPr algn="ctr"/>
+            <a:r>
+              <a:rPr lang="en-US" sz="1050" dirty="0" err="1">
+                <a:solidFill>
+                  <a:schemeClr val="bg1"/>
+                </a:solidFill>
+              </a:rPr>
+              <a:t>QuizMode</a:t>
+            </a:r>
+            <a:endParaRPr lang="en-US" sz="1050" dirty="0">
+              <a:solidFill>
+                <a:schemeClr val="bg1"/>
+              </a:solidFill>
+            </a:endParaRPr>
+          </a:p>
+          <a:p>
+            <a:pPr algn="ctr"/>
+            <a:r>
+              <a:rPr lang="en-US" sz="1050" dirty="0">
+                <a:solidFill>
+                  <a:schemeClr val="bg1"/>
+                </a:solidFill>
+              </a:rPr>
+              <a:t>Parser</a:t>
+            </a:r>
+            <a:endParaRPr lang="en-SG" sz="1050" dirty="0">
+              <a:solidFill>
+                <a:schemeClr val="bg1"/>
+              </a:solidFill>
+            </a:endParaRPr>
+          </a:p>
+        </p:txBody>
+      </p:sp>
+      <p:sp>
+        <p:nvSpPr>
+          <p:cNvPr id="63" name="TextBox 62">
+            <a:extLst>
+              <a:ext uri="{FF2B5EF4-FFF2-40B4-BE49-F238E27FC236}">
+                <a16:creationId xmlns:a16="http://schemas.microsoft.com/office/drawing/2014/main" id="{69883BAD-578D-4190-937D-EBED91749BCC}"/>
+              </a:ext>
+            </a:extLst>
+          </p:cNvPr>
+          <p:cNvSpPr txBox="1"/>
+          <p:nvPr/>
+        </p:nvSpPr>
+        <p:spPr>
+          <a:xfrm>
+            <a:off x="2106044" y="4557297"/>
+            <a:ext cx="131116" cy="230832"/>
+          </a:xfrm>
+          <a:prstGeom prst="rect">
+            <a:avLst/>
+          </a:prstGeom>
+          <a:noFill/>
+        </p:spPr>
+        <p:txBody>
+          <a:bodyPr wrap="square" lIns="0" tIns="0" rIns="0" bIns="0" rtlCol="0">
+            <a:noAutofit/>
+          </a:bodyPr>
+          <a:lstStyle/>
+          <a:p>
+            <a:pPr algn="r"/>
+            <a:r>
+              <a:rPr lang="en-US" sz="1100" dirty="0">
+                <a:solidFill>
+                  <a:srgbClr val="0070C0"/>
+                </a:solidFill>
+              </a:rPr>
+              <a:t>1</a:t>
+            </a:r>
+            <a:endParaRPr lang="en-SG" sz="1100" dirty="0">
+              <a:solidFill>
+                <a:srgbClr val="0070C0"/>
+              </a:solidFill>
+            </a:endParaRPr>
+          </a:p>
+        </p:txBody>
+      </p:sp>
+      <p:grpSp>
+        <p:nvGrpSpPr>
+          <p:cNvPr id="64" name="Group 63">
+            <a:extLst>
+              <a:ext uri="{FF2B5EF4-FFF2-40B4-BE49-F238E27FC236}">
+                <a16:creationId xmlns:a16="http://schemas.microsoft.com/office/drawing/2014/main" id="{F2C80284-4F72-4119-84BC-D3FF2EF887A3}"/>
+              </a:ext>
+            </a:extLst>
+          </p:cNvPr>
+          <p:cNvGrpSpPr/>
+          <p:nvPr/>
+        </p:nvGrpSpPr>
+        <p:grpSpPr>
+          <a:xfrm rot="10800000">
+            <a:off x="3552381" y="4574292"/>
+            <a:ext cx="555486" cy="254462"/>
+            <a:chOff x="3703306" y="644022"/>
+            <a:chExt cx="555486" cy="230832"/>
+          </a:xfrm>
+        </p:grpSpPr>
+        <p:sp>
+          <p:nvSpPr>
+            <p:cNvPr id="67" name="TextBox 66">
+              <a:extLst>
+                <a:ext uri="{FF2B5EF4-FFF2-40B4-BE49-F238E27FC236}">
+                  <a16:creationId xmlns:a16="http://schemas.microsoft.com/office/drawing/2014/main" id="{B9BF7C41-58DF-405E-AE5E-8367E4952C4C}"/>
+                </a:ext>
+              </a:extLst>
+            </p:cNvPr>
+            <p:cNvSpPr txBox="1"/>
+            <p:nvPr/>
+          </p:nvSpPr>
+          <p:spPr>
+            <a:xfrm rot="10800000">
+              <a:off x="3703306" y="644022"/>
+              <a:ext cx="555486" cy="230832"/>
+            </a:xfrm>
+            <a:prstGeom prst="rect">
+              <a:avLst/>
+            </a:prstGeom>
+            <a:noFill/>
+          </p:spPr>
+          <p:txBody>
+            <a:bodyPr wrap="square" lIns="0" tIns="0" rIns="0" bIns="0" rtlCol="0">
+              <a:noAutofit/>
+            </a:bodyPr>
+            <a:lstStyle/>
+            <a:p>
+              <a:r>
+                <a:rPr lang="en-US" sz="1100" dirty="0">
+                  <a:solidFill>
+                    <a:schemeClr val="accent5">
+                      <a:lumMod val="75000"/>
+                    </a:schemeClr>
+                  </a:solidFill>
+                </a:rPr>
+                <a:t>creates</a:t>
+              </a:r>
+              <a:endParaRPr lang="en-SG" sz="1100" dirty="0">
+                <a:solidFill>
+                  <a:schemeClr val="accent5">
+                    <a:lumMod val="75000"/>
+                  </a:schemeClr>
+                </a:solidFill>
+              </a:endParaRPr>
+            </a:p>
+          </p:txBody>
+        </p:sp>
+        <p:sp>
+          <p:nvSpPr>
+            <p:cNvPr id="71" name="Isosceles Triangle 70">
+              <a:extLst>
+                <a:ext uri="{FF2B5EF4-FFF2-40B4-BE49-F238E27FC236}">
+                  <a16:creationId xmlns:a16="http://schemas.microsoft.com/office/drawing/2014/main" id="{3D7271E2-57F5-4142-AB52-B783A075C9DB}"/>
+                </a:ext>
+              </a:extLst>
+            </p:cNvPr>
+            <p:cNvSpPr/>
+            <p:nvPr/>
+          </p:nvSpPr>
+          <p:spPr>
+            <a:xfrm rot="5400000" flipV="1">
+              <a:off x="3700294" y="741689"/>
+              <a:ext cx="119885" cy="88141"/>
+            </a:xfrm>
+            <a:prstGeom prst="triangle">
+              <a:avLst/>
+            </a:prstGeom>
+            <a:solidFill>
+              <a:schemeClr val="accent5">
+                <a:lumMod val="75000"/>
+              </a:schemeClr>
+            </a:solidFill>
+            <a:ln>
+              <a:noFill/>
+            </a:ln>
+          </p:spPr>
+          <p:style>
+            <a:lnRef idx="2">
+              <a:schemeClr val="accent1">
+                <a:shade val="50000"/>
+              </a:schemeClr>
+            </a:lnRef>
+            <a:fillRef idx="1">
+              <a:schemeClr val="accent1"/>
+            </a:fillRef>
+            <a:effectRef idx="0">
+              <a:schemeClr val="accent1"/>
+            </a:effectRef>
+            <a:fontRef idx="minor">
+              <a:schemeClr val="lt1"/>
+            </a:fontRef>
+          </p:style>
+          <p:txBody>
+            <a:bodyPr rtlCol="0" anchor="ctr"/>
+            <a:lstStyle/>
+            <a:p>
+              <a:pPr algn="ctr"/>
+              <a:endParaRPr lang="en-SG"/>
+            </a:p>
+          </p:txBody>
+        </p:sp>
+      </p:grpSp>
+      <p:cxnSp>
+        <p:nvCxnSpPr>
+          <p:cNvPr id="66" name="Elbow Connector 50">
+            <a:extLst>
+              <a:ext uri="{FF2B5EF4-FFF2-40B4-BE49-F238E27FC236}">
+                <a16:creationId xmlns:a16="http://schemas.microsoft.com/office/drawing/2014/main" id="{DF6F8466-6F7F-4F94-BA39-1A0B132FE6D1}"/>
+              </a:ext>
+            </a:extLst>
+          </p:cNvPr>
+          <p:cNvCxnSpPr>
+            <a:cxnSpLocks/>
+            <a:stCxn id="61" idx="3"/>
+            <a:endCxn id="76" idx="3"/>
+          </p:cNvCxnSpPr>
+          <p:nvPr/>
+        </p:nvCxnSpPr>
+        <p:spPr>
+          <a:xfrm flipV="1">
+            <a:off x="3358785" y="4570740"/>
+            <a:ext cx="923518" cy="1"/>
+          </a:xfrm>
+          <a:prstGeom prst="straightConnector1">
+            <a:avLst/>
+          </a:prstGeom>
+          <a:ln w="19050">
+            <a:solidFill>
+              <a:schemeClr val="accent5">
+                <a:lumMod val="75000"/>
+              </a:schemeClr>
+            </a:solidFill>
+            <a:prstDash val="sysDot"/>
+            <a:headEnd type="none" w="med" len="med"/>
+            <a:tailEnd type="arrow" w="med" len="med"/>
+          </a:ln>
+          <a:effectLst/>
+        </p:spPr>
+        <p:style>
+          <a:lnRef idx="1">
+            <a:schemeClr val="accent2"/>
+          </a:lnRef>
+          <a:fillRef idx="2">
+            <a:schemeClr val="accent2"/>
+          </a:fillRef>
+          <a:effectRef idx="1">
+            <a:schemeClr val="accent2"/>
+          </a:effectRef>
+          <a:fontRef idx="minor">
+            <a:schemeClr val="dk1"/>
+          </a:fontRef>
+        </p:style>
+      </p:cxnSp>
+      <p:cxnSp>
+        <p:nvCxnSpPr>
+          <p:cNvPr id="17" name="Connector: Elbow 16">
+            <a:extLst>
+              <a:ext uri="{FF2B5EF4-FFF2-40B4-BE49-F238E27FC236}">
+                <a16:creationId xmlns:a16="http://schemas.microsoft.com/office/drawing/2014/main" id="{D19DF0B8-2C5A-4AE7-80E4-7DE8F4818D7A}"/>
+              </a:ext>
+            </a:extLst>
+          </p:cNvPr>
+          <p:cNvCxnSpPr>
+            <a:cxnSpLocks/>
+            <a:endCxn id="61" idx="1"/>
+          </p:cNvCxnSpPr>
+          <p:nvPr/>
+        </p:nvCxnSpPr>
+        <p:spPr>
+          <a:xfrm rot="16200000" flipH="1">
+            <a:off x="1935790" y="4193068"/>
+            <a:ext cx="561749" cy="193595"/>
+          </a:xfrm>
+          <a:prstGeom prst="bentConnector2">
+            <a:avLst/>
+          </a:prstGeom>
+          <a:ln w="19050">
+            <a:solidFill>
+              <a:srgbClr val="0070C0"/>
+            </a:solidFill>
+            <a:tailEnd type="triangle"/>
+          </a:ln>
+        </p:spPr>
+        <p:style>
+          <a:lnRef idx="1">
+            <a:schemeClr val="accent1"/>
+          </a:lnRef>
+          <a:fillRef idx="0">
+            <a:schemeClr val="accent1"/>
+          </a:fillRef>
+          <a:effectRef idx="0">
+            <a:schemeClr val="accent1"/>
+          </a:effectRef>
+          <a:fontRef idx="minor">
+            <a:schemeClr val="tx1"/>
+          </a:fontRef>
+        </p:style>
+      </p:cxnSp>
+      <p:sp>
+        <p:nvSpPr>
+          <p:cNvPr id="76" name="Rectangle 11">
+            <a:extLst>
+              <a:ext uri="{FF2B5EF4-FFF2-40B4-BE49-F238E27FC236}">
+                <a16:creationId xmlns:a16="http://schemas.microsoft.com/office/drawing/2014/main" id="{B3099139-12AA-446F-90D0-C64FF917F294}"/>
+              </a:ext>
+            </a:extLst>
+          </p:cNvPr>
+          <p:cNvSpPr/>
+          <p:nvPr/>
+        </p:nvSpPr>
+        <p:spPr>
+          <a:xfrm flipH="1">
+            <a:off x="4282303" y="4397360"/>
+            <a:ext cx="1227444" cy="346760"/>
+          </a:xfrm>
+          <a:prstGeom prst="rect">
+            <a:avLst/>
+          </a:prstGeom>
+          <a:ln w="19050">
+            <a:solidFill>
+              <a:srgbClr val="0070C0"/>
+            </a:solidFill>
+          </a:ln>
+          <a:effectLst/>
+        </p:spPr>
+        <p:style>
+          <a:lnRef idx="1">
+            <a:schemeClr val="accent1"/>
+          </a:lnRef>
+          <a:fillRef idx="2">
+            <a:schemeClr val="accent1"/>
+          </a:fillRef>
+          <a:effectRef idx="1">
+            <a:schemeClr val="accent1"/>
+          </a:effectRef>
+          <a:fontRef idx="minor">
+            <a:schemeClr val="dk1"/>
+          </a:fontRef>
+        </p:style>
+        <p:txBody>
+          <a:bodyPr rtlCol="0" anchor="ctr"/>
+          <a:lstStyle/>
+          <a:p>
+            <a:pPr algn="ctr"/>
+            <a:r>
+              <a:rPr lang="en-US" sz="1050" b="1" dirty="0" err="1">
+                <a:solidFill>
+                  <a:srgbClr val="0070C0"/>
+                </a:solidFill>
+              </a:rPr>
+              <a:t>QuizXYZCommand</a:t>
+            </a:r>
+            <a:endParaRPr lang="en-SG" sz="1050" b="1" dirty="0">
+              <a:solidFill>
+                <a:srgbClr val="0070C0"/>
+              </a:solidFill>
+            </a:endParaRPr>
+          </a:p>
+        </p:txBody>
+      </p:sp>
+      <p:sp>
+        <p:nvSpPr>
+          <p:cNvPr id="82" name="Rectangle 62">
+            <a:extLst>
+              <a:ext uri="{FF2B5EF4-FFF2-40B4-BE49-F238E27FC236}">
+                <a16:creationId xmlns:a16="http://schemas.microsoft.com/office/drawing/2014/main" id="{07F2C71E-D6D3-44C2-A28D-A0EA313594B0}"/>
+              </a:ext>
+            </a:extLst>
+          </p:cNvPr>
+          <p:cNvSpPr/>
+          <p:nvPr/>
+        </p:nvSpPr>
+        <p:spPr>
+          <a:xfrm>
+            <a:off x="6074994" y="4397307"/>
+            <a:ext cx="1022806" cy="346760"/>
+          </a:xfrm>
+          <a:prstGeom prst="rect">
+            <a:avLst/>
+          </a:prstGeom>
+          <a:ln w="19050">
+            <a:solidFill>
+              <a:srgbClr val="0070C0"/>
+            </a:solidFill>
+          </a:ln>
+          <a:effectLst/>
+        </p:spPr>
+        <p:style>
+          <a:lnRef idx="1">
+            <a:schemeClr val="accent1"/>
+          </a:lnRef>
+          <a:fillRef idx="2">
+            <a:schemeClr val="accent1"/>
+          </a:fillRef>
+          <a:effectRef idx="1">
+            <a:schemeClr val="accent1"/>
+          </a:effectRef>
+          <a:fontRef idx="minor">
+            <a:schemeClr val="dk1"/>
+          </a:fontRef>
+        </p:style>
+        <p:txBody>
+          <a:bodyPr rtlCol="0" anchor="ctr"/>
+          <a:lstStyle/>
+          <a:p>
+            <a:pPr algn="ctr"/>
+            <a:r>
+              <a:rPr lang="en-US" sz="1050" b="1" dirty="0">
+                <a:solidFill>
+                  <a:srgbClr val="0070C0"/>
+                </a:solidFill>
+              </a:rPr>
+              <a:t>{abstract}</a:t>
+            </a:r>
+            <a:br>
+              <a:rPr lang="en-US" sz="1050" b="1" dirty="0">
+                <a:solidFill>
+                  <a:srgbClr val="0070C0"/>
+                </a:solidFill>
+              </a:rPr>
+            </a:br>
+            <a:r>
+              <a:rPr lang="en-US" sz="1050" b="1" dirty="0" err="1">
+                <a:solidFill>
+                  <a:srgbClr val="0070C0"/>
+                </a:solidFill>
+              </a:rPr>
+              <a:t>QuizCommand</a:t>
+            </a:r>
+            <a:endParaRPr lang="en-SG" sz="1050" b="1" dirty="0">
+              <a:solidFill>
+                <a:srgbClr val="0070C0"/>
+              </a:solidFill>
+            </a:endParaRPr>
+          </a:p>
+        </p:txBody>
+      </p:sp>
+      <p:grpSp>
+        <p:nvGrpSpPr>
+          <p:cNvPr id="52" name="Group 51">
+            <a:extLst>
+              <a:ext uri="{FF2B5EF4-FFF2-40B4-BE49-F238E27FC236}">
+                <a16:creationId xmlns:a16="http://schemas.microsoft.com/office/drawing/2014/main" id="{54ED6CCC-BB51-4DBC-A57A-9867C72A903D}"/>
+              </a:ext>
+            </a:extLst>
+          </p:cNvPr>
+          <p:cNvGrpSpPr/>
+          <p:nvPr/>
+        </p:nvGrpSpPr>
+        <p:grpSpPr>
+          <a:xfrm rot="16200000">
+            <a:off x="5651697" y="4295492"/>
+            <a:ext cx="270504" cy="554401"/>
+            <a:chOff x="5994660" y="4617767"/>
+            <a:chExt cx="270504" cy="554401"/>
+          </a:xfrm>
+        </p:grpSpPr>
+        <p:sp>
+          <p:nvSpPr>
+            <p:cNvPr id="93" name="Isosceles Triangle 102">
+              <a:extLst>
+                <a:ext uri="{FF2B5EF4-FFF2-40B4-BE49-F238E27FC236}">
+                  <a16:creationId xmlns:a16="http://schemas.microsoft.com/office/drawing/2014/main" id="{9D45F62C-4547-4332-A2ED-586B0CFF375C}"/>
+                </a:ext>
+              </a:extLst>
+            </p:cNvPr>
+            <p:cNvSpPr/>
+            <p:nvPr/>
+          </p:nvSpPr>
+          <p:spPr>
+            <a:xfrm flipV="1">
+              <a:off x="5994660" y="4996645"/>
+              <a:ext cx="270504" cy="175523"/>
+            </a:xfrm>
+            <a:prstGeom prst="triangle">
+              <a:avLst/>
+            </a:prstGeom>
+            <a:solidFill>
+              <a:schemeClr val="tx2">
+                <a:lumMod val="60000"/>
+                <a:lumOff val="40000"/>
+              </a:schemeClr>
+            </a:solidFill>
+            <a:ln w="19050">
+              <a:solidFill>
+                <a:srgbClr val="0070C0"/>
+              </a:solidFill>
+            </a:ln>
+            <a:effectLst/>
+          </p:spPr>
+          <p:style>
+            <a:lnRef idx="1">
+              <a:schemeClr val="accent1"/>
+            </a:lnRef>
+            <a:fillRef idx="2">
+              <a:schemeClr val="accent1"/>
+            </a:fillRef>
+            <a:effectRef idx="1">
+              <a:schemeClr val="accent1"/>
+            </a:effectRef>
+            <a:fontRef idx="minor">
+              <a:schemeClr val="dk1"/>
+            </a:fontRef>
+          </p:style>
+          <p:txBody>
+            <a:bodyPr rtlCol="0" anchor="ctr"/>
+            <a:lstStyle/>
+            <a:p>
+              <a:pPr algn="ctr"/>
+              <a:endParaRPr lang="en-SG" sz="1050" b="1">
+                <a:solidFill>
+                  <a:srgbClr val="92D050"/>
+                </a:solidFill>
+              </a:endParaRPr>
+            </a:p>
+          </p:txBody>
+        </p:sp>
+        <p:cxnSp>
+          <p:nvCxnSpPr>
+            <p:cNvPr id="94" name="Elbow Connector 95">
+              <a:extLst>
+                <a:ext uri="{FF2B5EF4-FFF2-40B4-BE49-F238E27FC236}">
+                  <a16:creationId xmlns:a16="http://schemas.microsoft.com/office/drawing/2014/main" id="{E9729A63-A8EE-44FE-B37D-B11869F0022A}"/>
+                </a:ext>
+              </a:extLst>
+            </p:cNvPr>
+            <p:cNvCxnSpPr>
+              <a:cxnSpLocks/>
+              <a:stCxn id="93" idx="3"/>
+              <a:endCxn id="76" idx="1"/>
+            </p:cNvCxnSpPr>
+            <p:nvPr/>
+          </p:nvCxnSpPr>
+          <p:spPr>
+            <a:xfrm rot="5400000" flipH="1" flipV="1">
+              <a:off x="5941448" y="4806231"/>
+              <a:ext cx="378879" cy="1951"/>
+            </a:xfrm>
+            <a:prstGeom prst="straightConnector1">
+              <a:avLst/>
+            </a:prstGeom>
+            <a:ln w="19050">
+              <a:headEnd type="none" w="med" len="med"/>
+              <a:tailEnd type="none" w="med" len="med"/>
+            </a:ln>
+          </p:spPr>
+          <p:style>
+            <a:lnRef idx="1">
+              <a:schemeClr val="accent1"/>
+            </a:lnRef>
+            <a:fillRef idx="0">
+              <a:schemeClr val="accent1"/>
+            </a:fillRef>
+            <a:effectRef idx="0">
+              <a:schemeClr val="accent1"/>
+            </a:effectRef>
+            <a:fontRef idx="minor">
+              <a:schemeClr val="tx1"/>
+            </a:fontRef>
+          </p:style>
+        </p:cxnSp>
+      </p:grpSp>
+      <p:cxnSp>
+        <p:nvCxnSpPr>
+          <p:cNvPr id="99" name="Elbow Connector 63">
+            <a:extLst>
+              <a:ext uri="{FF2B5EF4-FFF2-40B4-BE49-F238E27FC236}">
+                <a16:creationId xmlns:a16="http://schemas.microsoft.com/office/drawing/2014/main" id="{E4517CB6-EF88-4061-B966-746AB404D3E7}"/>
+              </a:ext>
+            </a:extLst>
+          </p:cNvPr>
+          <p:cNvCxnSpPr>
+            <a:cxnSpLocks/>
+            <a:stCxn id="82" idx="3"/>
+          </p:cNvCxnSpPr>
+          <p:nvPr/>
+        </p:nvCxnSpPr>
+        <p:spPr>
+          <a:xfrm flipH="1" flipV="1">
+            <a:off x="2853970" y="1411727"/>
+            <a:ext cx="4243830" cy="3158960"/>
+          </a:xfrm>
+          <a:prstGeom prst="bentConnector3">
+            <a:avLst>
+              <a:gd name="adj1" fmla="val -31674"/>
+            </a:avLst>
+          </a:prstGeom>
+          <a:ln w="19050">
+            <a:solidFill>
+              <a:srgbClr val="0070C0"/>
+            </a:solidFill>
+            <a:prstDash val="sysDot"/>
+            <a:headEnd type="none" w="med" len="med"/>
+            <a:tailEnd type="arrow" w="med" len="med"/>
+          </a:ln>
+          <a:effectLst/>
+        </p:spPr>
+        <p:style>
+          <a:lnRef idx="1">
+            <a:schemeClr val="accent2"/>
+          </a:lnRef>
+          <a:fillRef idx="2">
+            <a:schemeClr val="accent2"/>
+          </a:fillRef>
+          <a:effectRef idx="1">
+            <a:schemeClr val="accent2"/>
+          </a:effectRef>
+          <a:fontRef idx="minor">
+            <a:schemeClr val="dk1"/>
+          </a:fontRef>
+        </p:style>
+      </p:cxnSp>
+      <p:grpSp>
+        <p:nvGrpSpPr>
+          <p:cNvPr id="100" name="Group 99">
+            <a:extLst>
+              <a:ext uri="{FF2B5EF4-FFF2-40B4-BE49-F238E27FC236}">
+                <a16:creationId xmlns:a16="http://schemas.microsoft.com/office/drawing/2014/main" id="{F38590C2-A10B-487C-A5E6-CE15CEBC4FBD}"/>
+              </a:ext>
+            </a:extLst>
+          </p:cNvPr>
+          <p:cNvGrpSpPr/>
+          <p:nvPr/>
+        </p:nvGrpSpPr>
+        <p:grpSpPr>
+          <a:xfrm>
+            <a:off x="4307702" y="1213400"/>
+            <a:ext cx="868568" cy="230832"/>
+            <a:chOff x="2755838" y="821201"/>
+            <a:chExt cx="868568" cy="230832"/>
+          </a:xfrm>
+        </p:grpSpPr>
+        <p:sp>
+          <p:nvSpPr>
+            <p:cNvPr id="105" name="TextBox 104">
+              <a:extLst>
+                <a:ext uri="{FF2B5EF4-FFF2-40B4-BE49-F238E27FC236}">
+                  <a16:creationId xmlns:a16="http://schemas.microsoft.com/office/drawing/2014/main" id="{33A8E5EE-F430-4C4F-B8D4-597C0A4B3E3F}"/>
+                </a:ext>
+              </a:extLst>
+            </p:cNvPr>
+            <p:cNvSpPr txBox="1"/>
+            <p:nvPr/>
+          </p:nvSpPr>
+          <p:spPr>
+            <a:xfrm>
+              <a:off x="2895600" y="821201"/>
+              <a:ext cx="728806" cy="230832"/>
+            </a:xfrm>
+            <a:prstGeom prst="rect">
+              <a:avLst/>
+            </a:prstGeom>
+            <a:noFill/>
+          </p:spPr>
+          <p:txBody>
+            <a:bodyPr wrap="square" lIns="0" tIns="0" rIns="0" bIns="0" rtlCol="0">
+              <a:noAutofit/>
+            </a:bodyPr>
+            <a:lstStyle/>
+            <a:p>
+              <a:r>
+                <a:rPr lang="en-US" sz="1100" dirty="0">
+                  <a:solidFill>
+                    <a:srgbClr val="0070C0"/>
+                  </a:solidFill>
+                </a:rPr>
+                <a:t>produces</a:t>
+              </a:r>
+              <a:endParaRPr lang="en-SG" sz="1100" dirty="0">
+                <a:solidFill>
+                  <a:srgbClr val="0070C0"/>
+                </a:solidFill>
+              </a:endParaRPr>
+            </a:p>
+          </p:txBody>
+        </p:sp>
+        <p:sp>
+          <p:nvSpPr>
+            <p:cNvPr id="106" name="Isosceles Triangle 105">
+              <a:extLst>
+                <a:ext uri="{FF2B5EF4-FFF2-40B4-BE49-F238E27FC236}">
+                  <a16:creationId xmlns:a16="http://schemas.microsoft.com/office/drawing/2014/main" id="{BC5AA424-C2A0-4A4D-99FE-52A635DC0CF7}"/>
+                </a:ext>
+              </a:extLst>
+            </p:cNvPr>
+            <p:cNvSpPr/>
+            <p:nvPr/>
+          </p:nvSpPr>
+          <p:spPr>
+            <a:xfrm rot="16200000" flipH="1">
+              <a:off x="2730963" y="888922"/>
+              <a:ext cx="125951" cy="76201"/>
+            </a:xfrm>
+            <a:prstGeom prst="triangle">
+              <a:avLst/>
+            </a:prstGeom>
+            <a:solidFill>
+              <a:srgbClr val="0070C0"/>
+            </a:solidFill>
+            <a:ln>
+              <a:noFill/>
+            </a:ln>
+          </p:spPr>
+          <p:style>
+            <a:lnRef idx="2">
+              <a:schemeClr val="accent1">
+                <a:shade val="50000"/>
+              </a:schemeClr>
+            </a:lnRef>
+            <a:fillRef idx="1">
+              <a:schemeClr val="accent1"/>
+            </a:fillRef>
+            <a:effectRef idx="0">
+              <a:schemeClr val="accent1"/>
+            </a:effectRef>
+            <a:fontRef idx="minor">
+              <a:schemeClr val="lt1"/>
+            </a:fontRef>
+          </p:style>
+          <p:txBody>
+            <a:bodyPr rtlCol="0" anchor="ctr"/>
+            <a:lstStyle/>
+            <a:p>
+              <a:pPr algn="ctr"/>
+              <a:endParaRPr lang="en-SG"/>
+            </a:p>
+          </p:txBody>
+        </p:sp>
+      </p:grpSp>
+      <p:sp>
+        <p:nvSpPr>
           <p:cNvPr id="113" name="Rectangle 65">
             <a:extLst>
               <a:ext uri="{FF2B5EF4-FFF2-40B4-BE49-F238E27FC236}">
@@ -7005,7 +10759,7 @@
         <p:spPr>
           <a:xfrm>
             <a:off x="734444" y="5625093"/>
-            <a:ext cx="7848600" cy="328045"/>
+            <a:ext cx="7952356" cy="328045"/>
           </a:xfrm>
           <a:prstGeom prst="roundRect">
             <a:avLst/>

</xml_diff>

<commit_message>
Update outdated diagrams in DG to customize to The Food Diary and fix UG error
</commit_message>
<xml_diff>
--- a/docs/diagrams/LogicComponentClassDiagram.pptx
+++ b/docs/diagrams/LogicComponentClassDiagram.pptx
@@ -126,10 +126,6 @@
 </p:presentation>
 </file>
 
-<file path=ppt/revisionInfo.xml><?xml version="1.0" encoding="utf-8"?>
-<p1510:revInfo xmlns:a="http://schemas.openxmlformats.org/drawingml/2006/main" xmlns:r="http://schemas.openxmlformats.org/officeDocument/2006/relationships" xmlns:p1510="http://schemas.microsoft.com/office/powerpoint/2015/10/main"/>
-</file>
-
 <file path=ppt/notesMasters/notesMaster1.xml><?xml version="1.0" encoding="utf-8"?>
 <p:notesMaster xmlns:a="http://schemas.openxmlformats.org/drawingml/2006/main" xmlns:r="http://schemas.openxmlformats.org/officeDocument/2006/relationships" xmlns:p="http://schemas.openxmlformats.org/presentationml/2006/main">
   <p:cSld>
@@ -212,7 +208,7 @@
           <a:p>
             <a:fld id="{F5CC4B3F-88C1-4FFA-B1B6-F41C21DC6924}" type="datetimeFigureOut">
               <a:rPr lang="en-US" smtClean="0"/>
-              <a:t>4/16/2018</a:t>
+              <a:t>4/5/19</a:t>
             </a:fld>
             <a:endParaRPr lang="en-US"/>
           </a:p>
@@ -658,7 +654,7 @@
           <a:p>
             <a:fld id="{78C97017-6FC3-485B-9764-EAC9E56C1D49}" type="datetimeFigureOut">
               <a:rPr lang="en-US" smtClean="0"/>
-              <a:t>4/16/2018</a:t>
+              <a:t>4/5/19</a:t>
             </a:fld>
             <a:endParaRPr lang="en-US"/>
           </a:p>
@@ -826,7 +822,7 @@
           <a:p>
             <a:fld id="{78C97017-6FC3-485B-9764-EAC9E56C1D49}" type="datetimeFigureOut">
               <a:rPr lang="en-US" smtClean="0"/>
-              <a:t>4/16/2018</a:t>
+              <a:t>4/5/19</a:t>
             </a:fld>
             <a:endParaRPr lang="en-US"/>
           </a:p>
@@ -1004,7 +1000,7 @@
           <a:p>
             <a:fld id="{78C97017-6FC3-485B-9764-EAC9E56C1D49}" type="datetimeFigureOut">
               <a:rPr lang="en-US" smtClean="0"/>
-              <a:t>4/16/2018</a:t>
+              <a:t>4/5/19</a:t>
             </a:fld>
             <a:endParaRPr lang="en-US"/>
           </a:p>
@@ -1172,7 +1168,7 @@
           <a:p>
             <a:fld id="{78C97017-6FC3-485B-9764-EAC9E56C1D49}" type="datetimeFigureOut">
               <a:rPr lang="en-US" smtClean="0"/>
-              <a:t>4/16/2018</a:t>
+              <a:t>4/5/19</a:t>
             </a:fld>
             <a:endParaRPr lang="en-US"/>
           </a:p>
@@ -1417,7 +1413,7 @@
           <a:p>
             <a:fld id="{78C97017-6FC3-485B-9764-EAC9E56C1D49}" type="datetimeFigureOut">
               <a:rPr lang="en-US" smtClean="0"/>
-              <a:t>4/16/2018</a:t>
+              <a:t>4/5/19</a:t>
             </a:fld>
             <a:endParaRPr lang="en-US"/>
           </a:p>
@@ -1702,7 +1698,7 @@
           <a:p>
             <a:fld id="{78C97017-6FC3-485B-9764-EAC9E56C1D49}" type="datetimeFigureOut">
               <a:rPr lang="en-US" smtClean="0"/>
-              <a:t>4/16/2018</a:t>
+              <a:t>4/5/19</a:t>
             </a:fld>
             <a:endParaRPr lang="en-US"/>
           </a:p>
@@ -2121,7 +2117,7 @@
           <a:p>
             <a:fld id="{78C97017-6FC3-485B-9764-EAC9E56C1D49}" type="datetimeFigureOut">
               <a:rPr lang="en-US" smtClean="0"/>
-              <a:t>4/16/2018</a:t>
+              <a:t>4/5/19</a:t>
             </a:fld>
             <a:endParaRPr lang="en-US"/>
           </a:p>
@@ -2238,7 +2234,7 @@
           <a:p>
             <a:fld id="{78C97017-6FC3-485B-9764-EAC9E56C1D49}" type="datetimeFigureOut">
               <a:rPr lang="en-US" smtClean="0"/>
-              <a:t>4/16/2018</a:t>
+              <a:t>4/5/19</a:t>
             </a:fld>
             <a:endParaRPr lang="en-US"/>
           </a:p>
@@ -2333,7 +2329,7 @@
           <a:p>
             <a:fld id="{78C97017-6FC3-485B-9764-EAC9E56C1D49}" type="datetimeFigureOut">
               <a:rPr lang="en-US" smtClean="0"/>
-              <a:t>4/16/2018</a:t>
+              <a:t>4/5/19</a:t>
             </a:fld>
             <a:endParaRPr lang="en-US"/>
           </a:p>
@@ -2608,7 +2604,7 @@
           <a:p>
             <a:fld id="{78C97017-6FC3-485B-9764-EAC9E56C1D49}" type="datetimeFigureOut">
               <a:rPr lang="en-US" smtClean="0"/>
-              <a:t>4/16/2018</a:t>
+              <a:t>4/5/19</a:t>
             </a:fld>
             <a:endParaRPr lang="en-US"/>
           </a:p>
@@ -2860,7 +2856,7 @@
           <a:p>
             <a:fld id="{78C97017-6FC3-485B-9764-EAC9E56C1D49}" type="datetimeFigureOut">
               <a:rPr lang="en-US" smtClean="0"/>
-              <a:t>4/16/2018</a:t>
+              <a:t>4/5/19</a:t>
             </a:fld>
             <a:endParaRPr lang="en-US"/>
           </a:p>
@@ -3071,7 +3067,7 @@
           <a:p>
             <a:fld id="{78C97017-6FC3-485B-9764-EAC9E56C1D49}" type="datetimeFigureOut">
               <a:rPr lang="en-US" smtClean="0"/>
-              <a:t>4/16/2018</a:t>
+              <a:t>4/5/19</a:t>
             </a:fld>
             <a:endParaRPr lang="en-US"/>
           </a:p>
@@ -3607,7 +3603,7 @@
           <a:p>
             <a:pPr algn="ctr"/>
             <a:r>
-              <a:rPr lang="en-US" sz="1050" b="1" dirty="0" err="1" smtClean="0">
+              <a:rPr lang="en-US" sz="1050" b="1" dirty="0" err="1">
                 <a:solidFill>
                   <a:srgbClr val="0070C0"/>
                 </a:solidFill>
@@ -3939,12 +3935,12 @@
           <a:p>
             <a:pPr algn="ctr"/>
             <a:r>
-              <a:rPr lang="en-US" sz="1050" dirty="0" err="1" smtClean="0">
+              <a:rPr lang="en-US" sz="1050" dirty="0" err="1">
                 <a:solidFill>
                   <a:schemeClr val="bg1"/>
                 </a:solidFill>
               </a:rPr>
-              <a:t>AddressBook</a:t>
+              <a:t>FoodDiary</a:t>
             </a:r>
             <a:endParaRPr lang="en-US" sz="1050" dirty="0">
               <a:solidFill>
@@ -5815,7 +5811,7 @@
           <a:p>
             <a:pPr algn="ctr"/>
             <a:r>
-              <a:rPr lang="en-US" sz="1050" b="1" dirty="0" err="1" smtClean="0">
+              <a:rPr lang="en-US" sz="1050" b="1" dirty="0" err="1">
                 <a:solidFill>
                   <a:schemeClr val="bg1"/>
                 </a:solidFill>
@@ -6165,7 +6161,7 @@
           <a:p>
             <a:pPr algn="ctr"/>
             <a:r>
-              <a:rPr lang="en-US" sz="1050" dirty="0" err="1" smtClean="0">
+              <a:rPr lang="en-US" sz="1050" dirty="0" err="1">
                 <a:solidFill>
                   <a:schemeClr val="bg1"/>
                 </a:solidFill>
@@ -6173,7 +6169,7 @@
               <a:t>XYZCommand</a:t>
             </a:r>
             <a:r>
-              <a:rPr lang="en-US" sz="1050" dirty="0" smtClean="0">
+              <a:rPr lang="en-US" sz="1050" dirty="0">
                 <a:solidFill>
                   <a:schemeClr val="bg1"/>
                 </a:solidFill>
@@ -6181,7 +6177,7 @@
               <a:t> = </a:t>
             </a:r>
             <a:r>
-              <a:rPr lang="en-US" sz="1050" dirty="0" err="1" smtClean="0">
+              <a:rPr lang="en-US" sz="1050" dirty="0" err="1">
                 <a:solidFill>
                   <a:schemeClr val="bg1"/>
                 </a:solidFill>
@@ -6189,7 +6185,7 @@
               <a:t>AddCommand</a:t>
             </a:r>
             <a:r>
-              <a:rPr lang="en-US" sz="1050" dirty="0" smtClean="0">
+              <a:rPr lang="en-US" sz="1050" dirty="0">
                 <a:solidFill>
                   <a:schemeClr val="bg1"/>
                 </a:solidFill>
@@ -6197,7 +6193,7 @@
               <a:t>, </a:t>
             </a:r>
             <a:r>
-              <a:rPr lang="en-US" sz="1050" dirty="0" err="1" smtClean="0">
+              <a:rPr lang="en-US" sz="1050" dirty="0" err="1">
                 <a:solidFill>
                   <a:schemeClr val="bg1"/>
                 </a:solidFill>
@@ -6205,18 +6201,13 @@
               <a:t>FindCommand</a:t>
             </a:r>
             <a:r>
-              <a:rPr lang="en-US" sz="1050" dirty="0" smtClean="0">
+              <a:rPr lang="en-US" sz="1050" dirty="0">
                 <a:solidFill>
                   <a:schemeClr val="bg1"/>
                 </a:solidFill>
               </a:rPr>
               <a:t>, etc.</a:t>
             </a:r>
-            <a:endParaRPr lang="en-US" sz="1050" dirty="0">
-              <a:solidFill>
-                <a:schemeClr val="bg1"/>
-              </a:solidFill>
-            </a:endParaRPr>
           </a:p>
         </p:txBody>
       </p:sp>

</xml_diff>

<commit_message>
Update documentation for UG, DG and PPP.
</commit_message>
<xml_diff>
--- a/docs/diagrams/LogicComponentClassDiagram.pptx
+++ b/docs/diagrams/LogicComponentClassDiagram.pptx
@@ -208,7 +208,7 @@
           <a:p>
             <a:fld id="{F5CC4B3F-88C1-4FFA-B1B6-F41C21DC6924}" type="datetimeFigureOut">
               <a:rPr lang="en-US" smtClean="0"/>
-              <a:t>22-Mar-19</a:t>
+              <a:t>09-Apr-19</a:t>
             </a:fld>
             <a:endParaRPr lang="en-US"/>
           </a:p>
@@ -654,7 +654,7 @@
           <a:p>
             <a:fld id="{78C97017-6FC3-485B-9764-EAC9E56C1D49}" type="datetimeFigureOut">
               <a:rPr lang="en-US" smtClean="0"/>
-              <a:t>22-Mar-19</a:t>
+              <a:t>09-Apr-19</a:t>
             </a:fld>
             <a:endParaRPr lang="en-US"/>
           </a:p>
@@ -822,7 +822,7 @@
           <a:p>
             <a:fld id="{78C97017-6FC3-485B-9764-EAC9E56C1D49}" type="datetimeFigureOut">
               <a:rPr lang="en-US" smtClean="0"/>
-              <a:t>22-Mar-19</a:t>
+              <a:t>09-Apr-19</a:t>
             </a:fld>
             <a:endParaRPr lang="en-US"/>
           </a:p>
@@ -1000,7 +1000,7 @@
           <a:p>
             <a:fld id="{78C97017-6FC3-485B-9764-EAC9E56C1D49}" type="datetimeFigureOut">
               <a:rPr lang="en-US" smtClean="0"/>
-              <a:t>22-Mar-19</a:t>
+              <a:t>09-Apr-19</a:t>
             </a:fld>
             <a:endParaRPr lang="en-US"/>
           </a:p>
@@ -1168,7 +1168,7 @@
           <a:p>
             <a:fld id="{78C97017-6FC3-485B-9764-EAC9E56C1D49}" type="datetimeFigureOut">
               <a:rPr lang="en-US" smtClean="0"/>
-              <a:t>22-Mar-19</a:t>
+              <a:t>09-Apr-19</a:t>
             </a:fld>
             <a:endParaRPr lang="en-US"/>
           </a:p>
@@ -1413,7 +1413,7 @@
           <a:p>
             <a:fld id="{78C97017-6FC3-485B-9764-EAC9E56C1D49}" type="datetimeFigureOut">
               <a:rPr lang="en-US" smtClean="0"/>
-              <a:t>22-Mar-19</a:t>
+              <a:t>09-Apr-19</a:t>
             </a:fld>
             <a:endParaRPr lang="en-US"/>
           </a:p>
@@ -1698,7 +1698,7 @@
           <a:p>
             <a:fld id="{78C97017-6FC3-485B-9764-EAC9E56C1D49}" type="datetimeFigureOut">
               <a:rPr lang="en-US" smtClean="0"/>
-              <a:t>22-Mar-19</a:t>
+              <a:t>09-Apr-19</a:t>
             </a:fld>
             <a:endParaRPr lang="en-US"/>
           </a:p>
@@ -2117,7 +2117,7 @@
           <a:p>
             <a:fld id="{78C97017-6FC3-485B-9764-EAC9E56C1D49}" type="datetimeFigureOut">
               <a:rPr lang="en-US" smtClean="0"/>
-              <a:t>22-Mar-19</a:t>
+              <a:t>09-Apr-19</a:t>
             </a:fld>
             <a:endParaRPr lang="en-US"/>
           </a:p>
@@ -2234,7 +2234,7 @@
           <a:p>
             <a:fld id="{78C97017-6FC3-485B-9764-EAC9E56C1D49}" type="datetimeFigureOut">
               <a:rPr lang="en-US" smtClean="0"/>
-              <a:t>22-Mar-19</a:t>
+              <a:t>09-Apr-19</a:t>
             </a:fld>
             <a:endParaRPr lang="en-US"/>
           </a:p>
@@ -2329,7 +2329,7 @@
           <a:p>
             <a:fld id="{78C97017-6FC3-485B-9764-EAC9E56C1D49}" type="datetimeFigureOut">
               <a:rPr lang="en-US" smtClean="0"/>
-              <a:t>22-Mar-19</a:t>
+              <a:t>09-Apr-19</a:t>
             </a:fld>
             <a:endParaRPr lang="en-US"/>
           </a:p>
@@ -2604,7 +2604,7 @@
           <a:p>
             <a:fld id="{78C97017-6FC3-485B-9764-EAC9E56C1D49}" type="datetimeFigureOut">
               <a:rPr lang="en-US" smtClean="0"/>
-              <a:t>22-Mar-19</a:t>
+              <a:t>09-Apr-19</a:t>
             </a:fld>
             <a:endParaRPr lang="en-US"/>
           </a:p>
@@ -2856,7 +2856,7 @@
           <a:p>
             <a:fld id="{78C97017-6FC3-485B-9764-EAC9E56C1D49}" type="datetimeFigureOut">
               <a:rPr lang="en-US" smtClean="0"/>
-              <a:t>22-Mar-19</a:t>
+              <a:t>09-Apr-19</a:t>
             </a:fld>
             <a:endParaRPr lang="en-US"/>
           </a:p>
@@ -3067,7 +3067,7 @@
           <a:p>
             <a:fld id="{78C97017-6FC3-485B-9764-EAC9E56C1D49}" type="datetimeFigureOut">
               <a:rPr lang="en-US" smtClean="0"/>
-              <a:t>22-Mar-19</a:t>
+              <a:t>09-Apr-19</a:t>
             </a:fld>
             <a:endParaRPr lang="en-US"/>
           </a:p>
@@ -3547,7 +3547,7 @@
           <a:p>
             <a:pPr algn="ctr"/>
             <a:r>
-              <a:rPr lang="en-US" sz="1050" dirty="0" err="1">
+              <a:rPr lang="en-US" sz="1050" dirty="0">
                 <a:solidFill>
                   <a:schemeClr val="bg1"/>
                 </a:solidFill>
@@ -3603,7 +3603,7 @@
           <a:p>
             <a:pPr algn="ctr"/>
             <a:r>
-              <a:rPr lang="en-US" sz="1050" b="1" dirty="0" err="1">
+              <a:rPr lang="en-US" sz="1050" b="1" dirty="0">
                 <a:solidFill>
                   <a:srgbClr val="0070C0"/>
                 </a:solidFill>
@@ -3662,7 +3662,7 @@
           <a:p>
             <a:pPr algn="ctr"/>
             <a:r>
-              <a:rPr lang="en-US" sz="1050" dirty="0" err="1">
+              <a:rPr lang="en-US" sz="1050" dirty="0">
                 <a:solidFill>
                   <a:schemeClr val="bg1"/>
                 </a:solidFill>
@@ -4768,18 +4768,13 @@
           <a:p>
             <a:pPr algn="ctr"/>
             <a:r>
-              <a:rPr lang="en-SG" sz="1050" dirty="0" err="1">
+              <a:rPr lang="en-SG" sz="1050" dirty="0">
                 <a:solidFill>
                   <a:schemeClr val="bg1"/>
                 </a:solidFill>
               </a:rPr>
               <a:t>CliSyntax</a:t>
             </a:r>
-            <a:endParaRPr lang="en-SG" sz="1050" dirty="0">
-              <a:solidFill>
-                <a:schemeClr val="bg1"/>
-              </a:solidFill>
-            </a:endParaRPr>
           </a:p>
         </p:txBody>
       </p:sp>
@@ -4833,18 +4828,13 @@
           <a:p>
             <a:pPr algn="ctr"/>
             <a:r>
-              <a:rPr lang="en-SG" sz="1050" dirty="0" err="1">
+              <a:rPr lang="en-SG" sz="1050" dirty="0">
                 <a:solidFill>
                   <a:schemeClr val="bg1"/>
                 </a:solidFill>
               </a:rPr>
               <a:t>ParserUtil</a:t>
             </a:r>
-            <a:endParaRPr lang="en-SG" sz="1050" dirty="0">
-              <a:solidFill>
-                <a:schemeClr val="bg1"/>
-              </a:solidFill>
-            </a:endParaRPr>
           </a:p>
         </p:txBody>
       </p:sp>
@@ -5806,18 +5796,13 @@
           <a:p>
             <a:pPr algn="ctr"/>
             <a:r>
-              <a:rPr lang="en-US" sz="1050" b="1" dirty="0" err="1">
+              <a:rPr lang="en-US" sz="1050" b="1" dirty="0">
                 <a:solidFill>
                   <a:schemeClr val="bg1"/>
                 </a:solidFill>
               </a:rPr>
               <a:t>XYZCommand</a:t>
             </a:r>
-            <a:endParaRPr lang="en-US" sz="1050" b="1" dirty="0">
-              <a:solidFill>
-                <a:schemeClr val="bg1"/>
-              </a:solidFill>
-            </a:endParaRPr>
           </a:p>
           <a:p>
             <a:pPr algn="ctr"/>
@@ -6156,52 +6141,12 @@
           <a:p>
             <a:pPr algn="ctr"/>
             <a:r>
-              <a:rPr lang="en-US" sz="1050" dirty="0" err="1">
-                <a:solidFill>
-                  <a:schemeClr val="bg1"/>
-                </a:solidFill>
-              </a:rPr>
-              <a:t>XYZCommand</a:t>
-            </a:r>
-            <a:r>
               <a:rPr lang="en-US" sz="1050" dirty="0">
                 <a:solidFill>
                   <a:schemeClr val="bg1"/>
                 </a:solidFill>
               </a:rPr>
-              <a:t> = </a:t>
-            </a:r>
-            <a:r>
-              <a:rPr lang="en-US" sz="1050" dirty="0" err="1">
-                <a:solidFill>
-                  <a:schemeClr val="bg1"/>
-                </a:solidFill>
-              </a:rPr>
-              <a:t>AddCommand</a:t>
-            </a:r>
-            <a:r>
-              <a:rPr lang="en-US" sz="1050" dirty="0">
-                <a:solidFill>
-                  <a:schemeClr val="bg1"/>
-                </a:solidFill>
-              </a:rPr>
-              <a:t>, </a:t>
-            </a:r>
-            <a:r>
-              <a:rPr lang="en-US" sz="1050" dirty="0" err="1">
-                <a:solidFill>
-                  <a:schemeClr val="bg1"/>
-                </a:solidFill>
-              </a:rPr>
-              <a:t>FindCommand</a:t>
-            </a:r>
-            <a:r>
-              <a:rPr lang="en-US" sz="1050" dirty="0">
-                <a:solidFill>
-                  <a:schemeClr val="bg1"/>
-                </a:solidFill>
-              </a:rPr>
-              <a:t>, etc.</a:t>
+              <a:t>XYZCommand = AddCommand, FindCommand, etc.</a:t>
             </a:r>
           </a:p>
         </p:txBody>

</xml_diff>

<commit_message>
Updated the logic class diagram of developer guide
</commit_message>
<xml_diff>
--- a/docs/diagrams/LogicComponentClassDiagram.pptx
+++ b/docs/diagrams/LogicComponentClassDiagram.pptx
@@ -208,7 +208,7 @@
           <a:p>
             <a:fld id="{F5CC4B3F-88C1-4FFA-B1B6-F41C21DC6924}" type="datetimeFigureOut">
               <a:rPr lang="en-US" smtClean="0"/>
-              <a:t>4/1/2019</a:t>
+              <a:t>4/11/2019</a:t>
             </a:fld>
             <a:endParaRPr lang="en-US"/>
           </a:p>
@@ -654,7 +654,7 @@
           <a:p>
             <a:fld id="{78C97017-6FC3-485B-9764-EAC9E56C1D49}" type="datetimeFigureOut">
               <a:rPr lang="en-US" smtClean="0"/>
-              <a:t>4/1/2019</a:t>
+              <a:t>4/11/2019</a:t>
             </a:fld>
             <a:endParaRPr lang="en-US"/>
           </a:p>
@@ -822,7 +822,7 @@
           <a:p>
             <a:fld id="{78C97017-6FC3-485B-9764-EAC9E56C1D49}" type="datetimeFigureOut">
               <a:rPr lang="en-US" smtClean="0"/>
-              <a:t>4/1/2019</a:t>
+              <a:t>4/11/2019</a:t>
             </a:fld>
             <a:endParaRPr lang="en-US"/>
           </a:p>
@@ -1000,7 +1000,7 @@
           <a:p>
             <a:fld id="{78C97017-6FC3-485B-9764-EAC9E56C1D49}" type="datetimeFigureOut">
               <a:rPr lang="en-US" smtClean="0"/>
-              <a:t>4/1/2019</a:t>
+              <a:t>4/11/2019</a:t>
             </a:fld>
             <a:endParaRPr lang="en-US"/>
           </a:p>
@@ -1168,7 +1168,7 @@
           <a:p>
             <a:fld id="{78C97017-6FC3-485B-9764-EAC9E56C1D49}" type="datetimeFigureOut">
               <a:rPr lang="en-US" smtClean="0"/>
-              <a:t>4/1/2019</a:t>
+              <a:t>4/11/2019</a:t>
             </a:fld>
             <a:endParaRPr lang="en-US"/>
           </a:p>
@@ -1413,7 +1413,7 @@
           <a:p>
             <a:fld id="{78C97017-6FC3-485B-9764-EAC9E56C1D49}" type="datetimeFigureOut">
               <a:rPr lang="en-US" smtClean="0"/>
-              <a:t>4/1/2019</a:t>
+              <a:t>4/11/2019</a:t>
             </a:fld>
             <a:endParaRPr lang="en-US"/>
           </a:p>
@@ -1698,7 +1698,7 @@
           <a:p>
             <a:fld id="{78C97017-6FC3-485B-9764-EAC9E56C1D49}" type="datetimeFigureOut">
               <a:rPr lang="en-US" smtClean="0"/>
-              <a:t>4/1/2019</a:t>
+              <a:t>4/11/2019</a:t>
             </a:fld>
             <a:endParaRPr lang="en-US"/>
           </a:p>
@@ -2117,7 +2117,7 @@
           <a:p>
             <a:fld id="{78C97017-6FC3-485B-9764-EAC9E56C1D49}" type="datetimeFigureOut">
               <a:rPr lang="en-US" smtClean="0"/>
-              <a:t>4/1/2019</a:t>
+              <a:t>4/11/2019</a:t>
             </a:fld>
             <a:endParaRPr lang="en-US"/>
           </a:p>
@@ -2234,7 +2234,7 @@
           <a:p>
             <a:fld id="{78C97017-6FC3-485B-9764-EAC9E56C1D49}" type="datetimeFigureOut">
               <a:rPr lang="en-US" smtClean="0"/>
-              <a:t>4/1/2019</a:t>
+              <a:t>4/11/2019</a:t>
             </a:fld>
             <a:endParaRPr lang="en-US"/>
           </a:p>
@@ -2329,7 +2329,7 @@
           <a:p>
             <a:fld id="{78C97017-6FC3-485B-9764-EAC9E56C1D49}" type="datetimeFigureOut">
               <a:rPr lang="en-US" smtClean="0"/>
-              <a:t>4/1/2019</a:t>
+              <a:t>4/11/2019</a:t>
             </a:fld>
             <a:endParaRPr lang="en-US"/>
           </a:p>
@@ -2604,7 +2604,7 @@
           <a:p>
             <a:fld id="{78C97017-6FC3-485B-9764-EAC9E56C1D49}" type="datetimeFigureOut">
               <a:rPr lang="en-US" smtClean="0"/>
-              <a:t>4/1/2019</a:t>
+              <a:t>4/11/2019</a:t>
             </a:fld>
             <a:endParaRPr lang="en-US"/>
           </a:p>
@@ -2856,7 +2856,7 @@
           <a:p>
             <a:fld id="{78C97017-6FC3-485B-9764-EAC9E56C1D49}" type="datetimeFigureOut">
               <a:rPr lang="en-US" smtClean="0"/>
-              <a:t>4/1/2019</a:t>
+              <a:t>4/11/2019</a:t>
             </a:fld>
             <a:endParaRPr lang="en-US"/>
           </a:p>
@@ -3067,7 +3067,7 @@
           <a:p>
             <a:fld id="{78C97017-6FC3-485B-9764-EAC9E56C1D49}" type="datetimeFigureOut">
               <a:rPr lang="en-US" smtClean="0"/>
-              <a:t>4/1/2019</a:t>
+              <a:t>4/11/2019</a:t>
             </a:fld>
             <a:endParaRPr lang="en-US"/>
           </a:p>
@@ -6122,8 +6122,8 @@
         </p:nvSpPr>
         <p:spPr>
           <a:xfrm>
-            <a:off x="6263130" y="1981200"/>
-            <a:ext cx="1276614" cy="630473"/>
+            <a:off x="6264473" y="1740315"/>
+            <a:ext cx="1276614" cy="774480"/>
           </a:xfrm>
           <a:prstGeom prst="foldedCorner">
             <a:avLst/>
@@ -6174,15 +6174,22 @@
                   <a:schemeClr val="bg1"/>
                 </a:solidFill>
               </a:rPr>
-              <a:t> = </a:t>
-            </a:r>
+              <a:t> =</a:t>
+            </a:r>
+            <a:br>
+              <a:rPr lang="en-US" sz="1050" dirty="0">
+                <a:solidFill>
+                  <a:schemeClr val="bg1"/>
+                </a:solidFill>
+              </a:rPr>
+            </a:br>
             <a:r>
               <a:rPr lang="en-US" sz="1050" dirty="0" err="1">
                 <a:solidFill>
                   <a:schemeClr val="bg1"/>
                 </a:solidFill>
               </a:rPr>
-              <a:t>AddCommand</a:t>
+              <a:t>SpendCommand</a:t>
             </a:r>
             <a:r>
               <a:rPr lang="en-US" sz="1050" dirty="0">
@@ -6198,7 +6205,7 @@
                   <a:schemeClr val="bg1"/>
                 </a:solidFill>
               </a:rPr>
-              <a:t>FindCommand</a:t>
+              <a:t>SearchCommand</a:t>
             </a:r>
             <a:r>
               <a:rPr lang="en-US" sz="1050" dirty="0">

</xml_diff>

<commit_message>
Modify some class diagrams
</commit_message>
<xml_diff>
--- a/docs/diagrams/LogicComponentClassDiagram.pptx
+++ b/docs/diagrams/LogicComponentClassDiagram.pptx
@@ -126,10 +126,6 @@
 </p:presentation>
 </file>
 
-<file path=ppt/revisionInfo.xml><?xml version="1.0" encoding="utf-8"?>
-<p1510:revInfo xmlns:a="http://schemas.openxmlformats.org/drawingml/2006/main" xmlns:r="http://schemas.openxmlformats.org/officeDocument/2006/relationships" xmlns:p1510="http://schemas.microsoft.com/office/powerpoint/2015/10/main"/>
-</file>
-
 <file path=ppt/notesMasters/notesMaster1.xml><?xml version="1.0" encoding="utf-8"?>
 <p:notesMaster xmlns:a="http://schemas.openxmlformats.org/drawingml/2006/main" xmlns:r="http://schemas.openxmlformats.org/officeDocument/2006/relationships" xmlns:p="http://schemas.openxmlformats.org/presentationml/2006/main">
   <p:cSld>
@@ -212,7 +208,7 @@
           <a:p>
             <a:fld id="{F5CC4B3F-88C1-4FFA-B1B6-F41C21DC6924}" type="datetimeFigureOut">
               <a:rPr lang="en-US" smtClean="0"/>
-              <a:t>4/16/2018</a:t>
+              <a:t>4/14/19</a:t>
             </a:fld>
             <a:endParaRPr lang="en-US"/>
           </a:p>
@@ -658,7 +654,7 @@
           <a:p>
             <a:fld id="{78C97017-6FC3-485B-9764-EAC9E56C1D49}" type="datetimeFigureOut">
               <a:rPr lang="en-US" smtClean="0"/>
-              <a:t>4/16/2018</a:t>
+              <a:t>4/14/19</a:t>
             </a:fld>
             <a:endParaRPr lang="en-US"/>
           </a:p>
@@ -826,7 +822,7 @@
           <a:p>
             <a:fld id="{78C97017-6FC3-485B-9764-EAC9E56C1D49}" type="datetimeFigureOut">
               <a:rPr lang="en-US" smtClean="0"/>
-              <a:t>4/16/2018</a:t>
+              <a:t>4/14/19</a:t>
             </a:fld>
             <a:endParaRPr lang="en-US"/>
           </a:p>
@@ -1004,7 +1000,7 @@
           <a:p>
             <a:fld id="{78C97017-6FC3-485B-9764-EAC9E56C1D49}" type="datetimeFigureOut">
               <a:rPr lang="en-US" smtClean="0"/>
-              <a:t>4/16/2018</a:t>
+              <a:t>4/14/19</a:t>
             </a:fld>
             <a:endParaRPr lang="en-US"/>
           </a:p>
@@ -1172,7 +1168,7 @@
           <a:p>
             <a:fld id="{78C97017-6FC3-485B-9764-EAC9E56C1D49}" type="datetimeFigureOut">
               <a:rPr lang="en-US" smtClean="0"/>
-              <a:t>4/16/2018</a:t>
+              <a:t>4/14/19</a:t>
             </a:fld>
             <a:endParaRPr lang="en-US"/>
           </a:p>
@@ -1417,7 +1413,7 @@
           <a:p>
             <a:fld id="{78C97017-6FC3-485B-9764-EAC9E56C1D49}" type="datetimeFigureOut">
               <a:rPr lang="en-US" smtClean="0"/>
-              <a:t>4/16/2018</a:t>
+              <a:t>4/14/19</a:t>
             </a:fld>
             <a:endParaRPr lang="en-US"/>
           </a:p>
@@ -1702,7 +1698,7 @@
           <a:p>
             <a:fld id="{78C97017-6FC3-485B-9764-EAC9E56C1D49}" type="datetimeFigureOut">
               <a:rPr lang="en-US" smtClean="0"/>
-              <a:t>4/16/2018</a:t>
+              <a:t>4/14/19</a:t>
             </a:fld>
             <a:endParaRPr lang="en-US"/>
           </a:p>
@@ -2121,7 +2117,7 @@
           <a:p>
             <a:fld id="{78C97017-6FC3-485B-9764-EAC9E56C1D49}" type="datetimeFigureOut">
               <a:rPr lang="en-US" smtClean="0"/>
-              <a:t>4/16/2018</a:t>
+              <a:t>4/14/19</a:t>
             </a:fld>
             <a:endParaRPr lang="en-US"/>
           </a:p>
@@ -2238,7 +2234,7 @@
           <a:p>
             <a:fld id="{78C97017-6FC3-485B-9764-EAC9E56C1D49}" type="datetimeFigureOut">
               <a:rPr lang="en-US" smtClean="0"/>
-              <a:t>4/16/2018</a:t>
+              <a:t>4/14/19</a:t>
             </a:fld>
             <a:endParaRPr lang="en-US"/>
           </a:p>
@@ -2333,7 +2329,7 @@
           <a:p>
             <a:fld id="{78C97017-6FC3-485B-9764-EAC9E56C1D49}" type="datetimeFigureOut">
               <a:rPr lang="en-US" smtClean="0"/>
-              <a:t>4/16/2018</a:t>
+              <a:t>4/14/19</a:t>
             </a:fld>
             <a:endParaRPr lang="en-US"/>
           </a:p>
@@ -2608,7 +2604,7 @@
           <a:p>
             <a:fld id="{78C97017-6FC3-485B-9764-EAC9E56C1D49}" type="datetimeFigureOut">
               <a:rPr lang="en-US" smtClean="0"/>
-              <a:t>4/16/2018</a:t>
+              <a:t>4/14/19</a:t>
             </a:fld>
             <a:endParaRPr lang="en-US"/>
           </a:p>
@@ -2860,7 +2856,7 @@
           <a:p>
             <a:fld id="{78C97017-6FC3-485B-9764-EAC9E56C1D49}" type="datetimeFigureOut">
               <a:rPr lang="en-US" smtClean="0"/>
-              <a:t>4/16/2018</a:t>
+              <a:t>4/14/19</a:t>
             </a:fld>
             <a:endParaRPr lang="en-US"/>
           </a:p>
@@ -3071,7 +3067,7 @@
           <a:p>
             <a:fld id="{78C97017-6FC3-485B-9764-EAC9E56C1D49}" type="datetimeFigureOut">
               <a:rPr lang="en-US" smtClean="0"/>
-              <a:t>4/16/2018</a:t>
+              <a:t>4/14/19</a:t>
             </a:fld>
             <a:endParaRPr lang="en-US"/>
           </a:p>
@@ -3607,7 +3603,7 @@
           <a:p>
             <a:pPr algn="ctr"/>
             <a:r>
-              <a:rPr lang="en-US" sz="1050" b="1" dirty="0" err="1" smtClean="0">
+              <a:rPr lang="en-US" sz="1050" b="1" dirty="0" err="1">
                 <a:solidFill>
                   <a:srgbClr val="0070C0"/>
                 </a:solidFill>
@@ -3939,12 +3935,12 @@
           <a:p>
             <a:pPr algn="ctr"/>
             <a:r>
-              <a:rPr lang="en-US" sz="1050" dirty="0" err="1" smtClean="0">
+              <a:rPr lang="en-US" sz="1050" dirty="0" err="1">
                 <a:solidFill>
                   <a:schemeClr val="bg1"/>
                 </a:solidFill>
               </a:rPr>
-              <a:t>AddressBook</a:t>
+              <a:t>CardCollection</a:t>
             </a:r>
             <a:endParaRPr lang="en-US" sz="1050" dirty="0">
               <a:solidFill>
@@ -4303,106 +4299,91 @@
           </a:fontRef>
         </p:style>
       </p:cxnSp>
-      <p:grpSp>
-        <p:nvGrpSpPr>
-          <p:cNvPr id="26" name="Group 25"/>
-          <p:cNvGrpSpPr/>
+      <p:sp>
+        <p:nvSpPr>
+          <p:cNvPr id="27" name="TextBox 26"/>
+          <p:cNvSpPr txBox="1"/>
           <p:nvPr/>
-        </p:nvGrpSpPr>
-        <p:grpSpPr>
+        </p:nvSpPr>
+        <p:spPr>
           <a:xfrm>
             <a:off x="4597400" y="4341168"/>
-            <a:ext cx="889000" cy="230832"/>
-            <a:chOff x="2895600" y="807932"/>
-            <a:chExt cx="889000" cy="230832"/>
-          </a:xfrm>
-        </p:grpSpPr>
-        <p:sp>
-          <p:nvSpPr>
-            <p:cNvPr id="27" name="TextBox 26"/>
-            <p:cNvSpPr txBox="1"/>
-            <p:nvPr/>
-          </p:nvSpPr>
-          <p:spPr>
-            <a:xfrm>
-              <a:off x="2895600" y="807932"/>
-              <a:ext cx="728806" cy="230832"/>
-            </a:xfrm>
-            <a:prstGeom prst="rect">
-              <a:avLst/>
-            </a:prstGeom>
-            <a:noFill/>
-          </p:spPr>
-          <p:txBody>
-            <a:bodyPr wrap="square" lIns="0" tIns="0" rIns="0" bIns="0" rtlCol="0">
-              <a:noAutofit/>
-            </a:bodyPr>
-            <a:lstStyle/>
-            <a:p>
-              <a:pPr algn="r"/>
-              <a:r>
-                <a:rPr lang="en-US" sz="1100" dirty="0">
-                  <a:solidFill>
-                    <a:srgbClr val="0070C0"/>
-                  </a:solidFill>
-                </a:rPr>
-                <a:t>executes</a:t>
-              </a:r>
-              <a:endParaRPr lang="en-SG" sz="1100" dirty="0">
+            <a:ext cx="728806" cy="230832"/>
+          </a:xfrm>
+          <a:prstGeom prst="rect">
+            <a:avLst/>
+          </a:prstGeom>
+          <a:noFill/>
+        </p:spPr>
+        <p:txBody>
+          <a:bodyPr wrap="square" lIns="0" tIns="0" rIns="0" bIns="0" rtlCol="0">
+            <a:noAutofit/>
+          </a:bodyPr>
+          <a:lstStyle/>
+          <a:p>
+            <a:pPr algn="r"/>
+            <a:r>
+              <a:rPr lang="en-US" sz="1100" dirty="0">
                 <a:solidFill>
                   <a:srgbClr val="0070C0"/>
                 </a:solidFill>
-              </a:endParaRPr>
-            </a:p>
-          </p:txBody>
-        </p:sp>
-        <p:sp>
-          <p:nvSpPr>
-            <p:cNvPr id="28" name="Isosceles Triangle 27"/>
-            <p:cNvSpPr/>
-            <p:nvPr/>
-          </p:nvSpPr>
-          <p:spPr>
-            <a:xfrm rot="5400000">
-              <a:off x="3683524" y="866776"/>
-              <a:ext cx="125951" cy="76201"/>
-            </a:xfrm>
-            <a:prstGeom prst="triangle">
-              <a:avLst/>
-            </a:prstGeom>
-            <a:solidFill>
-              <a:srgbClr val="0070C0"/>
-            </a:solidFill>
-            <a:ln>
-              <a:noFill/>
-            </a:ln>
-          </p:spPr>
-          <p:style>
-            <a:lnRef idx="2">
-              <a:schemeClr val="accent1">
-                <a:shade val="50000"/>
-              </a:schemeClr>
-            </a:lnRef>
-            <a:fillRef idx="1">
-              <a:schemeClr val="accent1"/>
-            </a:fillRef>
-            <a:effectRef idx="0">
-              <a:schemeClr val="accent1"/>
-            </a:effectRef>
-            <a:fontRef idx="minor">
-              <a:schemeClr val="lt1"/>
-            </a:fontRef>
-          </p:style>
-          <p:txBody>
-            <a:bodyPr rtlCol="0" anchor="ctr"/>
-            <a:lstStyle/>
-            <a:p>
-              <a:pPr algn="ctr"/>
-              <a:endParaRPr lang="en-SG"/>
-            </a:p>
-          </p:txBody>
-        </p:sp>
-      </p:grpSp>
+              </a:rPr>
+              <a:t>executes</a:t>
+            </a:r>
+            <a:endParaRPr lang="en-SG" sz="1100" dirty="0">
+              <a:solidFill>
+                <a:srgbClr val="0070C0"/>
+              </a:solidFill>
+            </a:endParaRPr>
+          </a:p>
+        </p:txBody>
+      </p:sp>
+      <p:sp>
+        <p:nvSpPr>
+          <p:cNvPr id="28" name="Isosceles Triangle 27"/>
+          <p:cNvSpPr/>
+          <p:nvPr/>
+        </p:nvSpPr>
+        <p:spPr>
+          <a:xfrm rot="5400000">
+            <a:off x="5346264" y="4397865"/>
+            <a:ext cx="125951" cy="76201"/>
+          </a:xfrm>
+          <a:prstGeom prst="triangle">
+            <a:avLst/>
+          </a:prstGeom>
+          <a:solidFill>
+            <a:srgbClr val="0070C0"/>
+          </a:solidFill>
+          <a:ln>
+            <a:noFill/>
+          </a:ln>
+        </p:spPr>
+        <p:style>
+          <a:lnRef idx="2">
+            <a:schemeClr val="accent1">
+              <a:shade val="50000"/>
+            </a:schemeClr>
+          </a:lnRef>
+          <a:fillRef idx="1">
+            <a:schemeClr val="accent1"/>
+          </a:fillRef>
+          <a:effectRef idx="0">
+            <a:schemeClr val="accent1"/>
+          </a:effectRef>
+          <a:fontRef idx="minor">
+            <a:schemeClr val="lt1"/>
+          </a:fontRef>
+        </p:style>
+        <p:txBody>
+          <a:bodyPr rtlCol="0" anchor="ctr"/>
+          <a:lstStyle/>
+          <a:p>
+            <a:pPr algn="ctr"/>
+            <a:endParaRPr lang="en-SG"/>
+          </a:p>
+        </p:txBody>
+      </p:sp>
       <p:grpSp>
         <p:nvGrpSpPr>
           <p:cNvPr id="29" name="Group 28"/>
@@ -4949,111 +4930,96 @@
           </a:fontRef>
         </p:style>
       </p:cxnSp>
-      <p:grpSp>
-        <p:nvGrpSpPr>
-          <p:cNvPr id="68" name="Group 67"/>
-          <p:cNvGrpSpPr/>
+      <p:sp>
+        <p:nvSpPr>
+          <p:cNvPr id="69" name="TextBox 68"/>
+          <p:cNvSpPr txBox="1"/>
           <p:nvPr/>
-        </p:nvGrpSpPr>
-        <p:grpSpPr>
-          <a:xfrm rot="10800000">
+        </p:nvSpPr>
+        <p:spPr>
+          <a:xfrm>
             <a:off x="4687086" y="3784757"/>
             <a:ext cx="555486" cy="254462"/>
-            <a:chOff x="3703306" y="644022"/>
-            <a:chExt cx="555486" cy="230832"/>
-          </a:xfrm>
-        </p:grpSpPr>
-        <p:sp>
-          <p:nvSpPr>
-            <p:cNvPr id="69" name="TextBox 68"/>
-            <p:cNvSpPr txBox="1"/>
-            <p:nvPr/>
-          </p:nvSpPr>
-          <p:spPr>
-            <a:xfrm rot="10800000">
-              <a:off x="3703306" y="644022"/>
-              <a:ext cx="555486" cy="230832"/>
-            </a:xfrm>
-            <a:prstGeom prst="rect">
-              <a:avLst/>
-            </a:prstGeom>
-            <a:noFill/>
-          </p:spPr>
-          <p:txBody>
-            <a:bodyPr wrap="square" lIns="0" tIns="0" rIns="0" bIns="0" rtlCol="0">
-              <a:noAutofit/>
-            </a:bodyPr>
-            <a:lstStyle/>
-            <a:p>
-              <a:r>
-                <a:rPr lang="en-US" sz="1100" dirty="0">
-                  <a:solidFill>
-                    <a:schemeClr val="accent5">
-                      <a:lumMod val="75000"/>
-                    </a:schemeClr>
-                  </a:solidFill>
-                </a:rPr>
-                <a:t>creates</a:t>
-              </a:r>
-              <a:endParaRPr lang="en-SG" sz="1100" dirty="0">
+          </a:xfrm>
+          <a:prstGeom prst="rect">
+            <a:avLst/>
+          </a:prstGeom>
+          <a:noFill/>
+        </p:spPr>
+        <p:txBody>
+          <a:bodyPr wrap="square" lIns="0" tIns="0" rIns="0" bIns="0" rtlCol="0">
+            <a:noAutofit/>
+          </a:bodyPr>
+          <a:lstStyle/>
+          <a:p>
+            <a:r>
+              <a:rPr lang="en-US" sz="1100" dirty="0">
                 <a:solidFill>
                   <a:schemeClr val="accent5">
                     <a:lumMod val="75000"/>
                   </a:schemeClr>
                 </a:solidFill>
-              </a:endParaRPr>
-            </a:p>
-          </p:txBody>
-        </p:sp>
-        <p:sp>
-          <p:nvSpPr>
-            <p:cNvPr id="70" name="Isosceles Triangle 69"/>
-            <p:cNvSpPr/>
-            <p:nvPr/>
-          </p:nvSpPr>
-          <p:spPr>
-            <a:xfrm rot="5400000" flipV="1">
-              <a:off x="3700294" y="741689"/>
-              <a:ext cx="119885" cy="88141"/>
-            </a:xfrm>
-            <a:prstGeom prst="triangle">
-              <a:avLst/>
-            </a:prstGeom>
-            <a:solidFill>
-              <a:schemeClr val="accent5">
-                <a:lumMod val="75000"/>
-              </a:schemeClr>
-            </a:solidFill>
-            <a:ln>
-              <a:noFill/>
-            </a:ln>
-          </p:spPr>
-          <p:style>
-            <a:lnRef idx="2">
-              <a:schemeClr val="accent1">
-                <a:shade val="50000"/>
-              </a:schemeClr>
-            </a:lnRef>
-            <a:fillRef idx="1">
-              <a:schemeClr val="accent1"/>
-            </a:fillRef>
-            <a:effectRef idx="0">
-              <a:schemeClr val="accent1"/>
-            </a:effectRef>
-            <a:fontRef idx="minor">
-              <a:schemeClr val="lt1"/>
-            </a:fontRef>
-          </p:style>
-          <p:txBody>
-            <a:bodyPr rtlCol="0" anchor="ctr"/>
-            <a:lstStyle/>
-            <a:p>
-              <a:pPr algn="ctr"/>
-              <a:endParaRPr lang="en-SG"/>
-            </a:p>
-          </p:txBody>
-        </p:sp>
-      </p:grpSp>
+              </a:rPr>
+              <a:t>creates</a:t>
+            </a:r>
+            <a:endParaRPr lang="en-SG" sz="1100" dirty="0">
+              <a:solidFill>
+                <a:schemeClr val="accent5">
+                  <a:lumMod val="75000"/>
+                </a:schemeClr>
+              </a:solidFill>
+            </a:endParaRPr>
+          </a:p>
+        </p:txBody>
+      </p:sp>
+      <p:sp>
+        <p:nvSpPr>
+          <p:cNvPr id="70" name="Isosceles Triangle 69"/>
+          <p:cNvSpPr/>
+          <p:nvPr/>
+        </p:nvSpPr>
+        <p:spPr>
+          <a:xfrm rot="16200000" flipV="1">
+            <a:off x="5142890" y="3832328"/>
+            <a:ext cx="132157" cy="88141"/>
+          </a:xfrm>
+          <a:prstGeom prst="triangle">
+            <a:avLst/>
+          </a:prstGeom>
+          <a:solidFill>
+            <a:schemeClr val="accent5">
+              <a:lumMod val="75000"/>
+            </a:schemeClr>
+          </a:solidFill>
+          <a:ln>
+            <a:noFill/>
+          </a:ln>
+        </p:spPr>
+        <p:style>
+          <a:lnRef idx="2">
+            <a:schemeClr val="accent1">
+              <a:shade val="50000"/>
+            </a:schemeClr>
+          </a:lnRef>
+          <a:fillRef idx="1">
+            <a:schemeClr val="accent1"/>
+          </a:fillRef>
+          <a:effectRef idx="0">
+            <a:schemeClr val="accent1"/>
+          </a:effectRef>
+          <a:fontRef idx="minor">
+            <a:schemeClr val="lt1"/>
+          </a:fontRef>
+        </p:style>
+        <p:txBody>
+          <a:bodyPr rtlCol="0" anchor="ctr"/>
+          <a:lstStyle/>
+          <a:p>
+            <a:pPr algn="ctr"/>
+            <a:endParaRPr lang="en-SG" dirty="0"/>
+          </a:p>
+        </p:txBody>
+      </p:sp>
       <p:sp>
         <p:nvSpPr>
           <p:cNvPr id="87" name="Isosceles Triangle 102"/>
@@ -5629,111 +5595,96 @@
           </a:p>
         </p:txBody>
       </p:sp>
-      <p:grpSp>
-        <p:nvGrpSpPr>
-          <p:cNvPr id="85" name="Group 84"/>
-          <p:cNvGrpSpPr/>
+      <p:sp>
+        <p:nvSpPr>
+          <p:cNvPr id="89" name="TextBox 88"/>
+          <p:cNvSpPr txBox="1"/>
           <p:nvPr/>
-        </p:nvGrpSpPr>
-        <p:grpSpPr>
-          <a:xfrm rot="5400000">
-            <a:off x="6371505" y="2788428"/>
-            <a:ext cx="222304" cy="598286"/>
-            <a:chOff x="3965759" y="592436"/>
-            <a:chExt cx="254462" cy="503902"/>
-          </a:xfrm>
-        </p:grpSpPr>
-        <p:sp>
-          <p:nvSpPr>
-            <p:cNvPr id="89" name="TextBox 88"/>
-            <p:cNvSpPr txBox="1"/>
-            <p:nvPr/>
-          </p:nvSpPr>
-          <p:spPr>
-            <a:xfrm rot="16200000">
-              <a:off x="3841039" y="717156"/>
-              <a:ext cx="503902" cy="254462"/>
-            </a:xfrm>
-            <a:prstGeom prst="rect">
-              <a:avLst/>
-            </a:prstGeom>
-            <a:noFill/>
-          </p:spPr>
-          <p:txBody>
-            <a:bodyPr wrap="square" lIns="0" tIns="0" rIns="0" bIns="0" rtlCol="0">
-              <a:noAutofit/>
-            </a:bodyPr>
-            <a:lstStyle/>
-            <a:p>
-              <a:r>
-                <a:rPr lang="en-US" sz="1100" dirty="0">
-                  <a:solidFill>
-                    <a:schemeClr val="accent5">
-                      <a:lumMod val="75000"/>
-                    </a:schemeClr>
-                  </a:solidFill>
-                </a:rPr>
-                <a:t>creates</a:t>
-              </a:r>
-              <a:endParaRPr lang="en-SG" sz="1100" dirty="0">
+        </p:nvSpPr>
+        <p:spPr>
+          <a:xfrm>
+            <a:off x="6183514" y="2976419"/>
+            <a:ext cx="598286" cy="222304"/>
+          </a:xfrm>
+          <a:prstGeom prst="rect">
+            <a:avLst/>
+          </a:prstGeom>
+          <a:noFill/>
+        </p:spPr>
+        <p:txBody>
+          <a:bodyPr wrap="square" lIns="0" tIns="0" rIns="0" bIns="0" rtlCol="0">
+            <a:noAutofit/>
+          </a:bodyPr>
+          <a:lstStyle/>
+          <a:p>
+            <a:r>
+              <a:rPr lang="en-US" sz="1100" dirty="0">
                 <a:solidFill>
                   <a:schemeClr val="accent5">
                     <a:lumMod val="75000"/>
                   </a:schemeClr>
                 </a:solidFill>
-              </a:endParaRPr>
-            </a:p>
-          </p:txBody>
-        </p:sp>
-        <p:sp>
-          <p:nvSpPr>
-            <p:cNvPr id="92" name="Isosceles Triangle 91"/>
-            <p:cNvSpPr/>
-            <p:nvPr/>
-          </p:nvSpPr>
-          <p:spPr>
-            <a:xfrm rot="10800000" flipV="1">
-              <a:off x="3995991" y="631624"/>
-              <a:ext cx="132157" cy="79956"/>
-            </a:xfrm>
-            <a:prstGeom prst="triangle">
-              <a:avLst/>
-            </a:prstGeom>
-            <a:solidFill>
-              <a:schemeClr val="accent5">
-                <a:lumMod val="75000"/>
-              </a:schemeClr>
-            </a:solidFill>
-            <a:ln>
-              <a:noFill/>
-            </a:ln>
-          </p:spPr>
-          <p:style>
-            <a:lnRef idx="2">
-              <a:schemeClr val="accent1">
-                <a:shade val="50000"/>
-              </a:schemeClr>
-            </a:lnRef>
-            <a:fillRef idx="1">
-              <a:schemeClr val="accent1"/>
-            </a:fillRef>
-            <a:effectRef idx="0">
-              <a:schemeClr val="accent1"/>
-            </a:effectRef>
-            <a:fontRef idx="minor">
-              <a:schemeClr val="lt1"/>
-            </a:fontRef>
-          </p:style>
-          <p:txBody>
-            <a:bodyPr rtlCol="0" anchor="ctr"/>
-            <a:lstStyle/>
-            <a:p>
-              <a:pPr algn="ctr"/>
-              <a:endParaRPr lang="en-SG"/>
-            </a:p>
-          </p:txBody>
-        </p:sp>
-      </p:grpSp>
+              </a:rPr>
+              <a:t>creates</a:t>
+            </a:r>
+            <a:endParaRPr lang="en-SG" sz="1100" dirty="0">
+              <a:solidFill>
+                <a:schemeClr val="accent5">
+                  <a:lumMod val="75000"/>
+                </a:schemeClr>
+              </a:solidFill>
+            </a:endParaRPr>
+          </a:p>
+        </p:txBody>
+      </p:sp>
+      <p:sp>
+        <p:nvSpPr>
+          <p:cNvPr id="92" name="Isosceles Triangle 91"/>
+          <p:cNvSpPr/>
+          <p:nvPr/>
+        </p:nvSpPr>
+        <p:spPr>
+          <a:xfrm rot="16200000" flipV="1">
+            <a:off x="6630078" y="3013092"/>
+            <a:ext cx="115455" cy="94932"/>
+          </a:xfrm>
+          <a:prstGeom prst="triangle">
+            <a:avLst/>
+          </a:prstGeom>
+          <a:solidFill>
+            <a:schemeClr val="accent5">
+              <a:lumMod val="75000"/>
+            </a:schemeClr>
+          </a:solidFill>
+          <a:ln>
+            <a:noFill/>
+          </a:ln>
+        </p:spPr>
+        <p:style>
+          <a:lnRef idx="2">
+            <a:schemeClr val="accent1">
+              <a:shade val="50000"/>
+            </a:schemeClr>
+          </a:lnRef>
+          <a:fillRef idx="1">
+            <a:schemeClr val="accent1"/>
+          </a:fillRef>
+          <a:effectRef idx="0">
+            <a:schemeClr val="accent1"/>
+          </a:effectRef>
+          <a:fontRef idx="minor">
+            <a:schemeClr val="lt1"/>
+          </a:fontRef>
+        </p:style>
+        <p:txBody>
+          <a:bodyPr rtlCol="0" anchor="ctr"/>
+          <a:lstStyle/>
+          <a:p>
+            <a:pPr algn="ctr"/>
+            <a:endParaRPr lang="en-SG"/>
+          </a:p>
+        </p:txBody>
+      </p:sp>
       <p:cxnSp>
         <p:nvCxnSpPr>
           <p:cNvPr id="95" name="Straight Connector 94"/>
@@ -5815,7 +5766,7 @@
           <a:p>
             <a:pPr algn="ctr"/>
             <a:r>
-              <a:rPr lang="en-US" sz="1050" b="1" dirty="0" err="1" smtClean="0">
+              <a:rPr lang="en-US" sz="1050" b="1" dirty="0" err="1">
                 <a:solidFill>
                   <a:schemeClr val="bg1"/>
                 </a:solidFill>
@@ -6165,7 +6116,7 @@
           <a:p>
             <a:pPr algn="ctr"/>
             <a:r>
-              <a:rPr lang="en-US" sz="1050" dirty="0" err="1" smtClean="0">
+              <a:rPr lang="en-US" sz="1050" dirty="0" err="1">
                 <a:solidFill>
                   <a:schemeClr val="bg1"/>
                 </a:solidFill>
@@ -6173,7 +6124,7 @@
               <a:t>XYZCommand</a:t>
             </a:r>
             <a:r>
-              <a:rPr lang="en-US" sz="1050" dirty="0" smtClean="0">
+              <a:rPr lang="en-US" sz="1050" dirty="0">
                 <a:solidFill>
                   <a:schemeClr val="bg1"/>
                 </a:solidFill>
@@ -6181,7 +6132,7 @@
               <a:t> = </a:t>
             </a:r>
             <a:r>
-              <a:rPr lang="en-US" sz="1050" dirty="0" err="1" smtClean="0">
+              <a:rPr lang="en-US" sz="1050" dirty="0" err="1">
                 <a:solidFill>
                   <a:schemeClr val="bg1"/>
                 </a:solidFill>
@@ -6189,7 +6140,7 @@
               <a:t>AddCommand</a:t>
             </a:r>
             <a:r>
-              <a:rPr lang="en-US" sz="1050" dirty="0" smtClean="0">
+              <a:rPr lang="en-US" sz="1050" dirty="0">
                 <a:solidFill>
                   <a:schemeClr val="bg1"/>
                 </a:solidFill>
@@ -6197,7 +6148,7 @@
               <a:t>, </a:t>
             </a:r>
             <a:r>
-              <a:rPr lang="en-US" sz="1050" dirty="0" err="1" smtClean="0">
+              <a:rPr lang="en-US" sz="1050" dirty="0" err="1">
                 <a:solidFill>
                   <a:schemeClr val="bg1"/>
                 </a:solidFill>
@@ -6205,18 +6156,13 @@
               <a:t>FindCommand</a:t>
             </a:r>
             <a:r>
-              <a:rPr lang="en-US" sz="1050" dirty="0" smtClean="0">
+              <a:rPr lang="en-US" sz="1050" dirty="0">
                 <a:solidFill>
                   <a:schemeClr val="bg1"/>
                 </a:solidFill>
               </a:rPr>
               <a:t>, etc.</a:t>
             </a:r>
-            <a:endParaRPr lang="en-US" sz="1050" dirty="0">
-              <a:solidFill>
-                <a:schemeClr val="bg1"/>
-              </a:solidFill>
-            </a:endParaRPr>
           </a:p>
         </p:txBody>
       </p:sp>

</xml_diff>

<commit_message>
Developer Guide: Refactor existing commands and diagrams (#89)
* Modify architecture diagram

* Modify some class diagrams

* Remove encryption and add quiz sequence diagram pptx

* Modify undo redo diagrams

* Remove forking notes
</commit_message>
<xml_diff>
--- a/docs/diagrams/LogicComponentClassDiagram.pptx
+++ b/docs/diagrams/LogicComponentClassDiagram.pptx
@@ -126,10 +126,6 @@
 </p:presentation>
 </file>
 
-<file path=ppt/revisionInfo.xml><?xml version="1.0" encoding="utf-8"?>
-<p1510:revInfo xmlns:a="http://schemas.openxmlformats.org/drawingml/2006/main" xmlns:r="http://schemas.openxmlformats.org/officeDocument/2006/relationships" xmlns:p1510="http://schemas.microsoft.com/office/powerpoint/2015/10/main"/>
-</file>
-
 <file path=ppt/notesMasters/notesMaster1.xml><?xml version="1.0" encoding="utf-8"?>
 <p:notesMaster xmlns:a="http://schemas.openxmlformats.org/drawingml/2006/main" xmlns:r="http://schemas.openxmlformats.org/officeDocument/2006/relationships" xmlns:p="http://schemas.openxmlformats.org/presentationml/2006/main">
   <p:cSld>
@@ -212,7 +208,7 @@
           <a:p>
             <a:fld id="{F5CC4B3F-88C1-4FFA-B1B6-F41C21DC6924}" type="datetimeFigureOut">
               <a:rPr lang="en-US" smtClean="0"/>
-              <a:t>4/16/2018</a:t>
+              <a:t>4/14/19</a:t>
             </a:fld>
             <a:endParaRPr lang="en-US"/>
           </a:p>
@@ -658,7 +654,7 @@
           <a:p>
             <a:fld id="{78C97017-6FC3-485B-9764-EAC9E56C1D49}" type="datetimeFigureOut">
               <a:rPr lang="en-US" smtClean="0"/>
-              <a:t>4/16/2018</a:t>
+              <a:t>4/14/19</a:t>
             </a:fld>
             <a:endParaRPr lang="en-US"/>
           </a:p>
@@ -826,7 +822,7 @@
           <a:p>
             <a:fld id="{78C97017-6FC3-485B-9764-EAC9E56C1D49}" type="datetimeFigureOut">
               <a:rPr lang="en-US" smtClean="0"/>
-              <a:t>4/16/2018</a:t>
+              <a:t>4/14/19</a:t>
             </a:fld>
             <a:endParaRPr lang="en-US"/>
           </a:p>
@@ -1004,7 +1000,7 @@
           <a:p>
             <a:fld id="{78C97017-6FC3-485B-9764-EAC9E56C1D49}" type="datetimeFigureOut">
               <a:rPr lang="en-US" smtClean="0"/>
-              <a:t>4/16/2018</a:t>
+              <a:t>4/14/19</a:t>
             </a:fld>
             <a:endParaRPr lang="en-US"/>
           </a:p>
@@ -1172,7 +1168,7 @@
           <a:p>
             <a:fld id="{78C97017-6FC3-485B-9764-EAC9E56C1D49}" type="datetimeFigureOut">
               <a:rPr lang="en-US" smtClean="0"/>
-              <a:t>4/16/2018</a:t>
+              <a:t>4/14/19</a:t>
             </a:fld>
             <a:endParaRPr lang="en-US"/>
           </a:p>
@@ -1417,7 +1413,7 @@
           <a:p>
             <a:fld id="{78C97017-6FC3-485B-9764-EAC9E56C1D49}" type="datetimeFigureOut">
               <a:rPr lang="en-US" smtClean="0"/>
-              <a:t>4/16/2018</a:t>
+              <a:t>4/14/19</a:t>
             </a:fld>
             <a:endParaRPr lang="en-US"/>
           </a:p>
@@ -1702,7 +1698,7 @@
           <a:p>
             <a:fld id="{78C97017-6FC3-485B-9764-EAC9E56C1D49}" type="datetimeFigureOut">
               <a:rPr lang="en-US" smtClean="0"/>
-              <a:t>4/16/2018</a:t>
+              <a:t>4/14/19</a:t>
             </a:fld>
             <a:endParaRPr lang="en-US"/>
           </a:p>
@@ -2121,7 +2117,7 @@
           <a:p>
             <a:fld id="{78C97017-6FC3-485B-9764-EAC9E56C1D49}" type="datetimeFigureOut">
               <a:rPr lang="en-US" smtClean="0"/>
-              <a:t>4/16/2018</a:t>
+              <a:t>4/14/19</a:t>
             </a:fld>
             <a:endParaRPr lang="en-US"/>
           </a:p>
@@ -2238,7 +2234,7 @@
           <a:p>
             <a:fld id="{78C97017-6FC3-485B-9764-EAC9E56C1D49}" type="datetimeFigureOut">
               <a:rPr lang="en-US" smtClean="0"/>
-              <a:t>4/16/2018</a:t>
+              <a:t>4/14/19</a:t>
             </a:fld>
             <a:endParaRPr lang="en-US"/>
           </a:p>
@@ -2333,7 +2329,7 @@
           <a:p>
             <a:fld id="{78C97017-6FC3-485B-9764-EAC9E56C1D49}" type="datetimeFigureOut">
               <a:rPr lang="en-US" smtClean="0"/>
-              <a:t>4/16/2018</a:t>
+              <a:t>4/14/19</a:t>
             </a:fld>
             <a:endParaRPr lang="en-US"/>
           </a:p>
@@ -2608,7 +2604,7 @@
           <a:p>
             <a:fld id="{78C97017-6FC3-485B-9764-EAC9E56C1D49}" type="datetimeFigureOut">
               <a:rPr lang="en-US" smtClean="0"/>
-              <a:t>4/16/2018</a:t>
+              <a:t>4/14/19</a:t>
             </a:fld>
             <a:endParaRPr lang="en-US"/>
           </a:p>
@@ -2860,7 +2856,7 @@
           <a:p>
             <a:fld id="{78C97017-6FC3-485B-9764-EAC9E56C1D49}" type="datetimeFigureOut">
               <a:rPr lang="en-US" smtClean="0"/>
-              <a:t>4/16/2018</a:t>
+              <a:t>4/14/19</a:t>
             </a:fld>
             <a:endParaRPr lang="en-US"/>
           </a:p>
@@ -3071,7 +3067,7 @@
           <a:p>
             <a:fld id="{78C97017-6FC3-485B-9764-EAC9E56C1D49}" type="datetimeFigureOut">
               <a:rPr lang="en-US" smtClean="0"/>
-              <a:t>4/16/2018</a:t>
+              <a:t>4/14/19</a:t>
             </a:fld>
             <a:endParaRPr lang="en-US"/>
           </a:p>
@@ -3607,7 +3603,7 @@
           <a:p>
             <a:pPr algn="ctr"/>
             <a:r>
-              <a:rPr lang="en-US" sz="1050" b="1" dirty="0" err="1" smtClean="0">
+              <a:rPr lang="en-US" sz="1050" b="1" dirty="0" err="1">
                 <a:solidFill>
                   <a:srgbClr val="0070C0"/>
                 </a:solidFill>
@@ -3939,12 +3935,12 @@
           <a:p>
             <a:pPr algn="ctr"/>
             <a:r>
-              <a:rPr lang="en-US" sz="1050" dirty="0" err="1" smtClean="0">
+              <a:rPr lang="en-US" sz="1050" dirty="0" err="1">
                 <a:solidFill>
                   <a:schemeClr val="bg1"/>
                 </a:solidFill>
               </a:rPr>
-              <a:t>AddressBook</a:t>
+              <a:t>CardCollection</a:t>
             </a:r>
             <a:endParaRPr lang="en-US" sz="1050" dirty="0">
               <a:solidFill>
@@ -4303,106 +4299,91 @@
           </a:fontRef>
         </p:style>
       </p:cxnSp>
-      <p:grpSp>
-        <p:nvGrpSpPr>
-          <p:cNvPr id="26" name="Group 25"/>
-          <p:cNvGrpSpPr/>
+      <p:sp>
+        <p:nvSpPr>
+          <p:cNvPr id="27" name="TextBox 26"/>
+          <p:cNvSpPr txBox="1"/>
           <p:nvPr/>
-        </p:nvGrpSpPr>
-        <p:grpSpPr>
+        </p:nvSpPr>
+        <p:spPr>
           <a:xfrm>
             <a:off x="4597400" y="4341168"/>
-            <a:ext cx="889000" cy="230832"/>
-            <a:chOff x="2895600" y="807932"/>
-            <a:chExt cx="889000" cy="230832"/>
-          </a:xfrm>
-        </p:grpSpPr>
-        <p:sp>
-          <p:nvSpPr>
-            <p:cNvPr id="27" name="TextBox 26"/>
-            <p:cNvSpPr txBox="1"/>
-            <p:nvPr/>
-          </p:nvSpPr>
-          <p:spPr>
-            <a:xfrm>
-              <a:off x="2895600" y="807932"/>
-              <a:ext cx="728806" cy="230832"/>
-            </a:xfrm>
-            <a:prstGeom prst="rect">
-              <a:avLst/>
-            </a:prstGeom>
-            <a:noFill/>
-          </p:spPr>
-          <p:txBody>
-            <a:bodyPr wrap="square" lIns="0" tIns="0" rIns="0" bIns="0" rtlCol="0">
-              <a:noAutofit/>
-            </a:bodyPr>
-            <a:lstStyle/>
-            <a:p>
-              <a:pPr algn="r"/>
-              <a:r>
-                <a:rPr lang="en-US" sz="1100" dirty="0">
-                  <a:solidFill>
-                    <a:srgbClr val="0070C0"/>
-                  </a:solidFill>
-                </a:rPr>
-                <a:t>executes</a:t>
-              </a:r>
-              <a:endParaRPr lang="en-SG" sz="1100" dirty="0">
+            <a:ext cx="728806" cy="230832"/>
+          </a:xfrm>
+          <a:prstGeom prst="rect">
+            <a:avLst/>
+          </a:prstGeom>
+          <a:noFill/>
+        </p:spPr>
+        <p:txBody>
+          <a:bodyPr wrap="square" lIns="0" tIns="0" rIns="0" bIns="0" rtlCol="0">
+            <a:noAutofit/>
+          </a:bodyPr>
+          <a:lstStyle/>
+          <a:p>
+            <a:pPr algn="r"/>
+            <a:r>
+              <a:rPr lang="en-US" sz="1100" dirty="0">
                 <a:solidFill>
                   <a:srgbClr val="0070C0"/>
                 </a:solidFill>
-              </a:endParaRPr>
-            </a:p>
-          </p:txBody>
-        </p:sp>
-        <p:sp>
-          <p:nvSpPr>
-            <p:cNvPr id="28" name="Isosceles Triangle 27"/>
-            <p:cNvSpPr/>
-            <p:nvPr/>
-          </p:nvSpPr>
-          <p:spPr>
-            <a:xfrm rot="5400000">
-              <a:off x="3683524" y="866776"/>
-              <a:ext cx="125951" cy="76201"/>
-            </a:xfrm>
-            <a:prstGeom prst="triangle">
-              <a:avLst/>
-            </a:prstGeom>
-            <a:solidFill>
-              <a:srgbClr val="0070C0"/>
-            </a:solidFill>
-            <a:ln>
-              <a:noFill/>
-            </a:ln>
-          </p:spPr>
-          <p:style>
-            <a:lnRef idx="2">
-              <a:schemeClr val="accent1">
-                <a:shade val="50000"/>
-              </a:schemeClr>
-            </a:lnRef>
-            <a:fillRef idx="1">
-              <a:schemeClr val="accent1"/>
-            </a:fillRef>
-            <a:effectRef idx="0">
-              <a:schemeClr val="accent1"/>
-            </a:effectRef>
-            <a:fontRef idx="minor">
-              <a:schemeClr val="lt1"/>
-            </a:fontRef>
-          </p:style>
-          <p:txBody>
-            <a:bodyPr rtlCol="0" anchor="ctr"/>
-            <a:lstStyle/>
-            <a:p>
-              <a:pPr algn="ctr"/>
-              <a:endParaRPr lang="en-SG"/>
-            </a:p>
-          </p:txBody>
-        </p:sp>
-      </p:grpSp>
+              </a:rPr>
+              <a:t>executes</a:t>
+            </a:r>
+            <a:endParaRPr lang="en-SG" sz="1100" dirty="0">
+              <a:solidFill>
+                <a:srgbClr val="0070C0"/>
+              </a:solidFill>
+            </a:endParaRPr>
+          </a:p>
+        </p:txBody>
+      </p:sp>
+      <p:sp>
+        <p:nvSpPr>
+          <p:cNvPr id="28" name="Isosceles Triangle 27"/>
+          <p:cNvSpPr/>
+          <p:nvPr/>
+        </p:nvSpPr>
+        <p:spPr>
+          <a:xfrm rot="5400000">
+            <a:off x="5346264" y="4397865"/>
+            <a:ext cx="125951" cy="76201"/>
+          </a:xfrm>
+          <a:prstGeom prst="triangle">
+            <a:avLst/>
+          </a:prstGeom>
+          <a:solidFill>
+            <a:srgbClr val="0070C0"/>
+          </a:solidFill>
+          <a:ln>
+            <a:noFill/>
+          </a:ln>
+        </p:spPr>
+        <p:style>
+          <a:lnRef idx="2">
+            <a:schemeClr val="accent1">
+              <a:shade val="50000"/>
+            </a:schemeClr>
+          </a:lnRef>
+          <a:fillRef idx="1">
+            <a:schemeClr val="accent1"/>
+          </a:fillRef>
+          <a:effectRef idx="0">
+            <a:schemeClr val="accent1"/>
+          </a:effectRef>
+          <a:fontRef idx="minor">
+            <a:schemeClr val="lt1"/>
+          </a:fontRef>
+        </p:style>
+        <p:txBody>
+          <a:bodyPr rtlCol="0" anchor="ctr"/>
+          <a:lstStyle/>
+          <a:p>
+            <a:pPr algn="ctr"/>
+            <a:endParaRPr lang="en-SG"/>
+          </a:p>
+        </p:txBody>
+      </p:sp>
       <p:grpSp>
         <p:nvGrpSpPr>
           <p:cNvPr id="29" name="Group 28"/>
@@ -4949,111 +4930,96 @@
           </a:fontRef>
         </p:style>
       </p:cxnSp>
-      <p:grpSp>
-        <p:nvGrpSpPr>
-          <p:cNvPr id="68" name="Group 67"/>
-          <p:cNvGrpSpPr/>
+      <p:sp>
+        <p:nvSpPr>
+          <p:cNvPr id="69" name="TextBox 68"/>
+          <p:cNvSpPr txBox="1"/>
           <p:nvPr/>
-        </p:nvGrpSpPr>
-        <p:grpSpPr>
-          <a:xfrm rot="10800000">
+        </p:nvSpPr>
+        <p:spPr>
+          <a:xfrm>
             <a:off x="4687086" y="3784757"/>
             <a:ext cx="555486" cy="254462"/>
-            <a:chOff x="3703306" y="644022"/>
-            <a:chExt cx="555486" cy="230832"/>
-          </a:xfrm>
-        </p:grpSpPr>
-        <p:sp>
-          <p:nvSpPr>
-            <p:cNvPr id="69" name="TextBox 68"/>
-            <p:cNvSpPr txBox="1"/>
-            <p:nvPr/>
-          </p:nvSpPr>
-          <p:spPr>
-            <a:xfrm rot="10800000">
-              <a:off x="3703306" y="644022"/>
-              <a:ext cx="555486" cy="230832"/>
-            </a:xfrm>
-            <a:prstGeom prst="rect">
-              <a:avLst/>
-            </a:prstGeom>
-            <a:noFill/>
-          </p:spPr>
-          <p:txBody>
-            <a:bodyPr wrap="square" lIns="0" tIns="0" rIns="0" bIns="0" rtlCol="0">
-              <a:noAutofit/>
-            </a:bodyPr>
-            <a:lstStyle/>
-            <a:p>
-              <a:r>
-                <a:rPr lang="en-US" sz="1100" dirty="0">
-                  <a:solidFill>
-                    <a:schemeClr val="accent5">
-                      <a:lumMod val="75000"/>
-                    </a:schemeClr>
-                  </a:solidFill>
-                </a:rPr>
-                <a:t>creates</a:t>
-              </a:r>
-              <a:endParaRPr lang="en-SG" sz="1100" dirty="0">
+          </a:xfrm>
+          <a:prstGeom prst="rect">
+            <a:avLst/>
+          </a:prstGeom>
+          <a:noFill/>
+        </p:spPr>
+        <p:txBody>
+          <a:bodyPr wrap="square" lIns="0" tIns="0" rIns="0" bIns="0" rtlCol="0">
+            <a:noAutofit/>
+          </a:bodyPr>
+          <a:lstStyle/>
+          <a:p>
+            <a:r>
+              <a:rPr lang="en-US" sz="1100" dirty="0">
                 <a:solidFill>
                   <a:schemeClr val="accent5">
                     <a:lumMod val="75000"/>
                   </a:schemeClr>
                 </a:solidFill>
-              </a:endParaRPr>
-            </a:p>
-          </p:txBody>
-        </p:sp>
-        <p:sp>
-          <p:nvSpPr>
-            <p:cNvPr id="70" name="Isosceles Triangle 69"/>
-            <p:cNvSpPr/>
-            <p:nvPr/>
-          </p:nvSpPr>
-          <p:spPr>
-            <a:xfrm rot="5400000" flipV="1">
-              <a:off x="3700294" y="741689"/>
-              <a:ext cx="119885" cy="88141"/>
-            </a:xfrm>
-            <a:prstGeom prst="triangle">
-              <a:avLst/>
-            </a:prstGeom>
-            <a:solidFill>
-              <a:schemeClr val="accent5">
-                <a:lumMod val="75000"/>
-              </a:schemeClr>
-            </a:solidFill>
-            <a:ln>
-              <a:noFill/>
-            </a:ln>
-          </p:spPr>
-          <p:style>
-            <a:lnRef idx="2">
-              <a:schemeClr val="accent1">
-                <a:shade val="50000"/>
-              </a:schemeClr>
-            </a:lnRef>
-            <a:fillRef idx="1">
-              <a:schemeClr val="accent1"/>
-            </a:fillRef>
-            <a:effectRef idx="0">
-              <a:schemeClr val="accent1"/>
-            </a:effectRef>
-            <a:fontRef idx="minor">
-              <a:schemeClr val="lt1"/>
-            </a:fontRef>
-          </p:style>
-          <p:txBody>
-            <a:bodyPr rtlCol="0" anchor="ctr"/>
-            <a:lstStyle/>
-            <a:p>
-              <a:pPr algn="ctr"/>
-              <a:endParaRPr lang="en-SG"/>
-            </a:p>
-          </p:txBody>
-        </p:sp>
-      </p:grpSp>
+              </a:rPr>
+              <a:t>creates</a:t>
+            </a:r>
+            <a:endParaRPr lang="en-SG" sz="1100" dirty="0">
+              <a:solidFill>
+                <a:schemeClr val="accent5">
+                  <a:lumMod val="75000"/>
+                </a:schemeClr>
+              </a:solidFill>
+            </a:endParaRPr>
+          </a:p>
+        </p:txBody>
+      </p:sp>
+      <p:sp>
+        <p:nvSpPr>
+          <p:cNvPr id="70" name="Isosceles Triangle 69"/>
+          <p:cNvSpPr/>
+          <p:nvPr/>
+        </p:nvSpPr>
+        <p:spPr>
+          <a:xfrm rot="16200000" flipV="1">
+            <a:off x="5142890" y="3832328"/>
+            <a:ext cx="132157" cy="88141"/>
+          </a:xfrm>
+          <a:prstGeom prst="triangle">
+            <a:avLst/>
+          </a:prstGeom>
+          <a:solidFill>
+            <a:schemeClr val="accent5">
+              <a:lumMod val="75000"/>
+            </a:schemeClr>
+          </a:solidFill>
+          <a:ln>
+            <a:noFill/>
+          </a:ln>
+        </p:spPr>
+        <p:style>
+          <a:lnRef idx="2">
+            <a:schemeClr val="accent1">
+              <a:shade val="50000"/>
+            </a:schemeClr>
+          </a:lnRef>
+          <a:fillRef idx="1">
+            <a:schemeClr val="accent1"/>
+          </a:fillRef>
+          <a:effectRef idx="0">
+            <a:schemeClr val="accent1"/>
+          </a:effectRef>
+          <a:fontRef idx="minor">
+            <a:schemeClr val="lt1"/>
+          </a:fontRef>
+        </p:style>
+        <p:txBody>
+          <a:bodyPr rtlCol="0" anchor="ctr"/>
+          <a:lstStyle/>
+          <a:p>
+            <a:pPr algn="ctr"/>
+            <a:endParaRPr lang="en-SG" dirty="0"/>
+          </a:p>
+        </p:txBody>
+      </p:sp>
       <p:sp>
         <p:nvSpPr>
           <p:cNvPr id="87" name="Isosceles Triangle 102"/>
@@ -5629,111 +5595,96 @@
           </a:p>
         </p:txBody>
       </p:sp>
-      <p:grpSp>
-        <p:nvGrpSpPr>
-          <p:cNvPr id="85" name="Group 84"/>
-          <p:cNvGrpSpPr/>
+      <p:sp>
+        <p:nvSpPr>
+          <p:cNvPr id="89" name="TextBox 88"/>
+          <p:cNvSpPr txBox="1"/>
           <p:nvPr/>
-        </p:nvGrpSpPr>
-        <p:grpSpPr>
-          <a:xfrm rot="5400000">
-            <a:off x="6371505" y="2788428"/>
-            <a:ext cx="222304" cy="598286"/>
-            <a:chOff x="3965759" y="592436"/>
-            <a:chExt cx="254462" cy="503902"/>
-          </a:xfrm>
-        </p:grpSpPr>
-        <p:sp>
-          <p:nvSpPr>
-            <p:cNvPr id="89" name="TextBox 88"/>
-            <p:cNvSpPr txBox="1"/>
-            <p:nvPr/>
-          </p:nvSpPr>
-          <p:spPr>
-            <a:xfrm rot="16200000">
-              <a:off x="3841039" y="717156"/>
-              <a:ext cx="503902" cy="254462"/>
-            </a:xfrm>
-            <a:prstGeom prst="rect">
-              <a:avLst/>
-            </a:prstGeom>
-            <a:noFill/>
-          </p:spPr>
-          <p:txBody>
-            <a:bodyPr wrap="square" lIns="0" tIns="0" rIns="0" bIns="0" rtlCol="0">
-              <a:noAutofit/>
-            </a:bodyPr>
-            <a:lstStyle/>
-            <a:p>
-              <a:r>
-                <a:rPr lang="en-US" sz="1100" dirty="0">
-                  <a:solidFill>
-                    <a:schemeClr val="accent5">
-                      <a:lumMod val="75000"/>
-                    </a:schemeClr>
-                  </a:solidFill>
-                </a:rPr>
-                <a:t>creates</a:t>
-              </a:r>
-              <a:endParaRPr lang="en-SG" sz="1100" dirty="0">
+        </p:nvSpPr>
+        <p:spPr>
+          <a:xfrm>
+            <a:off x="6183514" y="2976419"/>
+            <a:ext cx="598286" cy="222304"/>
+          </a:xfrm>
+          <a:prstGeom prst="rect">
+            <a:avLst/>
+          </a:prstGeom>
+          <a:noFill/>
+        </p:spPr>
+        <p:txBody>
+          <a:bodyPr wrap="square" lIns="0" tIns="0" rIns="0" bIns="0" rtlCol="0">
+            <a:noAutofit/>
+          </a:bodyPr>
+          <a:lstStyle/>
+          <a:p>
+            <a:r>
+              <a:rPr lang="en-US" sz="1100" dirty="0">
                 <a:solidFill>
                   <a:schemeClr val="accent5">
                     <a:lumMod val="75000"/>
                   </a:schemeClr>
                 </a:solidFill>
-              </a:endParaRPr>
-            </a:p>
-          </p:txBody>
-        </p:sp>
-        <p:sp>
-          <p:nvSpPr>
-            <p:cNvPr id="92" name="Isosceles Triangle 91"/>
-            <p:cNvSpPr/>
-            <p:nvPr/>
-          </p:nvSpPr>
-          <p:spPr>
-            <a:xfrm rot="10800000" flipV="1">
-              <a:off x="3995991" y="631624"/>
-              <a:ext cx="132157" cy="79956"/>
-            </a:xfrm>
-            <a:prstGeom prst="triangle">
-              <a:avLst/>
-            </a:prstGeom>
-            <a:solidFill>
-              <a:schemeClr val="accent5">
-                <a:lumMod val="75000"/>
-              </a:schemeClr>
-            </a:solidFill>
-            <a:ln>
-              <a:noFill/>
-            </a:ln>
-          </p:spPr>
-          <p:style>
-            <a:lnRef idx="2">
-              <a:schemeClr val="accent1">
-                <a:shade val="50000"/>
-              </a:schemeClr>
-            </a:lnRef>
-            <a:fillRef idx="1">
-              <a:schemeClr val="accent1"/>
-            </a:fillRef>
-            <a:effectRef idx="0">
-              <a:schemeClr val="accent1"/>
-            </a:effectRef>
-            <a:fontRef idx="minor">
-              <a:schemeClr val="lt1"/>
-            </a:fontRef>
-          </p:style>
-          <p:txBody>
-            <a:bodyPr rtlCol="0" anchor="ctr"/>
-            <a:lstStyle/>
-            <a:p>
-              <a:pPr algn="ctr"/>
-              <a:endParaRPr lang="en-SG"/>
-            </a:p>
-          </p:txBody>
-        </p:sp>
-      </p:grpSp>
+              </a:rPr>
+              <a:t>creates</a:t>
+            </a:r>
+            <a:endParaRPr lang="en-SG" sz="1100" dirty="0">
+              <a:solidFill>
+                <a:schemeClr val="accent5">
+                  <a:lumMod val="75000"/>
+                </a:schemeClr>
+              </a:solidFill>
+            </a:endParaRPr>
+          </a:p>
+        </p:txBody>
+      </p:sp>
+      <p:sp>
+        <p:nvSpPr>
+          <p:cNvPr id="92" name="Isosceles Triangle 91"/>
+          <p:cNvSpPr/>
+          <p:nvPr/>
+        </p:nvSpPr>
+        <p:spPr>
+          <a:xfrm rot="16200000" flipV="1">
+            <a:off x="6630078" y="3013092"/>
+            <a:ext cx="115455" cy="94932"/>
+          </a:xfrm>
+          <a:prstGeom prst="triangle">
+            <a:avLst/>
+          </a:prstGeom>
+          <a:solidFill>
+            <a:schemeClr val="accent5">
+              <a:lumMod val="75000"/>
+            </a:schemeClr>
+          </a:solidFill>
+          <a:ln>
+            <a:noFill/>
+          </a:ln>
+        </p:spPr>
+        <p:style>
+          <a:lnRef idx="2">
+            <a:schemeClr val="accent1">
+              <a:shade val="50000"/>
+            </a:schemeClr>
+          </a:lnRef>
+          <a:fillRef idx="1">
+            <a:schemeClr val="accent1"/>
+          </a:fillRef>
+          <a:effectRef idx="0">
+            <a:schemeClr val="accent1"/>
+          </a:effectRef>
+          <a:fontRef idx="minor">
+            <a:schemeClr val="lt1"/>
+          </a:fontRef>
+        </p:style>
+        <p:txBody>
+          <a:bodyPr rtlCol="0" anchor="ctr"/>
+          <a:lstStyle/>
+          <a:p>
+            <a:pPr algn="ctr"/>
+            <a:endParaRPr lang="en-SG"/>
+          </a:p>
+        </p:txBody>
+      </p:sp>
       <p:cxnSp>
         <p:nvCxnSpPr>
           <p:cNvPr id="95" name="Straight Connector 94"/>
@@ -5815,7 +5766,7 @@
           <a:p>
             <a:pPr algn="ctr"/>
             <a:r>
-              <a:rPr lang="en-US" sz="1050" b="1" dirty="0" err="1" smtClean="0">
+              <a:rPr lang="en-US" sz="1050" b="1" dirty="0" err="1">
                 <a:solidFill>
                   <a:schemeClr val="bg1"/>
                 </a:solidFill>
@@ -6165,7 +6116,7 @@
           <a:p>
             <a:pPr algn="ctr"/>
             <a:r>
-              <a:rPr lang="en-US" sz="1050" dirty="0" err="1" smtClean="0">
+              <a:rPr lang="en-US" sz="1050" dirty="0" err="1">
                 <a:solidFill>
                   <a:schemeClr val="bg1"/>
                 </a:solidFill>
@@ -6173,7 +6124,7 @@
               <a:t>XYZCommand</a:t>
             </a:r>
             <a:r>
-              <a:rPr lang="en-US" sz="1050" dirty="0" smtClean="0">
+              <a:rPr lang="en-US" sz="1050" dirty="0">
                 <a:solidFill>
                   <a:schemeClr val="bg1"/>
                 </a:solidFill>
@@ -6181,7 +6132,7 @@
               <a:t> = </a:t>
             </a:r>
             <a:r>
-              <a:rPr lang="en-US" sz="1050" dirty="0" err="1" smtClean="0">
+              <a:rPr lang="en-US" sz="1050" dirty="0" err="1">
                 <a:solidFill>
                   <a:schemeClr val="bg1"/>
                 </a:solidFill>
@@ -6189,7 +6140,7 @@
               <a:t>AddCommand</a:t>
             </a:r>
             <a:r>
-              <a:rPr lang="en-US" sz="1050" dirty="0" smtClean="0">
+              <a:rPr lang="en-US" sz="1050" dirty="0">
                 <a:solidFill>
                   <a:schemeClr val="bg1"/>
                 </a:solidFill>
@@ -6197,7 +6148,7 @@
               <a:t>, </a:t>
             </a:r>
             <a:r>
-              <a:rPr lang="en-US" sz="1050" dirty="0" err="1" smtClean="0">
+              <a:rPr lang="en-US" sz="1050" dirty="0" err="1">
                 <a:solidFill>
                   <a:schemeClr val="bg1"/>
                 </a:solidFill>
@@ -6205,18 +6156,13 @@
               <a:t>FindCommand</a:t>
             </a:r>
             <a:r>
-              <a:rPr lang="en-US" sz="1050" dirty="0" smtClean="0">
+              <a:rPr lang="en-US" sz="1050" dirty="0">
                 <a:solidFill>
                   <a:schemeClr val="bg1"/>
                 </a:solidFill>
               </a:rPr>
               <a:t>, etc.</a:t>
             </a:r>
-            <a:endParaRPr lang="en-US" sz="1050" dirty="0">
-              <a:solidFill>
-                <a:schemeClr val="bg1"/>
-              </a:solidFill>
-            </a:endParaRPr>
           </a:p>
         </p:txBody>
       </p:sp>

</xml_diff>

<commit_message>
Edit developer guide to standardize certain parts
</commit_message>
<xml_diff>
--- a/docs/diagrams/LogicComponentClassDiagram.pptx
+++ b/docs/diagrams/LogicComponentClassDiagram.pptx
@@ -208,7 +208,7 @@
           <a:p>
             <a:fld id="{F5CC4B3F-88C1-4FFA-B1B6-F41C21DC6924}" type="datetimeFigureOut">
               <a:rPr lang="en-US" smtClean="0"/>
-              <a:t>3/30/2019</a:t>
+              <a:t>4/14/19</a:t>
             </a:fld>
             <a:endParaRPr lang="en-US"/>
           </a:p>
@@ -654,7 +654,7 @@
           <a:p>
             <a:fld id="{78C97017-6FC3-485B-9764-EAC9E56C1D49}" type="datetimeFigureOut">
               <a:rPr lang="en-US" smtClean="0"/>
-              <a:t>3/30/2019</a:t>
+              <a:t>4/14/19</a:t>
             </a:fld>
             <a:endParaRPr lang="en-US"/>
           </a:p>
@@ -822,7 +822,7 @@
           <a:p>
             <a:fld id="{78C97017-6FC3-485B-9764-EAC9E56C1D49}" type="datetimeFigureOut">
               <a:rPr lang="en-US" smtClean="0"/>
-              <a:t>3/30/2019</a:t>
+              <a:t>4/14/19</a:t>
             </a:fld>
             <a:endParaRPr lang="en-US"/>
           </a:p>
@@ -1000,7 +1000,7 @@
           <a:p>
             <a:fld id="{78C97017-6FC3-485B-9764-EAC9E56C1D49}" type="datetimeFigureOut">
               <a:rPr lang="en-US" smtClean="0"/>
-              <a:t>3/30/2019</a:t>
+              <a:t>4/14/19</a:t>
             </a:fld>
             <a:endParaRPr lang="en-US"/>
           </a:p>
@@ -1168,7 +1168,7 @@
           <a:p>
             <a:fld id="{78C97017-6FC3-485B-9764-EAC9E56C1D49}" type="datetimeFigureOut">
               <a:rPr lang="en-US" smtClean="0"/>
-              <a:t>3/30/2019</a:t>
+              <a:t>4/14/19</a:t>
             </a:fld>
             <a:endParaRPr lang="en-US"/>
           </a:p>
@@ -1413,7 +1413,7 @@
           <a:p>
             <a:fld id="{78C97017-6FC3-485B-9764-EAC9E56C1D49}" type="datetimeFigureOut">
               <a:rPr lang="en-US" smtClean="0"/>
-              <a:t>3/30/2019</a:t>
+              <a:t>4/14/19</a:t>
             </a:fld>
             <a:endParaRPr lang="en-US"/>
           </a:p>
@@ -1698,7 +1698,7 @@
           <a:p>
             <a:fld id="{78C97017-6FC3-485B-9764-EAC9E56C1D49}" type="datetimeFigureOut">
               <a:rPr lang="en-US" smtClean="0"/>
-              <a:t>3/30/2019</a:t>
+              <a:t>4/14/19</a:t>
             </a:fld>
             <a:endParaRPr lang="en-US"/>
           </a:p>
@@ -2117,7 +2117,7 @@
           <a:p>
             <a:fld id="{78C97017-6FC3-485B-9764-EAC9E56C1D49}" type="datetimeFigureOut">
               <a:rPr lang="en-US" smtClean="0"/>
-              <a:t>3/30/2019</a:t>
+              <a:t>4/14/19</a:t>
             </a:fld>
             <a:endParaRPr lang="en-US"/>
           </a:p>
@@ -2234,7 +2234,7 @@
           <a:p>
             <a:fld id="{78C97017-6FC3-485B-9764-EAC9E56C1D49}" type="datetimeFigureOut">
               <a:rPr lang="en-US" smtClean="0"/>
-              <a:t>3/30/2019</a:t>
+              <a:t>4/14/19</a:t>
             </a:fld>
             <a:endParaRPr lang="en-US"/>
           </a:p>
@@ -2329,7 +2329,7 @@
           <a:p>
             <a:fld id="{78C97017-6FC3-485B-9764-EAC9E56C1D49}" type="datetimeFigureOut">
               <a:rPr lang="en-US" smtClean="0"/>
-              <a:t>3/30/2019</a:t>
+              <a:t>4/14/19</a:t>
             </a:fld>
             <a:endParaRPr lang="en-US"/>
           </a:p>
@@ -2604,7 +2604,7 @@
           <a:p>
             <a:fld id="{78C97017-6FC3-485B-9764-EAC9E56C1D49}" type="datetimeFigureOut">
               <a:rPr lang="en-US" smtClean="0"/>
-              <a:t>3/30/2019</a:t>
+              <a:t>4/14/19</a:t>
             </a:fld>
             <a:endParaRPr lang="en-US"/>
           </a:p>
@@ -2856,7 +2856,7 @@
           <a:p>
             <a:fld id="{78C97017-6FC3-485B-9764-EAC9E56C1D49}" type="datetimeFigureOut">
               <a:rPr lang="en-US" smtClean="0"/>
-              <a:t>3/30/2019</a:t>
+              <a:t>4/14/19</a:t>
             </a:fld>
             <a:endParaRPr lang="en-US"/>
           </a:p>
@@ -3067,7 +3067,7 @@
           <a:p>
             <a:fld id="{78C97017-6FC3-485B-9764-EAC9E56C1D49}" type="datetimeFigureOut">
               <a:rPr lang="en-US" smtClean="0"/>
-              <a:t>3/30/2019</a:t>
+              <a:t>4/14/19</a:t>
             </a:fld>
             <a:endParaRPr lang="en-US"/>
           </a:p>
@@ -3450,8 +3450,8 @@
         </p:nvSpPr>
         <p:spPr>
           <a:xfrm>
-            <a:off x="1165949" y="1051331"/>
-            <a:ext cx="7084740" cy="3733800"/>
+            <a:off x="685800" y="914400"/>
+            <a:ext cx="7564889" cy="3870731"/>
           </a:xfrm>
           <a:prstGeom prst="roundRect">
             <a:avLst>
@@ -3490,14 +3490,14 @@
             <a:r>
               <a:rPr lang="en-US" sz="1200" b="1" dirty="0">
                 <a:solidFill>
-                  <a:srgbClr val="0070C0"/>
+                  <a:schemeClr val="tx1"/>
                 </a:solidFill>
               </a:rPr>
               <a:t>Logic</a:t>
             </a:r>
             <a:endParaRPr lang="en-SG" sz="1200" b="1" dirty="0">
               <a:solidFill>
-                <a:srgbClr val="0070C0"/>
+                <a:schemeClr val="tx1"/>
               </a:solidFill>
             </a:endParaRPr>
           </a:p>
@@ -3773,17 +3773,14 @@
         </p:nvSpPr>
         <p:spPr>
           <a:xfrm>
-            <a:off x="1178052" y="4795944"/>
-            <a:ext cx="7050315" cy="328045"/>
+            <a:off x="685800" y="4795944"/>
+            <a:ext cx="7542567" cy="328045"/>
           </a:xfrm>
           <a:prstGeom prst="roundRect">
             <a:avLst/>
           </a:prstGeom>
           <a:solidFill>
-            <a:schemeClr val="accent4">
-              <a:lumMod val="20000"/>
-              <a:lumOff val="80000"/>
-            </a:schemeClr>
+            <a:srgbClr val="FFF2CC"/>
           </a:solidFill>
           <a:ln w="19050">
             <a:noFill/>
@@ -3810,16 +3807,16 @@
           <a:p>
             <a:pPr algn="ctr"/>
             <a:r>
-              <a:rPr lang="en-US" sz="1100" b="1" dirty="0" err="1">
+              <a:rPr lang="en-US" sz="1100" b="1" dirty="0">
                 <a:solidFill>
-                  <a:schemeClr val="bg1"/>
+                  <a:schemeClr val="tx1"/>
                 </a:solidFill>
               </a:rPr>
-              <a:t>CurrentEdit</a:t>
+              <a:t>Model</a:t>
             </a:r>
             <a:endParaRPr lang="en-SG" sz="1100" b="1" dirty="0">
               <a:solidFill>
-                <a:schemeClr val="bg1"/>
+                <a:schemeClr val="tx1"/>
               </a:solidFill>
             </a:endParaRPr>
           </a:p>
@@ -4219,13 +4216,15 @@
       <p:cxnSp>
         <p:nvCxnSpPr>
           <p:cNvPr id="24" name="Elbow Connector 122"/>
-          <p:cNvCxnSpPr/>
+          <p:cNvCxnSpPr>
+            <a:cxnSpLocks/>
+          </p:cNvCxnSpPr>
           <p:nvPr/>
         </p:nvCxnSpPr>
         <p:spPr>
           <a:xfrm>
-            <a:off x="893311" y="2832505"/>
-            <a:ext cx="419548" cy="2860"/>
+            <a:off x="494083" y="2740152"/>
+            <a:ext cx="795196" cy="2860"/>
           </a:xfrm>
           <a:prstGeom prst="bentConnector3">
             <a:avLst>

</xml_diff>

<commit_message>
Modify parts of dev
</commit_message>
<xml_diff>
--- a/docs/diagrams/LogicComponentClassDiagram.pptx
+++ b/docs/diagrams/LogicComponentClassDiagram.pptx
@@ -126,10 +126,6 @@
 </p:presentation>
 </file>
 
-<file path=ppt/revisionInfo.xml><?xml version="1.0" encoding="utf-8"?>
-<p1510:revInfo xmlns:a="http://schemas.openxmlformats.org/drawingml/2006/main" xmlns:r="http://schemas.openxmlformats.org/officeDocument/2006/relationships" xmlns:p1510="http://schemas.microsoft.com/office/powerpoint/2015/10/main"/>
-</file>
-
 <file path=ppt/notesMasters/notesMaster1.xml><?xml version="1.0" encoding="utf-8"?>
 <p:notesMaster xmlns:a="http://schemas.openxmlformats.org/drawingml/2006/main" xmlns:r="http://schemas.openxmlformats.org/officeDocument/2006/relationships" xmlns:p="http://schemas.openxmlformats.org/presentationml/2006/main">
   <p:cSld>
@@ -212,7 +208,7 @@
           <a:p>
             <a:fld id="{F5CC4B3F-88C1-4FFA-B1B6-F41C21DC6924}" type="datetimeFigureOut">
               <a:rPr lang="en-US" smtClean="0"/>
-              <a:t>4/16/2018</a:t>
+              <a:t>4/15/2019</a:t>
             </a:fld>
             <a:endParaRPr lang="en-US"/>
           </a:p>
@@ -658,7 +654,7 @@
           <a:p>
             <a:fld id="{78C97017-6FC3-485B-9764-EAC9E56C1D49}" type="datetimeFigureOut">
               <a:rPr lang="en-US" smtClean="0"/>
-              <a:t>4/16/2018</a:t>
+              <a:t>4/15/2019</a:t>
             </a:fld>
             <a:endParaRPr lang="en-US"/>
           </a:p>
@@ -826,7 +822,7 @@
           <a:p>
             <a:fld id="{78C97017-6FC3-485B-9764-EAC9E56C1D49}" type="datetimeFigureOut">
               <a:rPr lang="en-US" smtClean="0"/>
-              <a:t>4/16/2018</a:t>
+              <a:t>4/15/2019</a:t>
             </a:fld>
             <a:endParaRPr lang="en-US"/>
           </a:p>
@@ -1004,7 +1000,7 @@
           <a:p>
             <a:fld id="{78C97017-6FC3-485B-9764-EAC9E56C1D49}" type="datetimeFigureOut">
               <a:rPr lang="en-US" smtClean="0"/>
-              <a:t>4/16/2018</a:t>
+              <a:t>4/15/2019</a:t>
             </a:fld>
             <a:endParaRPr lang="en-US"/>
           </a:p>
@@ -1172,7 +1168,7 @@
           <a:p>
             <a:fld id="{78C97017-6FC3-485B-9764-EAC9E56C1D49}" type="datetimeFigureOut">
               <a:rPr lang="en-US" smtClean="0"/>
-              <a:t>4/16/2018</a:t>
+              <a:t>4/15/2019</a:t>
             </a:fld>
             <a:endParaRPr lang="en-US"/>
           </a:p>
@@ -1417,7 +1413,7 @@
           <a:p>
             <a:fld id="{78C97017-6FC3-485B-9764-EAC9E56C1D49}" type="datetimeFigureOut">
               <a:rPr lang="en-US" smtClean="0"/>
-              <a:t>4/16/2018</a:t>
+              <a:t>4/15/2019</a:t>
             </a:fld>
             <a:endParaRPr lang="en-US"/>
           </a:p>
@@ -1702,7 +1698,7 @@
           <a:p>
             <a:fld id="{78C97017-6FC3-485B-9764-EAC9E56C1D49}" type="datetimeFigureOut">
               <a:rPr lang="en-US" smtClean="0"/>
-              <a:t>4/16/2018</a:t>
+              <a:t>4/15/2019</a:t>
             </a:fld>
             <a:endParaRPr lang="en-US"/>
           </a:p>
@@ -2121,7 +2117,7 @@
           <a:p>
             <a:fld id="{78C97017-6FC3-485B-9764-EAC9E56C1D49}" type="datetimeFigureOut">
               <a:rPr lang="en-US" smtClean="0"/>
-              <a:t>4/16/2018</a:t>
+              <a:t>4/15/2019</a:t>
             </a:fld>
             <a:endParaRPr lang="en-US"/>
           </a:p>
@@ -2238,7 +2234,7 @@
           <a:p>
             <a:fld id="{78C97017-6FC3-485B-9764-EAC9E56C1D49}" type="datetimeFigureOut">
               <a:rPr lang="en-US" smtClean="0"/>
-              <a:t>4/16/2018</a:t>
+              <a:t>4/15/2019</a:t>
             </a:fld>
             <a:endParaRPr lang="en-US"/>
           </a:p>
@@ -2333,7 +2329,7 @@
           <a:p>
             <a:fld id="{78C97017-6FC3-485B-9764-EAC9E56C1D49}" type="datetimeFigureOut">
               <a:rPr lang="en-US" smtClean="0"/>
-              <a:t>4/16/2018</a:t>
+              <a:t>4/15/2019</a:t>
             </a:fld>
             <a:endParaRPr lang="en-US"/>
           </a:p>
@@ -2608,7 +2604,7 @@
           <a:p>
             <a:fld id="{78C97017-6FC3-485B-9764-EAC9E56C1D49}" type="datetimeFigureOut">
               <a:rPr lang="en-US" smtClean="0"/>
-              <a:t>4/16/2018</a:t>
+              <a:t>4/15/2019</a:t>
             </a:fld>
             <a:endParaRPr lang="en-US"/>
           </a:p>
@@ -2860,7 +2856,7 @@
           <a:p>
             <a:fld id="{78C97017-6FC3-485B-9764-EAC9E56C1D49}" type="datetimeFigureOut">
               <a:rPr lang="en-US" smtClean="0"/>
-              <a:t>4/16/2018</a:t>
+              <a:t>4/15/2019</a:t>
             </a:fld>
             <a:endParaRPr lang="en-US"/>
           </a:p>
@@ -3071,7 +3067,7 @@
           <a:p>
             <a:fld id="{78C97017-6FC3-485B-9764-EAC9E56C1D49}" type="datetimeFigureOut">
               <a:rPr lang="en-US" smtClean="0"/>
-              <a:t>4/16/2018</a:t>
+              <a:t>4/15/2019</a:t>
             </a:fld>
             <a:endParaRPr lang="en-US"/>
           </a:p>
@@ -3607,7 +3603,7 @@
           <a:p>
             <a:pPr algn="ctr"/>
             <a:r>
-              <a:rPr lang="en-US" sz="1050" b="1" dirty="0" err="1" smtClean="0">
+              <a:rPr lang="en-US" sz="1050" b="1" dirty="0" err="1">
                 <a:solidFill>
                   <a:srgbClr val="0070C0"/>
                 </a:solidFill>
@@ -3939,12 +3935,12 @@
           <a:p>
             <a:pPr algn="ctr"/>
             <a:r>
-              <a:rPr lang="en-US" sz="1050" dirty="0" err="1" smtClean="0">
+              <a:rPr lang="en-US" sz="1050" dirty="0" err="1">
                 <a:solidFill>
                   <a:schemeClr val="bg1"/>
                 </a:solidFill>
               </a:rPr>
-              <a:t>AddressBook</a:t>
+              <a:t>HealthHub</a:t>
             </a:r>
             <a:endParaRPr lang="en-US" sz="1050" dirty="0">
               <a:solidFill>
@@ -5815,7 +5811,7 @@
           <a:p>
             <a:pPr algn="ctr"/>
             <a:r>
-              <a:rPr lang="en-US" sz="1050" b="1" dirty="0" err="1" smtClean="0">
+              <a:rPr lang="en-US" sz="1050" b="1" dirty="0" err="1">
                 <a:solidFill>
                   <a:schemeClr val="bg1"/>
                 </a:solidFill>
@@ -6126,8 +6122,8 @@
         </p:nvSpPr>
         <p:spPr>
           <a:xfrm>
-            <a:off x="6263130" y="1981200"/>
-            <a:ext cx="1276614" cy="630473"/>
+            <a:off x="6263130" y="1887572"/>
+            <a:ext cx="1276614" cy="724101"/>
           </a:xfrm>
           <a:prstGeom prst="foldedCorner">
             <a:avLst/>
@@ -6165,7 +6161,7 @@
           <a:p>
             <a:pPr algn="ctr"/>
             <a:r>
-              <a:rPr lang="en-US" sz="1050" dirty="0" err="1" smtClean="0">
+              <a:rPr lang="en-US" sz="1050" dirty="0" err="1">
                 <a:solidFill>
                   <a:schemeClr val="bg1"/>
                 </a:solidFill>
@@ -6173,7 +6169,7 @@
               <a:t>XYZCommand</a:t>
             </a:r>
             <a:r>
-              <a:rPr lang="en-US" sz="1050" dirty="0" smtClean="0">
+              <a:rPr lang="en-US" sz="1050" dirty="0">
                 <a:solidFill>
                   <a:schemeClr val="bg1"/>
                 </a:solidFill>
@@ -6181,7 +6177,7 @@
               <a:t> = </a:t>
             </a:r>
             <a:r>
-              <a:rPr lang="en-US" sz="1050" dirty="0" err="1" smtClean="0">
+              <a:rPr lang="en-US" sz="1050" dirty="0" err="1">
                 <a:solidFill>
                   <a:schemeClr val="bg1"/>
                 </a:solidFill>
@@ -6189,34 +6185,32 @@
               <a:t>AddCommand</a:t>
             </a:r>
             <a:r>
-              <a:rPr lang="en-US" sz="1050" dirty="0" smtClean="0">
+              <a:rPr lang="en-US" sz="1050" dirty="0">
                 <a:solidFill>
                   <a:schemeClr val="bg1"/>
                 </a:solidFill>
               </a:rPr>
-              <a:t>, </a:t>
-            </a:r>
-            <a:r>
-              <a:rPr lang="en-US" sz="1050" dirty="0" err="1" smtClean="0">
+              <a:t>,</a:t>
+            </a:r>
+          </a:p>
+          <a:p>
+            <a:pPr algn="ctr"/>
+            <a:r>
+              <a:rPr lang="en-US" sz="1050" dirty="0" err="1">
                 <a:solidFill>
                   <a:schemeClr val="bg1"/>
                 </a:solidFill>
               </a:rPr>
-              <a:t>FindCommand</a:t>
-            </a:r>
-            <a:r>
-              <a:rPr lang="en-US" sz="1050" dirty="0" smtClean="0">
+              <a:t>FilterCommand</a:t>
+            </a:r>
+            <a:r>
+              <a:rPr lang="en-US" sz="1050" dirty="0">
                 <a:solidFill>
                   <a:schemeClr val="bg1"/>
                 </a:solidFill>
               </a:rPr>
               <a:t>, etc.</a:t>
             </a:r>
-            <a:endParaRPr lang="en-US" sz="1050" dirty="0">
-              <a:solidFill>
-                <a:schemeClr val="bg1"/>
-              </a:solidFill>
-            </a:endParaRPr>
           </a:p>
         </p:txBody>
       </p:sp>

</xml_diff>

<commit_message>
removed dead code and updated DG logic section
</commit_message>
<xml_diff>
--- a/docs/diagrams/LogicComponentClassDiagram.pptx
+++ b/docs/diagrams/LogicComponentClassDiagram.pptx
@@ -126,10 +126,6 @@
 </p:presentation>
 </file>
 
-<file path=ppt/revisionInfo.xml><?xml version="1.0" encoding="utf-8"?>
-<p1510:revInfo xmlns:a="http://schemas.openxmlformats.org/drawingml/2006/main" xmlns:r="http://schemas.openxmlformats.org/officeDocument/2006/relationships" xmlns:p1510="http://schemas.microsoft.com/office/powerpoint/2015/10/main"/>
-</file>
-
 <file path=ppt/notesMasters/notesMaster1.xml><?xml version="1.0" encoding="utf-8"?>
 <p:notesMaster xmlns:a="http://schemas.openxmlformats.org/drawingml/2006/main" xmlns:r="http://schemas.openxmlformats.org/officeDocument/2006/relationships" xmlns:p="http://schemas.openxmlformats.org/presentationml/2006/main">
   <p:cSld>
@@ -212,7 +208,7 @@
           <a:p>
             <a:fld id="{F5CC4B3F-88C1-4FFA-B1B6-F41C21DC6924}" type="datetimeFigureOut">
               <a:rPr lang="en-US" smtClean="0"/>
-              <a:t>4/16/2018</a:t>
+              <a:t>4/15/19</a:t>
             </a:fld>
             <a:endParaRPr lang="en-US"/>
           </a:p>
@@ -658,7 +654,7 @@
           <a:p>
             <a:fld id="{78C97017-6FC3-485B-9764-EAC9E56C1D49}" type="datetimeFigureOut">
               <a:rPr lang="en-US" smtClean="0"/>
-              <a:t>4/16/2018</a:t>
+              <a:t>4/15/19</a:t>
             </a:fld>
             <a:endParaRPr lang="en-US"/>
           </a:p>
@@ -826,7 +822,7 @@
           <a:p>
             <a:fld id="{78C97017-6FC3-485B-9764-EAC9E56C1D49}" type="datetimeFigureOut">
               <a:rPr lang="en-US" smtClean="0"/>
-              <a:t>4/16/2018</a:t>
+              <a:t>4/15/19</a:t>
             </a:fld>
             <a:endParaRPr lang="en-US"/>
           </a:p>
@@ -1004,7 +1000,7 @@
           <a:p>
             <a:fld id="{78C97017-6FC3-485B-9764-EAC9E56C1D49}" type="datetimeFigureOut">
               <a:rPr lang="en-US" smtClean="0"/>
-              <a:t>4/16/2018</a:t>
+              <a:t>4/15/19</a:t>
             </a:fld>
             <a:endParaRPr lang="en-US"/>
           </a:p>
@@ -1172,7 +1168,7 @@
           <a:p>
             <a:fld id="{78C97017-6FC3-485B-9764-EAC9E56C1D49}" type="datetimeFigureOut">
               <a:rPr lang="en-US" smtClean="0"/>
-              <a:t>4/16/2018</a:t>
+              <a:t>4/15/19</a:t>
             </a:fld>
             <a:endParaRPr lang="en-US"/>
           </a:p>
@@ -1417,7 +1413,7 @@
           <a:p>
             <a:fld id="{78C97017-6FC3-485B-9764-EAC9E56C1D49}" type="datetimeFigureOut">
               <a:rPr lang="en-US" smtClean="0"/>
-              <a:t>4/16/2018</a:t>
+              <a:t>4/15/19</a:t>
             </a:fld>
             <a:endParaRPr lang="en-US"/>
           </a:p>
@@ -1702,7 +1698,7 @@
           <a:p>
             <a:fld id="{78C97017-6FC3-485B-9764-EAC9E56C1D49}" type="datetimeFigureOut">
               <a:rPr lang="en-US" smtClean="0"/>
-              <a:t>4/16/2018</a:t>
+              <a:t>4/15/19</a:t>
             </a:fld>
             <a:endParaRPr lang="en-US"/>
           </a:p>
@@ -2121,7 +2117,7 @@
           <a:p>
             <a:fld id="{78C97017-6FC3-485B-9764-EAC9E56C1D49}" type="datetimeFigureOut">
               <a:rPr lang="en-US" smtClean="0"/>
-              <a:t>4/16/2018</a:t>
+              <a:t>4/15/19</a:t>
             </a:fld>
             <a:endParaRPr lang="en-US"/>
           </a:p>
@@ -2238,7 +2234,7 @@
           <a:p>
             <a:fld id="{78C97017-6FC3-485B-9764-EAC9E56C1D49}" type="datetimeFigureOut">
               <a:rPr lang="en-US" smtClean="0"/>
-              <a:t>4/16/2018</a:t>
+              <a:t>4/15/19</a:t>
             </a:fld>
             <a:endParaRPr lang="en-US"/>
           </a:p>
@@ -2333,7 +2329,7 @@
           <a:p>
             <a:fld id="{78C97017-6FC3-485B-9764-EAC9E56C1D49}" type="datetimeFigureOut">
               <a:rPr lang="en-US" smtClean="0"/>
-              <a:t>4/16/2018</a:t>
+              <a:t>4/15/19</a:t>
             </a:fld>
             <a:endParaRPr lang="en-US"/>
           </a:p>
@@ -2608,7 +2604,7 @@
           <a:p>
             <a:fld id="{78C97017-6FC3-485B-9764-EAC9E56C1D49}" type="datetimeFigureOut">
               <a:rPr lang="en-US" smtClean="0"/>
-              <a:t>4/16/2018</a:t>
+              <a:t>4/15/19</a:t>
             </a:fld>
             <a:endParaRPr lang="en-US"/>
           </a:p>
@@ -2860,7 +2856,7 @@
           <a:p>
             <a:fld id="{78C97017-6FC3-485B-9764-EAC9E56C1D49}" type="datetimeFigureOut">
               <a:rPr lang="en-US" smtClean="0"/>
-              <a:t>4/16/2018</a:t>
+              <a:t>4/15/19</a:t>
             </a:fld>
             <a:endParaRPr lang="en-US"/>
           </a:p>
@@ -3071,7 +3067,7 @@
           <a:p>
             <a:fld id="{78C97017-6FC3-485B-9764-EAC9E56C1D49}" type="datetimeFigureOut">
               <a:rPr lang="en-US" smtClean="0"/>
-              <a:t>4/16/2018</a:t>
+              <a:t>4/15/19</a:t>
             </a:fld>
             <a:endParaRPr lang="en-US"/>
           </a:p>
@@ -3607,7 +3603,7 @@
           <a:p>
             <a:pPr algn="ctr"/>
             <a:r>
-              <a:rPr lang="en-US" sz="1050" b="1" dirty="0" err="1" smtClean="0">
+              <a:rPr lang="en-US" sz="1050" b="1" dirty="0" err="1">
                 <a:solidFill>
                   <a:srgbClr val="0070C0"/>
                 </a:solidFill>
@@ -3939,28 +3935,12 @@
           <a:p>
             <a:pPr algn="ctr"/>
             <a:r>
-              <a:rPr lang="en-US" sz="1050" dirty="0" err="1" smtClean="0">
+              <a:rPr lang="en-US" sz="1050" dirty="0" err="1">
                 <a:solidFill>
                   <a:schemeClr val="bg1"/>
                 </a:solidFill>
               </a:rPr>
-              <a:t>AddressBook</a:t>
-            </a:r>
-            <a:endParaRPr lang="en-US" sz="1050" dirty="0">
-              <a:solidFill>
-                <a:schemeClr val="bg1"/>
-              </a:solidFill>
-            </a:endParaRPr>
-          </a:p>
-          <a:p>
-            <a:pPr algn="ctr"/>
-            <a:r>
-              <a:rPr lang="en-US" sz="1050" dirty="0">
-                <a:solidFill>
-                  <a:schemeClr val="bg1"/>
-                </a:solidFill>
-              </a:rPr>
-              <a:t>Parser</a:t>
+              <a:t>DocXParser</a:t>
             </a:r>
             <a:endParaRPr lang="en-SG" sz="1050" dirty="0">
               <a:solidFill>
@@ -4957,8 +4937,8 @@
         </p:nvGrpSpPr>
         <p:grpSpPr>
           <a:xfrm rot="10800000">
-            <a:off x="4687086" y="3784757"/>
-            <a:ext cx="555486" cy="254462"/>
+            <a:off x="4551512" y="3784757"/>
+            <a:ext cx="636573" cy="254462"/>
             <a:chOff x="3703306" y="644022"/>
             <a:chExt cx="555486" cy="230832"/>
           </a:xfrm>
@@ -5637,8 +5617,8 @@
         </p:nvGrpSpPr>
         <p:grpSpPr>
           <a:xfrm rot="5400000">
-            <a:off x="6371505" y="2788428"/>
-            <a:ext cx="222304" cy="598286"/>
+            <a:off x="6389357" y="2759262"/>
+            <a:ext cx="222304" cy="656617"/>
             <a:chOff x="3965759" y="592436"/>
             <a:chExt cx="254462" cy="503902"/>
           </a:xfrm>
@@ -5815,7 +5795,7 @@
           <a:p>
             <a:pPr algn="ctr"/>
             <a:r>
-              <a:rPr lang="en-US" sz="1050" b="1" dirty="0" err="1" smtClean="0">
+              <a:rPr lang="en-US" sz="1050" b="1" dirty="0" err="1">
                 <a:solidFill>
                   <a:schemeClr val="bg1"/>
                 </a:solidFill>
@@ -6126,8 +6106,8 @@
         </p:nvSpPr>
         <p:spPr>
           <a:xfrm>
-            <a:off x="6263130" y="1981200"/>
-            <a:ext cx="1276614" cy="630473"/>
+            <a:off x="6201581" y="1640208"/>
+            <a:ext cx="1647020" cy="933522"/>
           </a:xfrm>
           <a:prstGeom prst="foldedCorner">
             <a:avLst/>
@@ -6165,7 +6145,7 @@
           <a:p>
             <a:pPr algn="ctr"/>
             <a:r>
-              <a:rPr lang="en-US" sz="1050" dirty="0" err="1" smtClean="0">
+              <a:rPr lang="en-US" sz="1000" dirty="0" err="1">
                 <a:solidFill>
                   <a:schemeClr val="bg1"/>
                 </a:solidFill>
@@ -6173,7 +6153,7 @@
               <a:t>XYZCommand</a:t>
             </a:r>
             <a:r>
-              <a:rPr lang="en-US" sz="1050" dirty="0" smtClean="0">
+              <a:rPr lang="en-US" sz="1000" dirty="0">
                 <a:solidFill>
                   <a:schemeClr val="bg1"/>
                 </a:solidFill>
@@ -6181,15 +6161,15 @@
               <a:t> = </a:t>
             </a:r>
             <a:r>
-              <a:rPr lang="en-US" sz="1050" dirty="0" err="1" smtClean="0">
+              <a:rPr lang="en-US" sz="1000" dirty="0" err="1">
                 <a:solidFill>
                   <a:schemeClr val="bg1"/>
                 </a:solidFill>
               </a:rPr>
-              <a:t>AddCommand</a:t>
-            </a:r>
-            <a:r>
-              <a:rPr lang="en-US" sz="1050" dirty="0" smtClean="0">
+              <a:t>AddPatientCommand</a:t>
+            </a:r>
+            <a:r>
+              <a:rPr lang="en-US" sz="1000" dirty="0">
                 <a:solidFill>
                   <a:schemeClr val="bg1"/>
                 </a:solidFill>
@@ -6197,26 +6177,21 @@
               <a:t>, </a:t>
             </a:r>
             <a:r>
-              <a:rPr lang="en-US" sz="1050" dirty="0" err="1" smtClean="0">
+              <a:rPr lang="en-US" sz="1000" dirty="0" err="1">
                 <a:solidFill>
                   <a:schemeClr val="bg1"/>
                 </a:solidFill>
               </a:rPr>
-              <a:t>FindCommand</a:t>
-            </a:r>
-            <a:r>
-              <a:rPr lang="en-US" sz="1050" dirty="0" smtClean="0">
+              <a:t>AddAppointmentCommand,etc</a:t>
+            </a:r>
+            <a:r>
+              <a:rPr lang="en-US" sz="1000" dirty="0">
                 <a:solidFill>
                   <a:schemeClr val="bg1"/>
                 </a:solidFill>
               </a:rPr>
-              <a:t>, etc.</a:t>
-            </a:r>
-            <a:endParaRPr lang="en-US" sz="1050" dirty="0">
-              <a:solidFill>
-                <a:schemeClr val="bg1"/>
-              </a:solidFill>
-            </a:endParaRPr>
+              <a:t>.</a:t>
+            </a:r>
           </a:p>
         </p:txBody>
       </p:sp>

</xml_diff>